<commit_message>
Gave the power point a theme and some small changes
</commit_message>
<xml_diff>
--- a/documentation/week8_presentation/Falcon - Quadrotor Flight Control System.pptx
+++ b/documentation/week8_presentation/Falcon - Quadrotor Flight Control System.pptx
@@ -1,8 +1,8 @@
 
 <file path=ppt/presentation.xml><?xml version="1.0" encoding="utf-8"?>
-<p:presentation xmlns:a="http://schemas.openxmlformats.org/drawingml/2006/main" xmlns:r="http://schemas.openxmlformats.org/officeDocument/2006/relationships" xmlns:p="http://schemas.openxmlformats.org/presentationml/2006/main" saveSubsetFonts="1">
+<p:presentation xmlns:a="http://schemas.openxmlformats.org/drawingml/2006/main" xmlns:r="http://schemas.openxmlformats.org/officeDocument/2006/relationships" xmlns:mc="http://schemas.openxmlformats.org/markup-compatibility/2006" xmlns:mv="urn:schemas-microsoft-com:mac:vml" xmlns:p="http://schemas.openxmlformats.org/presentationml/2006/main" mc:Ignorable="mv" mc:PreserveAttributes="mv:*" saveSubsetFonts="1">
   <p:sldMasterIdLst>
-    <p:sldMasterId id="2147483648" r:id="rId1"/>
+    <p:sldMasterId id="2147484487" r:id="rId1"/>
   </p:sldMasterIdLst>
   <p:sldIdLst>
     <p:sldId id="256" r:id="rId2"/>
@@ -118,7 +118,7 @@
 </file>
 
 <file path=ppt/slideLayouts/slideLayout1.xml><?xml version="1.0" encoding="utf-8"?>
-<p:sldLayout xmlns:a="http://schemas.openxmlformats.org/drawingml/2006/main" xmlns:r="http://schemas.openxmlformats.org/officeDocument/2006/relationships" xmlns:p="http://schemas.openxmlformats.org/presentationml/2006/main" type="title" preserve="1">
+<p:sldLayout xmlns:a="http://schemas.openxmlformats.org/drawingml/2006/main" xmlns:r="http://schemas.openxmlformats.org/officeDocument/2006/relationships" xmlns:mc="http://schemas.openxmlformats.org/markup-compatibility/2006" xmlns:mv="urn:schemas-microsoft-com:mac:vml" xmlns:p="http://schemas.openxmlformats.org/presentationml/2006/main" mc:Ignorable="mv" mc:PreserveAttributes="mv:*" showMasterSp="0" type="title" preserve="1">
   <p:cSld name="Title Slide">
     <p:spTree>
       <p:nvGrpSpPr>
@@ -136,7 +136,57 @@
       </p:grpSpPr>
       <p:sp>
         <p:nvSpPr>
-          <p:cNvPr id="2" name="Title 1"/>
+          <p:cNvPr id="7" name="Straight Connector 6"/>
+          <p:cNvSpPr>
+            <a:spLocks noChangeShapeType="1"/>
+          </p:cNvSpPr>
+          <p:nvPr/>
+        </p:nvSpPr>
+        <p:spPr bwMode="auto">
+          <a:xfrm>
+            <a:off x="514350" y="5349902"/>
+            <a:ext cx="8629650" cy="2381"/>
+          </a:xfrm>
+          <a:prstGeom prst="line">
+            <a:avLst/>
+          </a:prstGeom>
+          <a:noFill/>
+          <a:ln w="9525" cap="flat" cmpd="sng" algn="ctr">
+            <a:gradFill flip="none" rotWithShape="1">
+              <a:gsLst>
+                <a:gs pos="0">
+                  <a:schemeClr val="accent1">
+                    <a:alpha val="0"/>
+                  </a:schemeClr>
+                </a:gs>
+                <a:gs pos="17000">
+                  <a:schemeClr val="accent1"/>
+                </a:gs>
+                <a:gs pos="100000">
+                  <a:schemeClr val="accent1"/>
+                </a:gs>
+              </a:gsLst>
+              <a:lin ang="0" scaled="1"/>
+              <a:tileRect/>
+            </a:gradFill>
+            <a:prstDash val="solid"/>
+            <a:round/>
+            <a:headEnd type="none" w="med" len="med"/>
+            <a:tailEnd type="none" w="med" len="med"/>
+          </a:ln>
+          <a:effectLst/>
+        </p:spPr>
+        <p:txBody>
+          <a:bodyPr vert="horz" wrap="square" lIns="91440" tIns="45720" rIns="91440" bIns="45720" anchor="t" compatLnSpc="1"/>
+          <a:lstStyle/>
+          <a:p>
+            <a:endParaRPr kumimoji="0" lang="en-US"/>
+          </a:p>
+        </p:txBody>
+      </p:sp>
+      <p:sp>
+        <p:nvSpPr>
+          <p:cNvPr id="29" name="Title 28"/>
           <p:cNvSpPr>
             <a:spLocks noGrp="1"/>
           </p:cNvSpPr>
@@ -146,25 +196,25 @@
         </p:nvSpPr>
         <p:spPr>
           <a:xfrm>
-            <a:off x="685800" y="2130425"/>
-            <a:ext cx="7772400" cy="1470025"/>
+            <a:off x="381000" y="4853411"/>
+            <a:ext cx="8458200" cy="1222375"/>
           </a:xfrm>
         </p:spPr>
         <p:txBody>
-          <a:bodyPr/>
-          <a:lstStyle/>
-          <a:p>
-            <a:r>
-              <a:rPr lang="en-US" smtClean="0"/>
+          <a:bodyPr anchor="t"/>
+          <a:lstStyle/>
+          <a:p>
+            <a:r>
+              <a:rPr kumimoji="0" lang="en-US" smtClean="0"/>
               <a:t>Click to edit Master title style</a:t>
             </a:r>
-            <a:endParaRPr lang="en-US"/>
-          </a:p>
-        </p:txBody>
-      </p:sp>
-      <p:sp>
-        <p:nvSpPr>
-          <p:cNvPr id="3" name="Subtitle 2"/>
+            <a:endParaRPr kumimoji="0" lang="en-US"/>
+          </a:p>
+        </p:txBody>
+      </p:sp>
+      <p:sp>
+        <p:nvSpPr>
+          <p:cNvPr id="9" name="Subtitle 8"/>
           <p:cNvSpPr>
             <a:spLocks noGrp="1"/>
           </p:cNvSpPr>
@@ -174,116 +224,60 @@
         </p:nvSpPr>
         <p:spPr>
           <a:xfrm>
-            <a:off x="1371600" y="3886200"/>
-            <a:ext cx="6400800" cy="1752600"/>
+            <a:off x="381000" y="3886200"/>
+            <a:ext cx="8458200" cy="914400"/>
           </a:xfrm>
         </p:spPr>
         <p:txBody>
-          <a:bodyPr/>
+          <a:bodyPr anchor="b"/>
           <a:lstStyle>
-            <a:lvl1pPr marL="0" indent="0" algn="ctr">
+            <a:lvl1pPr marL="0" indent="0" algn="l">
               <a:buNone/>
-              <a:defRPr>
+              <a:defRPr sz="2400">
                 <a:solidFill>
-                  <a:schemeClr val="tx1">
-                    <a:tint val="75000"/>
+                  <a:schemeClr val="tx2">
+                    <a:shade val="75000"/>
                   </a:schemeClr>
                 </a:solidFill>
               </a:defRPr>
             </a:lvl1pPr>
             <a:lvl2pPr marL="457200" indent="0" algn="ctr">
               <a:buNone/>
-              <a:defRPr>
-                <a:solidFill>
-                  <a:schemeClr val="tx1">
-                    <a:tint val="75000"/>
-                  </a:schemeClr>
-                </a:solidFill>
-              </a:defRPr>
             </a:lvl2pPr>
             <a:lvl3pPr marL="914400" indent="0" algn="ctr">
               <a:buNone/>
-              <a:defRPr>
-                <a:solidFill>
-                  <a:schemeClr val="tx1">
-                    <a:tint val="75000"/>
-                  </a:schemeClr>
-                </a:solidFill>
-              </a:defRPr>
             </a:lvl3pPr>
             <a:lvl4pPr marL="1371600" indent="0" algn="ctr">
               <a:buNone/>
-              <a:defRPr>
-                <a:solidFill>
-                  <a:schemeClr val="tx1">
-                    <a:tint val="75000"/>
-                  </a:schemeClr>
-                </a:solidFill>
-              </a:defRPr>
             </a:lvl4pPr>
             <a:lvl5pPr marL="1828800" indent="0" algn="ctr">
               <a:buNone/>
-              <a:defRPr>
-                <a:solidFill>
-                  <a:schemeClr val="tx1">
-                    <a:tint val="75000"/>
-                  </a:schemeClr>
-                </a:solidFill>
-              </a:defRPr>
             </a:lvl5pPr>
             <a:lvl6pPr marL="2286000" indent="0" algn="ctr">
               <a:buNone/>
-              <a:defRPr>
-                <a:solidFill>
-                  <a:schemeClr val="tx1">
-                    <a:tint val="75000"/>
-                  </a:schemeClr>
-                </a:solidFill>
-              </a:defRPr>
             </a:lvl6pPr>
             <a:lvl7pPr marL="2743200" indent="0" algn="ctr">
               <a:buNone/>
-              <a:defRPr>
-                <a:solidFill>
-                  <a:schemeClr val="tx1">
-                    <a:tint val="75000"/>
-                  </a:schemeClr>
-                </a:solidFill>
-              </a:defRPr>
             </a:lvl7pPr>
             <a:lvl8pPr marL="3200400" indent="0" algn="ctr">
               <a:buNone/>
-              <a:defRPr>
-                <a:solidFill>
-                  <a:schemeClr val="tx1">
-                    <a:tint val="75000"/>
-                  </a:schemeClr>
-                </a:solidFill>
-              </a:defRPr>
             </a:lvl8pPr>
             <a:lvl9pPr marL="3657600" indent="0" algn="ctr">
               <a:buNone/>
-              <a:defRPr>
-                <a:solidFill>
-                  <a:schemeClr val="tx1">
-                    <a:tint val="75000"/>
-                  </a:schemeClr>
-                </a:solidFill>
-              </a:defRPr>
             </a:lvl9pPr>
           </a:lstStyle>
           <a:p>
             <a:r>
-              <a:rPr lang="en-US" smtClean="0"/>
+              <a:rPr kumimoji="0" lang="en-US" smtClean="0"/>
               <a:t>Click to edit Master subtitle style</a:t>
             </a:r>
-            <a:endParaRPr lang="en-US"/>
-          </a:p>
-        </p:txBody>
-      </p:sp>
-      <p:sp>
-        <p:nvSpPr>
-          <p:cNvPr id="4" name="Date Placeholder 3"/>
+            <a:endParaRPr kumimoji="0" lang="en-US"/>
+          </a:p>
+        </p:txBody>
+      </p:sp>
+      <p:sp>
+        <p:nvSpPr>
+          <p:cNvPr id="16" name="Date Placeholder 15"/>
           <p:cNvSpPr>
             <a:spLocks noGrp="1"/>
           </p:cNvSpPr>
@@ -296,9 +290,10 @@
           <a:bodyPr/>
           <a:lstStyle/>
           <a:p>
-            <a:fld id="{E66BD9D4-BAB0-46F2-8832-33E39AEEB973}" type="datetimeFigureOut">
-              <a:rPr lang="en-US" smtClean="0"/>
-              <a:t>11/14/2010</a:t>
+            <a:fld id="{54AB02A5-4FE5-49D9-9E24-09F23B90C450}" type="datetimeFigureOut">
+              <a:rPr lang="en-US" smtClean="0"/>
+              <a:pPr/>
+              <a:t>11/15/10</a:t>
             </a:fld>
             <a:endParaRPr lang="en-US"/>
           </a:p>
@@ -306,7 +301,7 @@
       </p:sp>
       <p:sp>
         <p:nvSpPr>
-          <p:cNvPr id="5" name="Footer Placeholder 4"/>
+          <p:cNvPr id="2" name="Footer Placeholder 1"/>
           <p:cNvSpPr>
             <a:spLocks noGrp="1"/>
           </p:cNvSpPr>
@@ -319,13 +314,13 @@
           <a:bodyPr/>
           <a:lstStyle/>
           <a:p>
-            <a:endParaRPr lang="en-US"/>
-          </a:p>
-        </p:txBody>
-      </p:sp>
-      <p:sp>
-        <p:nvSpPr>
-          <p:cNvPr id="6" name="Slide Number Placeholder 5"/>
+            <a:endParaRPr kumimoji="0" lang="en-US"/>
+          </a:p>
+        </p:txBody>
+      </p:sp>
+      <p:sp>
+        <p:nvSpPr>
+          <p:cNvPr id="15" name="Slide Number Placeholder 14"/>
           <p:cNvSpPr>
             <a:spLocks noGrp="1"/>
           </p:cNvSpPr>
@@ -333,13 +328,19 @@
             <p:ph type="sldNum" sz="quarter" idx="12"/>
           </p:nvPr>
         </p:nvSpPr>
-        <p:spPr/>
-        <p:txBody>
-          <a:bodyPr/>
-          <a:lstStyle/>
-          <a:p>
-            <a:fld id="{69E9DD7A-50D3-45C5-8B37-BEF0B6D21075}" type="slidenum">
-              <a:rPr lang="en-US" smtClean="0"/>
+        <p:spPr>
+          <a:xfrm>
+            <a:off x="8229600" y="6473952"/>
+            <a:ext cx="758952" cy="246888"/>
+          </a:xfrm>
+        </p:spPr>
+        <p:txBody>
+          <a:bodyPr/>
+          <a:lstStyle/>
+          <a:p>
+            <a:fld id="{91AF2B4D-6B12-4EDF-87BB-2B55CECB6611}" type="slidenum">
+              <a:rPr lang="en-US" smtClean="0"/>
+              <a:pPr/>
               <a:t>‹#›</a:t>
             </a:fld>
             <a:endParaRPr lang="en-US"/>
@@ -355,7 +356,7 @@
 </file>
 
 <file path=ppt/slideLayouts/slideLayout10.xml><?xml version="1.0" encoding="utf-8"?>
-<p:sldLayout xmlns:a="http://schemas.openxmlformats.org/drawingml/2006/main" xmlns:r="http://schemas.openxmlformats.org/officeDocument/2006/relationships" xmlns:p="http://schemas.openxmlformats.org/presentationml/2006/main" type="vertTx" preserve="1">
+<p:sldLayout xmlns:a="http://schemas.openxmlformats.org/drawingml/2006/main" xmlns:r="http://schemas.openxmlformats.org/officeDocument/2006/relationships" xmlns:mc="http://schemas.openxmlformats.org/markup-compatibility/2006" xmlns:mv="urn:schemas-microsoft-com:mac:vml" xmlns:p="http://schemas.openxmlformats.org/presentationml/2006/main" mc:Ignorable="mv" mc:PreserveAttributes="mv:*" type="vertTx" preserve="1">
   <p:cSld name="Title and Vertical Text">
     <p:spTree>
       <p:nvGrpSpPr>
@@ -387,10 +388,10 @@
           <a:lstStyle/>
           <a:p>
             <a:r>
-              <a:rPr lang="en-US" smtClean="0"/>
+              <a:rPr kumimoji="0" lang="en-US" smtClean="0"/>
               <a:t>Click to edit Master title style</a:t>
             </a:r>
-            <a:endParaRPr lang="en-US"/>
+            <a:endParaRPr kumimoji="0" lang="en-US"/>
           </a:p>
         </p:txBody>
       </p:sp>
@@ -409,40 +410,40 @@
           <a:bodyPr vert="eaVert"/>
           <a:lstStyle/>
           <a:p>
-            <a:pPr lvl="0"/>
+            <a:pPr lvl="0" eaLnBrk="1" latinLnBrk="0" hangingPunct="1"/>
             <a:r>
               <a:rPr lang="en-US" smtClean="0"/>
               <a:t>Click to edit Master text styles</a:t>
             </a:r>
           </a:p>
           <a:p>
-            <a:pPr lvl="1"/>
+            <a:pPr lvl="1" eaLnBrk="1" latinLnBrk="0" hangingPunct="1"/>
             <a:r>
               <a:rPr lang="en-US" smtClean="0"/>
               <a:t>Second level</a:t>
             </a:r>
           </a:p>
           <a:p>
-            <a:pPr lvl="2"/>
+            <a:pPr lvl="2" eaLnBrk="1" latinLnBrk="0" hangingPunct="1"/>
             <a:r>
               <a:rPr lang="en-US" smtClean="0"/>
               <a:t>Third level</a:t>
             </a:r>
           </a:p>
           <a:p>
-            <a:pPr lvl="3"/>
+            <a:pPr lvl="3" eaLnBrk="1" latinLnBrk="0" hangingPunct="1"/>
             <a:r>
               <a:rPr lang="en-US" smtClean="0"/>
               <a:t>Fourth level</a:t>
             </a:r>
           </a:p>
           <a:p>
-            <a:pPr lvl="4"/>
+            <a:pPr lvl="4" eaLnBrk="1" latinLnBrk="0" hangingPunct="1"/>
             <a:r>
               <a:rPr lang="en-US" smtClean="0"/>
               <a:t>Fifth level</a:t>
             </a:r>
-            <a:endParaRPr lang="en-US"/>
+            <a:endParaRPr kumimoji="0" lang="en-US"/>
           </a:p>
         </p:txBody>
       </p:sp>
@@ -463,7 +464,8 @@
           <a:p>
             <a:fld id="{E66BD9D4-BAB0-46F2-8832-33E39AEEB973}" type="datetimeFigureOut">
               <a:rPr lang="en-US" smtClean="0"/>
-              <a:t>11/14/2010</a:t>
+              <a:pPr/>
+              <a:t>11/15/10</a:t>
             </a:fld>
             <a:endParaRPr lang="en-US"/>
           </a:p>
@@ -505,6 +507,7 @@
           <a:p>
             <a:fld id="{69E9DD7A-50D3-45C5-8B37-BEF0B6D21075}" type="slidenum">
               <a:rPr lang="en-US" smtClean="0"/>
+              <a:pPr/>
               <a:t>‹#›</a:t>
             </a:fld>
             <a:endParaRPr lang="en-US"/>
@@ -520,7 +523,7 @@
 </file>
 
 <file path=ppt/slideLayouts/slideLayout11.xml><?xml version="1.0" encoding="utf-8"?>
-<p:sldLayout xmlns:a="http://schemas.openxmlformats.org/drawingml/2006/main" xmlns:r="http://schemas.openxmlformats.org/officeDocument/2006/relationships" xmlns:p="http://schemas.openxmlformats.org/presentationml/2006/main" type="vertTitleAndTx" preserve="1">
+<p:sldLayout xmlns:a="http://schemas.openxmlformats.org/drawingml/2006/main" xmlns:r="http://schemas.openxmlformats.org/officeDocument/2006/relationships" xmlns:mc="http://schemas.openxmlformats.org/markup-compatibility/2006" xmlns:mv="urn:schemas-microsoft-com:mac:vml" xmlns:p="http://schemas.openxmlformats.org/presentationml/2006/main" mc:Ignorable="mv" mc:PreserveAttributes="mv:*" showMasterSp="0" type="vertTitleAndTx" preserve="1">
   <p:cSld name="Vertical Title and Text">
     <p:spTree>
       <p:nvGrpSpPr>
@@ -548,8 +551,8 @@
         </p:nvSpPr>
         <p:spPr>
           <a:xfrm>
-            <a:off x="6629400" y="274638"/>
-            <a:ext cx="2057400" cy="5851525"/>
+            <a:off x="6858000" y="549276"/>
+            <a:ext cx="1828800" cy="5851525"/>
           </a:xfrm>
         </p:spPr>
         <p:txBody>
@@ -557,10 +560,10 @@
           <a:lstStyle/>
           <a:p>
             <a:r>
-              <a:rPr lang="en-US" smtClean="0"/>
+              <a:rPr kumimoji="0" lang="en-US" smtClean="0"/>
               <a:t>Click to edit Master title style</a:t>
             </a:r>
-            <a:endParaRPr lang="en-US"/>
+            <a:endParaRPr kumimoji="0" lang="en-US"/>
           </a:p>
         </p:txBody>
       </p:sp>
@@ -576,48 +579,48 @@
         </p:nvSpPr>
         <p:spPr>
           <a:xfrm>
-            <a:off x="457200" y="274638"/>
-            <a:ext cx="6019800" cy="5851525"/>
+            <a:off x="457200" y="549276"/>
+            <a:ext cx="6248400" cy="5851525"/>
           </a:xfrm>
         </p:spPr>
         <p:txBody>
           <a:bodyPr vert="eaVert"/>
           <a:lstStyle/>
           <a:p>
-            <a:pPr lvl="0"/>
+            <a:pPr lvl="0" eaLnBrk="1" latinLnBrk="0" hangingPunct="1"/>
             <a:r>
               <a:rPr lang="en-US" smtClean="0"/>
               <a:t>Click to edit Master text styles</a:t>
             </a:r>
           </a:p>
           <a:p>
-            <a:pPr lvl="1"/>
+            <a:pPr lvl="1" eaLnBrk="1" latinLnBrk="0" hangingPunct="1"/>
             <a:r>
               <a:rPr lang="en-US" smtClean="0"/>
               <a:t>Second level</a:t>
             </a:r>
           </a:p>
           <a:p>
-            <a:pPr lvl="2"/>
+            <a:pPr lvl="2" eaLnBrk="1" latinLnBrk="0" hangingPunct="1"/>
             <a:r>
               <a:rPr lang="en-US" smtClean="0"/>
               <a:t>Third level</a:t>
             </a:r>
           </a:p>
           <a:p>
-            <a:pPr lvl="3"/>
+            <a:pPr lvl="3" eaLnBrk="1" latinLnBrk="0" hangingPunct="1"/>
             <a:r>
               <a:rPr lang="en-US" smtClean="0"/>
               <a:t>Fourth level</a:t>
             </a:r>
           </a:p>
           <a:p>
-            <a:pPr lvl="4"/>
+            <a:pPr lvl="4" eaLnBrk="1" latinLnBrk="0" hangingPunct="1"/>
             <a:r>
               <a:rPr lang="en-US" smtClean="0"/>
               <a:t>Fifth level</a:t>
             </a:r>
-            <a:endParaRPr lang="en-US"/>
+            <a:endParaRPr kumimoji="0" lang="en-US"/>
           </a:p>
         </p:txBody>
       </p:sp>
@@ -638,7 +641,8 @@
           <a:p>
             <a:fld id="{E66BD9D4-BAB0-46F2-8832-33E39AEEB973}" type="datetimeFigureOut">
               <a:rPr lang="en-US" smtClean="0"/>
-              <a:t>11/14/2010</a:t>
+              <a:pPr/>
+              <a:t>11/15/10</a:t>
             </a:fld>
             <a:endParaRPr lang="en-US"/>
           </a:p>
@@ -680,6 +684,7 @@
           <a:p>
             <a:fld id="{69E9DD7A-50D3-45C5-8B37-BEF0B6D21075}" type="slidenum">
               <a:rPr lang="en-US" smtClean="0"/>
+              <a:pPr/>
               <a:t>‹#›</a:t>
             </a:fld>
             <a:endParaRPr lang="en-US"/>
@@ -695,7 +700,7 @@
 </file>
 
 <file path=ppt/slideLayouts/slideLayout2.xml><?xml version="1.0" encoding="utf-8"?>
-<p:sldLayout xmlns:a="http://schemas.openxmlformats.org/drawingml/2006/main" xmlns:r="http://schemas.openxmlformats.org/officeDocument/2006/relationships" xmlns:p="http://schemas.openxmlformats.org/presentationml/2006/main" type="obj" preserve="1">
+<p:sldLayout xmlns:a="http://schemas.openxmlformats.org/drawingml/2006/main" xmlns:r="http://schemas.openxmlformats.org/officeDocument/2006/relationships" xmlns:mc="http://schemas.openxmlformats.org/markup-compatibility/2006" xmlns:mv="urn:schemas-microsoft-com:mac:vml" xmlns:p="http://schemas.openxmlformats.org/presentationml/2006/main" mc:Ignorable="mv" mc:PreserveAttributes="mv:*" type="obj" preserve="1">
   <p:cSld name="Title and Content">
     <p:spTree>
       <p:nvGrpSpPr>
@@ -713,7 +718,7 @@
       </p:grpSpPr>
       <p:sp>
         <p:nvSpPr>
-          <p:cNvPr id="2" name="Title 1"/>
+          <p:cNvPr id="22" name="Title 21"/>
           <p:cNvSpPr>
             <a:spLocks noGrp="1"/>
           </p:cNvSpPr>
@@ -727,16 +732,16 @@
           <a:lstStyle/>
           <a:p>
             <a:r>
-              <a:rPr lang="en-US" smtClean="0"/>
+              <a:rPr kumimoji="0" lang="en-US" smtClean="0"/>
               <a:t>Click to edit Master title style</a:t>
             </a:r>
-            <a:endParaRPr lang="en-US"/>
-          </a:p>
-        </p:txBody>
-      </p:sp>
-      <p:sp>
-        <p:nvSpPr>
-          <p:cNvPr id="3" name="Content Placeholder 2"/>
+            <a:endParaRPr kumimoji="0" lang="en-US"/>
+          </a:p>
+        </p:txBody>
+      </p:sp>
+      <p:sp>
+        <p:nvSpPr>
+          <p:cNvPr id="27" name="Content Placeholder 26"/>
           <p:cNvSpPr>
             <a:spLocks noGrp="1"/>
           </p:cNvSpPr>
@@ -749,46 +754,46 @@
           <a:bodyPr/>
           <a:lstStyle/>
           <a:p>
-            <a:pPr lvl="0"/>
+            <a:pPr lvl="0" eaLnBrk="1" latinLnBrk="0" hangingPunct="1"/>
             <a:r>
               <a:rPr lang="en-US" smtClean="0"/>
               <a:t>Click to edit Master text styles</a:t>
             </a:r>
           </a:p>
           <a:p>
-            <a:pPr lvl="1"/>
+            <a:pPr lvl="1" eaLnBrk="1" latinLnBrk="0" hangingPunct="1"/>
             <a:r>
               <a:rPr lang="en-US" smtClean="0"/>
               <a:t>Second level</a:t>
             </a:r>
           </a:p>
           <a:p>
-            <a:pPr lvl="2"/>
+            <a:pPr lvl="2" eaLnBrk="1" latinLnBrk="0" hangingPunct="1"/>
             <a:r>
               <a:rPr lang="en-US" smtClean="0"/>
               <a:t>Third level</a:t>
             </a:r>
           </a:p>
           <a:p>
-            <a:pPr lvl="3"/>
+            <a:pPr lvl="3" eaLnBrk="1" latinLnBrk="0" hangingPunct="1"/>
             <a:r>
               <a:rPr lang="en-US" smtClean="0"/>
               <a:t>Fourth level</a:t>
             </a:r>
           </a:p>
           <a:p>
-            <a:pPr lvl="4"/>
+            <a:pPr lvl="4" eaLnBrk="1" latinLnBrk="0" hangingPunct="1"/>
             <a:r>
               <a:rPr lang="en-US" smtClean="0"/>
               <a:t>Fifth level</a:t>
             </a:r>
-            <a:endParaRPr lang="en-US"/>
-          </a:p>
-        </p:txBody>
-      </p:sp>
-      <p:sp>
-        <p:nvSpPr>
-          <p:cNvPr id="4" name="Date Placeholder 3"/>
+            <a:endParaRPr kumimoji="0" lang="en-US"/>
+          </a:p>
+        </p:txBody>
+      </p:sp>
+      <p:sp>
+        <p:nvSpPr>
+          <p:cNvPr id="25" name="Date Placeholder 24"/>
           <p:cNvSpPr>
             <a:spLocks noGrp="1"/>
           </p:cNvSpPr>
@@ -803,7 +808,8 @@
           <a:p>
             <a:fld id="{E66BD9D4-BAB0-46F2-8832-33E39AEEB973}" type="datetimeFigureOut">
               <a:rPr lang="en-US" smtClean="0"/>
-              <a:t>11/14/2010</a:t>
+              <a:pPr/>
+              <a:t>11/15/10</a:t>
             </a:fld>
             <a:endParaRPr lang="en-US"/>
           </a:p>
@@ -811,7 +817,7 @@
       </p:sp>
       <p:sp>
         <p:nvSpPr>
-          <p:cNvPr id="5" name="Footer Placeholder 4"/>
+          <p:cNvPr id="19" name="Footer Placeholder 18"/>
           <p:cNvSpPr>
             <a:spLocks noGrp="1"/>
           </p:cNvSpPr>
@@ -819,7 +825,12 @@
             <p:ph type="ftr" sz="quarter" idx="11"/>
           </p:nvPr>
         </p:nvSpPr>
-        <p:spPr/>
+        <p:spPr>
+          <a:xfrm>
+            <a:off x="3581400" y="76200"/>
+            <a:ext cx="2895600" cy="288925"/>
+          </a:xfrm>
+        </p:spPr>
         <p:txBody>
           <a:bodyPr/>
           <a:lstStyle/>
@@ -830,7 +841,7 @@
       </p:sp>
       <p:sp>
         <p:nvSpPr>
-          <p:cNvPr id="6" name="Slide Number Placeholder 5"/>
+          <p:cNvPr id="16" name="Slide Number Placeholder 15"/>
           <p:cNvSpPr>
             <a:spLocks noGrp="1"/>
           </p:cNvSpPr>
@@ -838,13 +849,19 @@
             <p:ph type="sldNum" sz="quarter" idx="12"/>
           </p:nvPr>
         </p:nvSpPr>
-        <p:spPr/>
+        <p:spPr>
+          <a:xfrm>
+            <a:off x="8229600" y="6473952"/>
+            <a:ext cx="758952" cy="246888"/>
+          </a:xfrm>
+        </p:spPr>
         <p:txBody>
           <a:bodyPr/>
           <a:lstStyle/>
           <a:p>
             <a:fld id="{69E9DD7A-50D3-45C5-8B37-BEF0B6D21075}" type="slidenum">
               <a:rPr lang="en-US" smtClean="0"/>
+              <a:pPr/>
               <a:t>‹#›</a:t>
             </a:fld>
             <a:endParaRPr lang="en-US"/>
@@ -860,7 +877,7 @@
 </file>
 
 <file path=ppt/slideLayouts/slideLayout3.xml><?xml version="1.0" encoding="utf-8"?>
-<p:sldLayout xmlns:a="http://schemas.openxmlformats.org/drawingml/2006/main" xmlns:r="http://schemas.openxmlformats.org/officeDocument/2006/relationships" xmlns:p="http://schemas.openxmlformats.org/presentationml/2006/main" type="secHead" preserve="1">
+<p:sldLayout xmlns:a="http://schemas.openxmlformats.org/drawingml/2006/main" xmlns:r="http://schemas.openxmlformats.org/officeDocument/2006/relationships" xmlns:mc="http://schemas.openxmlformats.org/markup-compatibility/2006" xmlns:mv="urn:schemas-microsoft-com:mac:vml" xmlns:p="http://schemas.openxmlformats.org/presentationml/2006/main" mc:Ignorable="mv" mc:PreserveAttributes="mv:*" showMasterSp="0" type="secHead" preserve="1">
   <p:cSld name="Section Header">
     <p:spTree>
       <p:nvGrpSpPr>
@@ -878,66 +895,84 @@
       </p:grpSpPr>
       <p:sp>
         <p:nvSpPr>
-          <p:cNvPr id="2" name="Title 1"/>
-          <p:cNvSpPr>
-            <a:spLocks noGrp="1"/>
-          </p:cNvSpPr>
-          <p:nvPr>
-            <p:ph type="title"/>
+          <p:cNvPr id="7" name="Straight Connector 6"/>
+          <p:cNvSpPr>
+            <a:spLocks noChangeShapeType="1"/>
+          </p:cNvSpPr>
+          <p:nvPr/>
+        </p:nvSpPr>
+        <p:spPr bwMode="auto">
+          <a:xfrm>
+            <a:off x="514350" y="3444902"/>
+            <a:ext cx="8629650" cy="2381"/>
+          </a:xfrm>
+          <a:prstGeom prst="line">
+            <a:avLst/>
+          </a:prstGeom>
+          <a:noFill/>
+          <a:ln w="9525" cap="flat" cmpd="sng" algn="ctr">
+            <a:gradFill flip="none" rotWithShape="1">
+              <a:gsLst>
+                <a:gs pos="0">
+                  <a:schemeClr val="accent1">
+                    <a:alpha val="0"/>
+                  </a:schemeClr>
+                </a:gs>
+                <a:gs pos="17000">
+                  <a:schemeClr val="accent1"/>
+                </a:gs>
+                <a:gs pos="100000">
+                  <a:schemeClr val="accent1"/>
+                </a:gs>
+              </a:gsLst>
+              <a:lin ang="0" scaled="1"/>
+              <a:tileRect/>
+            </a:gradFill>
+            <a:prstDash val="solid"/>
+            <a:round/>
+            <a:headEnd type="none" w="med" len="med"/>
+            <a:tailEnd type="none" w="med" len="med"/>
+          </a:ln>
+          <a:effectLst/>
+        </p:spPr>
+        <p:txBody>
+          <a:bodyPr vert="horz" wrap="square" lIns="91440" tIns="45720" rIns="91440" bIns="45720" anchor="t" compatLnSpc="1"/>
+          <a:lstStyle/>
+          <a:p>
+            <a:endParaRPr kumimoji="0" lang="en-US"/>
+          </a:p>
+        </p:txBody>
+      </p:sp>
+      <p:sp>
+        <p:nvSpPr>
+          <p:cNvPr id="6" name="Text Placeholder 5"/>
+          <p:cNvSpPr>
+            <a:spLocks noGrp="1"/>
+          </p:cNvSpPr>
+          <p:nvPr>
+            <p:ph type="body" idx="1"/>
           </p:nvPr>
         </p:nvSpPr>
         <p:spPr>
           <a:xfrm>
-            <a:off x="722313" y="4406900"/>
-            <a:ext cx="7772400" cy="1362075"/>
+            <a:off x="381000" y="1676400"/>
+            <a:ext cx="8458200" cy="1219200"/>
           </a:xfrm>
         </p:spPr>
         <p:txBody>
-          <a:bodyPr anchor="t"/>
-          <a:lstStyle>
-            <a:lvl1pPr algn="l">
-              <a:defRPr sz="4000" b="1" cap="all"/>
-            </a:lvl1pPr>
-          </a:lstStyle>
-          <a:p>
-            <a:r>
-              <a:rPr lang="en-US" smtClean="0"/>
-              <a:t>Click to edit Master title style</a:t>
-            </a:r>
-            <a:endParaRPr lang="en-US"/>
-          </a:p>
-        </p:txBody>
-      </p:sp>
-      <p:sp>
-        <p:nvSpPr>
-          <p:cNvPr id="3" name="Text Placeholder 2"/>
-          <p:cNvSpPr>
-            <a:spLocks noGrp="1"/>
-          </p:cNvSpPr>
-          <p:nvPr>
-            <p:ph type="body" idx="1"/>
-          </p:nvPr>
-        </p:nvSpPr>
-        <p:spPr>
-          <a:xfrm>
-            <a:off x="722313" y="2906713"/>
-            <a:ext cx="7772400" cy="1500187"/>
-          </a:xfrm>
-        </p:spPr>
-        <p:txBody>
           <a:bodyPr anchor="b"/>
           <a:lstStyle>
-            <a:lvl1pPr marL="0" indent="0">
+            <a:lvl1pPr marL="0" indent="0" algn="r">
               <a:buNone/>
               <a:defRPr sz="2000">
                 <a:solidFill>
-                  <a:schemeClr val="tx1">
-                    <a:tint val="75000"/>
+                  <a:schemeClr val="tx2">
+                    <a:shade val="75000"/>
                   </a:schemeClr>
                 </a:solidFill>
               </a:defRPr>
             </a:lvl1pPr>
-            <a:lvl2pPr marL="457200" indent="0">
+            <a:lvl2pPr>
               <a:buNone/>
               <a:defRPr sz="1800">
                 <a:solidFill>
@@ -947,7 +982,7 @@
                 </a:solidFill>
               </a:defRPr>
             </a:lvl2pPr>
-            <a:lvl3pPr marL="914400" indent="0">
+            <a:lvl3pPr>
               <a:buNone/>
               <a:defRPr sz="1600">
                 <a:solidFill>
@@ -957,7 +992,7 @@
                 </a:solidFill>
               </a:defRPr>
             </a:lvl3pPr>
-            <a:lvl4pPr marL="1371600" indent="0">
+            <a:lvl4pPr>
               <a:buNone/>
               <a:defRPr sz="1400">
                 <a:solidFill>
@@ -967,7 +1002,7 @@
                 </a:solidFill>
               </a:defRPr>
             </a:lvl4pPr>
-            <a:lvl5pPr marL="1828800" indent="0">
+            <a:lvl5pPr>
               <a:buNone/>
               <a:defRPr sz="1400">
                 <a:solidFill>
@@ -977,51 +1012,11 @@
                 </a:solidFill>
               </a:defRPr>
             </a:lvl5pPr>
-            <a:lvl6pPr marL="2286000" indent="0">
-              <a:buNone/>
-              <a:defRPr sz="1400">
-                <a:solidFill>
-                  <a:schemeClr val="tx1">
-                    <a:tint val="75000"/>
-                  </a:schemeClr>
-                </a:solidFill>
-              </a:defRPr>
-            </a:lvl6pPr>
-            <a:lvl7pPr marL="2743200" indent="0">
-              <a:buNone/>
-              <a:defRPr sz="1400">
-                <a:solidFill>
-                  <a:schemeClr val="tx1">
-                    <a:tint val="75000"/>
-                  </a:schemeClr>
-                </a:solidFill>
-              </a:defRPr>
-            </a:lvl7pPr>
-            <a:lvl8pPr marL="3200400" indent="0">
-              <a:buNone/>
-              <a:defRPr sz="1400">
-                <a:solidFill>
-                  <a:schemeClr val="tx1">
-                    <a:tint val="75000"/>
-                  </a:schemeClr>
-                </a:solidFill>
-              </a:defRPr>
-            </a:lvl8pPr>
-            <a:lvl9pPr marL="3657600" indent="0">
-              <a:buNone/>
-              <a:defRPr sz="1400">
-                <a:solidFill>
-                  <a:schemeClr val="tx1">
-                    <a:tint val="75000"/>
-                  </a:schemeClr>
-                </a:solidFill>
-              </a:defRPr>
-            </a:lvl9pPr>
           </a:lstStyle>
           <a:p>
-            <a:pPr lvl="0"/>
-            <a:r>
-              <a:rPr lang="en-US" smtClean="0"/>
+            <a:pPr lvl="0" eaLnBrk="1" latinLnBrk="0" hangingPunct="1"/>
+            <a:r>
+              <a:rPr kumimoji="0" lang="en-US" smtClean="0"/>
               <a:t>Click to edit Master text styles</a:t>
             </a:r>
           </a:p>
@@ -1029,7 +1024,7 @@
       </p:sp>
       <p:sp>
         <p:nvSpPr>
-          <p:cNvPr id="4" name="Date Placeholder 3"/>
+          <p:cNvPr id="19" name="Date Placeholder 18"/>
           <p:cNvSpPr>
             <a:spLocks noGrp="1"/>
           </p:cNvSpPr>
@@ -1042,9 +1037,10 @@
           <a:bodyPr/>
           <a:lstStyle/>
           <a:p>
-            <a:fld id="{E66BD9D4-BAB0-46F2-8832-33E39AEEB973}" type="datetimeFigureOut">
-              <a:rPr lang="en-US" smtClean="0"/>
-              <a:t>11/14/2010</a:t>
+            <a:fld id="{C3F416CD-67A3-4CF0-A210-F6AF31AC147F}" type="datetimeFigureOut">
+              <a:rPr lang="en-US" smtClean="0"/>
+              <a:pPr/>
+              <a:t>11/15/10</a:t>
             </a:fld>
             <a:endParaRPr lang="en-US"/>
           </a:p>
@@ -1052,7 +1048,7 @@
       </p:sp>
       <p:sp>
         <p:nvSpPr>
-          <p:cNvPr id="5" name="Footer Placeholder 4"/>
+          <p:cNvPr id="11" name="Footer Placeholder 10"/>
           <p:cNvSpPr>
             <a:spLocks noGrp="1"/>
           </p:cNvSpPr>
@@ -1065,13 +1061,13 @@
           <a:bodyPr/>
           <a:lstStyle/>
           <a:p>
-            <a:endParaRPr lang="en-US"/>
-          </a:p>
-        </p:txBody>
-      </p:sp>
-      <p:sp>
-        <p:nvSpPr>
-          <p:cNvPr id="6" name="Slide Number Placeholder 5"/>
+            <a:endParaRPr kumimoji="0" lang="en-US"/>
+          </a:p>
+        </p:txBody>
+      </p:sp>
+      <p:sp>
+        <p:nvSpPr>
+          <p:cNvPr id="16" name="Slide Number Placeholder 15"/>
           <p:cNvSpPr>
             <a:spLocks noGrp="1"/>
           </p:cNvSpPr>
@@ -1084,11 +1080,44 @@
           <a:bodyPr/>
           <a:lstStyle/>
           <a:p>
-            <a:fld id="{69E9DD7A-50D3-45C5-8B37-BEF0B6D21075}" type="slidenum">
-              <a:rPr lang="en-US" smtClean="0"/>
+            <a:fld id="{96652B35-718D-4E28-AFEB-B694A3B357E8}" type="slidenum">
+              <a:rPr kumimoji="0" lang="en-US" smtClean="0"/>
+              <a:pPr/>
               <a:t>‹#›</a:t>
             </a:fld>
-            <a:endParaRPr lang="en-US"/>
+            <a:endParaRPr kumimoji="0" lang="en-US"/>
+          </a:p>
+        </p:txBody>
+      </p:sp>
+      <p:sp>
+        <p:nvSpPr>
+          <p:cNvPr id="8" name="Title 7"/>
+          <p:cNvSpPr>
+            <a:spLocks noGrp="1"/>
+          </p:cNvSpPr>
+          <p:nvPr>
+            <p:ph type="title"/>
+          </p:nvPr>
+        </p:nvSpPr>
+        <p:spPr>
+          <a:xfrm>
+            <a:off x="180475" y="2947085"/>
+            <a:ext cx="8686800" cy="1184825"/>
+          </a:xfrm>
+        </p:spPr>
+        <p:txBody>
+          <a:bodyPr rtlCol="0" anchor="t"/>
+          <a:lstStyle>
+            <a:lvl1pPr algn="r">
+              <a:defRPr/>
+            </a:lvl1pPr>
+          </a:lstStyle>
+          <a:p>
+            <a:r>
+              <a:rPr kumimoji="0" lang="en-US" smtClean="0"/>
+              <a:t>Click to edit Master title style</a:t>
+            </a:r>
+            <a:endParaRPr kumimoji="0" lang="en-US"/>
           </a:p>
         </p:txBody>
       </p:sp>
@@ -1101,7 +1130,7 @@
 </file>
 
 <file path=ppt/slideLayouts/slideLayout4.xml><?xml version="1.0" encoding="utf-8"?>
-<p:sldLayout xmlns:a="http://schemas.openxmlformats.org/drawingml/2006/main" xmlns:r="http://schemas.openxmlformats.org/officeDocument/2006/relationships" xmlns:p="http://schemas.openxmlformats.org/presentationml/2006/main" type="twoObj" preserve="1">
+<p:sldLayout xmlns:a="http://schemas.openxmlformats.org/drawingml/2006/main" xmlns:r="http://schemas.openxmlformats.org/officeDocument/2006/relationships" xmlns:mc="http://schemas.openxmlformats.org/markup-compatibility/2006" xmlns:mv="urn:schemas-microsoft-com:mac:vml" xmlns:p="http://schemas.openxmlformats.org/presentationml/2006/main" mc:Ignorable="mv" mc:PreserveAttributes="mv:*" type="twoObj" preserve="1">
   <p:cSld name="Two Content">
     <p:spTree>
       <p:nvGrpSpPr>
@@ -1119,41 +1148,46 @@
       </p:grpSpPr>
       <p:sp>
         <p:nvSpPr>
-          <p:cNvPr id="2" name="Title 1"/>
+          <p:cNvPr id="20" name="Title 19"/>
           <p:cNvSpPr>
             <a:spLocks noGrp="1"/>
           </p:cNvSpPr>
           <p:nvPr>
             <p:ph type="title"/>
-          </p:nvPr>
-        </p:nvSpPr>
-        <p:spPr/>
-        <p:txBody>
-          <a:bodyPr/>
-          <a:lstStyle/>
-          <a:p>
-            <a:r>
-              <a:rPr lang="en-US" smtClean="0"/>
-              <a:t>Click to edit Master title style</a:t>
-            </a:r>
-            <a:endParaRPr lang="en-US"/>
-          </a:p>
-        </p:txBody>
-      </p:sp>
-      <p:sp>
-        <p:nvSpPr>
-          <p:cNvPr id="3" name="Content Placeholder 2"/>
-          <p:cNvSpPr>
-            <a:spLocks noGrp="1"/>
-          </p:cNvSpPr>
-          <p:nvPr>
-            <p:ph sz="half" idx="1"/>
           </p:nvPr>
         </p:nvSpPr>
         <p:spPr>
           <a:xfrm>
-            <a:off x="457200" y="1600200"/>
-            <a:ext cx="4038600" cy="4525963"/>
+            <a:off x="301752" y="457200"/>
+            <a:ext cx="8686800" cy="841248"/>
+          </a:xfrm>
+        </p:spPr>
+        <p:txBody>
+          <a:bodyPr/>
+          <a:lstStyle/>
+          <a:p>
+            <a:r>
+              <a:rPr kumimoji="0" lang="en-US" smtClean="0"/>
+              <a:t>Click to edit Master title style</a:t>
+            </a:r>
+            <a:endParaRPr kumimoji="0" lang="en-US"/>
+          </a:p>
+        </p:txBody>
+      </p:sp>
+      <p:sp>
+        <p:nvSpPr>
+          <p:cNvPr id="14" name="Content Placeholder 13"/>
+          <p:cNvSpPr>
+            <a:spLocks noGrp="1"/>
+          </p:cNvSpPr>
+          <p:nvPr>
+            <p:ph sz="half" idx="1"/>
+          </p:nvPr>
+        </p:nvSpPr>
+        <p:spPr>
+          <a:xfrm>
+            <a:off x="304800" y="1600200"/>
+            <a:ext cx="4191000" cy="4724400"/>
           </a:xfrm>
         </p:spPr>
         <p:txBody>
@@ -1174,60 +1208,48 @@
             <a:lvl5pPr>
               <a:defRPr sz="1800"/>
             </a:lvl5pPr>
-            <a:lvl6pPr>
-              <a:defRPr sz="1800"/>
-            </a:lvl6pPr>
-            <a:lvl7pPr>
-              <a:defRPr sz="1800"/>
-            </a:lvl7pPr>
-            <a:lvl8pPr>
-              <a:defRPr sz="1800"/>
-            </a:lvl8pPr>
-            <a:lvl9pPr>
-              <a:defRPr sz="1800"/>
-            </a:lvl9pPr>
           </a:lstStyle>
           <a:p>
-            <a:pPr lvl="0"/>
+            <a:pPr lvl="0" eaLnBrk="1" latinLnBrk="0" hangingPunct="1"/>
             <a:r>
               <a:rPr lang="en-US" smtClean="0"/>
               <a:t>Click to edit Master text styles</a:t>
             </a:r>
           </a:p>
           <a:p>
-            <a:pPr lvl="1"/>
+            <a:pPr lvl="1" eaLnBrk="1" latinLnBrk="0" hangingPunct="1"/>
             <a:r>
               <a:rPr lang="en-US" smtClean="0"/>
               <a:t>Second level</a:t>
             </a:r>
           </a:p>
           <a:p>
-            <a:pPr lvl="2"/>
+            <a:pPr lvl="2" eaLnBrk="1" latinLnBrk="0" hangingPunct="1"/>
             <a:r>
               <a:rPr lang="en-US" smtClean="0"/>
               <a:t>Third level</a:t>
             </a:r>
           </a:p>
           <a:p>
-            <a:pPr lvl="3"/>
+            <a:pPr lvl="3" eaLnBrk="1" latinLnBrk="0" hangingPunct="1"/>
             <a:r>
               <a:rPr lang="en-US" smtClean="0"/>
               <a:t>Fourth level</a:t>
             </a:r>
           </a:p>
           <a:p>
-            <a:pPr lvl="4"/>
+            <a:pPr lvl="4" eaLnBrk="1" latinLnBrk="0" hangingPunct="1"/>
             <a:r>
               <a:rPr lang="en-US" smtClean="0"/>
               <a:t>Fifth level</a:t>
             </a:r>
-            <a:endParaRPr lang="en-US"/>
-          </a:p>
-        </p:txBody>
-      </p:sp>
-      <p:sp>
-        <p:nvSpPr>
-          <p:cNvPr id="4" name="Content Placeholder 3"/>
+            <a:endParaRPr kumimoji="0" lang="en-US"/>
+          </a:p>
+        </p:txBody>
+      </p:sp>
+      <p:sp>
+        <p:nvSpPr>
+          <p:cNvPr id="13" name="Content Placeholder 12"/>
           <p:cNvSpPr>
             <a:spLocks noGrp="1"/>
           </p:cNvSpPr>
@@ -1238,7 +1260,7 @@
         <p:spPr>
           <a:xfrm>
             <a:off x="4648200" y="1600200"/>
-            <a:ext cx="4038600" cy="4525963"/>
+            <a:ext cx="4343400" cy="4724400"/>
           </a:xfrm>
         </p:spPr>
         <p:txBody>
@@ -1259,60 +1281,48 @@
             <a:lvl5pPr>
               <a:defRPr sz="1800"/>
             </a:lvl5pPr>
-            <a:lvl6pPr>
-              <a:defRPr sz="1800"/>
-            </a:lvl6pPr>
-            <a:lvl7pPr>
-              <a:defRPr sz="1800"/>
-            </a:lvl7pPr>
-            <a:lvl8pPr>
-              <a:defRPr sz="1800"/>
-            </a:lvl8pPr>
-            <a:lvl9pPr>
-              <a:defRPr sz="1800"/>
-            </a:lvl9pPr>
           </a:lstStyle>
           <a:p>
-            <a:pPr lvl="0"/>
+            <a:pPr lvl="0" eaLnBrk="1" latinLnBrk="0" hangingPunct="1"/>
             <a:r>
               <a:rPr lang="en-US" smtClean="0"/>
               <a:t>Click to edit Master text styles</a:t>
             </a:r>
           </a:p>
           <a:p>
-            <a:pPr lvl="1"/>
+            <a:pPr lvl="1" eaLnBrk="1" latinLnBrk="0" hangingPunct="1"/>
             <a:r>
               <a:rPr lang="en-US" smtClean="0"/>
               <a:t>Second level</a:t>
             </a:r>
           </a:p>
           <a:p>
-            <a:pPr lvl="2"/>
+            <a:pPr lvl="2" eaLnBrk="1" latinLnBrk="0" hangingPunct="1"/>
             <a:r>
               <a:rPr lang="en-US" smtClean="0"/>
               <a:t>Third level</a:t>
             </a:r>
           </a:p>
           <a:p>
-            <a:pPr lvl="3"/>
+            <a:pPr lvl="3" eaLnBrk="1" latinLnBrk="0" hangingPunct="1"/>
             <a:r>
               <a:rPr lang="en-US" smtClean="0"/>
               <a:t>Fourth level</a:t>
             </a:r>
           </a:p>
           <a:p>
-            <a:pPr lvl="4"/>
+            <a:pPr lvl="4" eaLnBrk="1" latinLnBrk="0" hangingPunct="1"/>
             <a:r>
               <a:rPr lang="en-US" smtClean="0"/>
               <a:t>Fifth level</a:t>
             </a:r>
-            <a:endParaRPr lang="en-US"/>
-          </a:p>
-        </p:txBody>
-      </p:sp>
-      <p:sp>
-        <p:nvSpPr>
-          <p:cNvPr id="5" name="Date Placeholder 4"/>
+            <a:endParaRPr kumimoji="0" lang="en-US"/>
+          </a:p>
+        </p:txBody>
+      </p:sp>
+      <p:sp>
+        <p:nvSpPr>
+          <p:cNvPr id="21" name="Date Placeholder 20"/>
           <p:cNvSpPr>
             <a:spLocks noGrp="1"/>
           </p:cNvSpPr>
@@ -1327,7 +1337,8 @@
           <a:p>
             <a:fld id="{E66BD9D4-BAB0-46F2-8832-33E39AEEB973}" type="datetimeFigureOut">
               <a:rPr lang="en-US" smtClean="0"/>
-              <a:t>11/14/2010</a:t>
+              <a:pPr/>
+              <a:t>11/15/10</a:t>
             </a:fld>
             <a:endParaRPr lang="en-US"/>
           </a:p>
@@ -1335,7 +1346,7 @@
       </p:sp>
       <p:sp>
         <p:nvSpPr>
-          <p:cNvPr id="6" name="Footer Placeholder 5"/>
+          <p:cNvPr id="10" name="Footer Placeholder 9"/>
           <p:cNvSpPr>
             <a:spLocks noGrp="1"/>
           </p:cNvSpPr>
@@ -1354,7 +1365,7 @@
       </p:sp>
       <p:sp>
         <p:nvSpPr>
-          <p:cNvPr id="7" name="Slide Number Placeholder 6"/>
+          <p:cNvPr id="31" name="Slide Number Placeholder 30"/>
           <p:cNvSpPr>
             <a:spLocks noGrp="1"/>
           </p:cNvSpPr>
@@ -1369,6 +1380,7 @@
           <a:p>
             <a:fld id="{69E9DD7A-50D3-45C5-8B37-BEF0B6D21075}" type="slidenum">
               <a:rPr lang="en-US" smtClean="0"/>
+              <a:pPr/>
               <a:t>‹#›</a:t>
             </a:fld>
             <a:endParaRPr lang="en-US"/>
@@ -1384,7 +1396,7 @@
 </file>
 
 <file path=ppt/slideLayouts/slideLayout5.xml><?xml version="1.0" encoding="utf-8"?>
-<p:sldLayout xmlns:a="http://schemas.openxmlformats.org/drawingml/2006/main" xmlns:r="http://schemas.openxmlformats.org/officeDocument/2006/relationships" xmlns:p="http://schemas.openxmlformats.org/presentationml/2006/main" type="twoTxTwoObj" preserve="1">
+<p:sldLayout xmlns:a="http://schemas.openxmlformats.org/drawingml/2006/main" xmlns:r="http://schemas.openxmlformats.org/officeDocument/2006/relationships" xmlns:mc="http://schemas.openxmlformats.org/markup-compatibility/2006" xmlns:mv="urn:schemas-microsoft-com:mac:vml" xmlns:p="http://schemas.openxmlformats.org/presentationml/2006/main" mc:Ignorable="mv" mc:PreserveAttributes="mv:*" showMasterSp="0" type="twoTxTwoObj" preserve="1">
   <p:cSld name="Comparison">
     <p:spTree>
       <p:nvGrpSpPr>
@@ -1402,7 +1414,7 @@
       </p:grpSpPr>
       <p:sp>
         <p:nvSpPr>
-          <p:cNvPr id="2" name="Title 1"/>
+          <p:cNvPr id="29" name="Title 28"/>
           <p:cNvSpPr>
             <a:spLocks noGrp="1"/>
           </p:cNvSpPr>
@@ -1410,9 +1422,14 @@
             <p:ph type="title"/>
           </p:nvPr>
         </p:nvSpPr>
-        <p:spPr/>
-        <p:txBody>
-          <a:bodyPr/>
+        <p:spPr>
+          <a:xfrm>
+            <a:off x="304800" y="5410200"/>
+            <a:ext cx="8610600" cy="882650"/>
+          </a:xfrm>
+        </p:spPr>
+        <p:txBody>
+          <a:bodyPr anchor="ctr"/>
           <a:lstStyle>
             <a:lvl1pPr>
               <a:defRPr/>
@@ -1420,16 +1437,16 @@
           </a:lstStyle>
           <a:p>
             <a:r>
-              <a:rPr lang="en-US" smtClean="0"/>
+              <a:rPr kumimoji="0" lang="en-US" smtClean="0"/>
               <a:t>Click to edit Master title style</a:t>
             </a:r>
-            <a:endParaRPr lang="en-US"/>
-          </a:p>
-        </p:txBody>
-      </p:sp>
-      <p:sp>
-        <p:nvSpPr>
-          <p:cNvPr id="3" name="Text Placeholder 2"/>
+            <a:endParaRPr kumimoji="0" lang="en-US"/>
+          </a:p>
+        </p:txBody>
+      </p:sp>
+      <p:sp>
+        <p:nvSpPr>
+          <p:cNvPr id="13" name="Text Placeholder 12"/>
           <p:cNvSpPr>
             <a:spLocks noGrp="1"/>
           </p:cNvSpPr>
@@ -1439,54 +1456,105 @@
         </p:nvSpPr>
         <p:spPr>
           <a:xfrm>
-            <a:off x="457200" y="1535113"/>
-            <a:ext cx="4040188" cy="639762"/>
+            <a:off x="281444" y="666750"/>
+            <a:ext cx="4290556" cy="639762"/>
           </a:xfrm>
         </p:spPr>
         <p:txBody>
-          <a:bodyPr anchor="b"/>
+          <a:bodyPr anchor="ctr"/>
           <a:lstStyle>
             <a:lvl1pPr marL="0" indent="0">
               <a:buNone/>
-              <a:defRPr sz="2400" b="1"/>
+              <a:defRPr sz="1800" b="0" cap="all" baseline="0">
+                <a:solidFill>
+                  <a:schemeClr val="accent1">
+                    <a:shade val="50000"/>
+                  </a:schemeClr>
+                </a:solidFill>
+                <a:latin typeface="+mj-lt"/>
+                <a:ea typeface="+mj-ea"/>
+                <a:cs typeface="+mj-cs"/>
+              </a:defRPr>
             </a:lvl1pPr>
-            <a:lvl2pPr marL="457200" indent="0">
+            <a:lvl2pPr>
               <a:buNone/>
               <a:defRPr sz="2000" b="1"/>
             </a:lvl2pPr>
-            <a:lvl3pPr marL="914400" indent="0">
+            <a:lvl3pPr>
               <a:buNone/>
               <a:defRPr sz="1800" b="1"/>
             </a:lvl3pPr>
-            <a:lvl4pPr marL="1371600" indent="0">
+            <a:lvl4pPr>
               <a:buNone/>
               <a:defRPr sz="1600" b="1"/>
             </a:lvl4pPr>
-            <a:lvl5pPr marL="1828800" indent="0">
+            <a:lvl5pPr>
               <a:buNone/>
               <a:defRPr sz="1600" b="1"/>
             </a:lvl5pPr>
-            <a:lvl6pPr marL="2286000" indent="0">
+          </a:lstStyle>
+          <a:p>
+            <a:pPr lvl="0" eaLnBrk="1" latinLnBrk="0" hangingPunct="1"/>
+            <a:r>
+              <a:rPr kumimoji="0" lang="en-US" smtClean="0"/>
+              <a:t>Click to edit Master text styles</a:t>
+            </a:r>
+          </a:p>
+        </p:txBody>
+      </p:sp>
+      <p:sp>
+        <p:nvSpPr>
+          <p:cNvPr id="25" name="Text Placeholder 24"/>
+          <p:cNvSpPr>
+            <a:spLocks noGrp="1"/>
+          </p:cNvSpPr>
+          <p:nvPr>
+            <p:ph type="body" sz="half" idx="3"/>
+          </p:nvPr>
+        </p:nvSpPr>
+        <p:spPr>
+          <a:xfrm>
+            <a:off x="4645025" y="666750"/>
+            <a:ext cx="4292241" cy="639762"/>
+          </a:xfrm>
+        </p:spPr>
+        <p:txBody>
+          <a:bodyPr anchor="ctr"/>
+          <a:lstStyle>
+            <a:lvl1pPr marL="0" indent="0">
+              <a:buNone/>
+              <a:defRPr sz="1800" b="0" cap="all" baseline="0">
+                <a:solidFill>
+                  <a:schemeClr val="accent1">
+                    <a:shade val="50000"/>
+                  </a:schemeClr>
+                </a:solidFill>
+                <a:latin typeface="+mj-lt"/>
+                <a:ea typeface="+mj-ea"/>
+                <a:cs typeface="+mj-cs"/>
+              </a:defRPr>
+            </a:lvl1pPr>
+            <a:lvl2pPr>
+              <a:buNone/>
+              <a:defRPr sz="2000" b="1"/>
+            </a:lvl2pPr>
+            <a:lvl3pPr>
+              <a:buNone/>
+              <a:defRPr sz="1800" b="1"/>
+            </a:lvl3pPr>
+            <a:lvl4pPr>
               <a:buNone/>
               <a:defRPr sz="1600" b="1"/>
-            </a:lvl6pPr>
-            <a:lvl7pPr marL="2743200" indent="0">
+            </a:lvl4pPr>
+            <a:lvl5pPr>
               <a:buNone/>
               <a:defRPr sz="1600" b="1"/>
-            </a:lvl7pPr>
-            <a:lvl8pPr marL="3200400" indent="0">
-              <a:buNone/>
-              <a:defRPr sz="1600" b="1"/>
-            </a:lvl8pPr>
-            <a:lvl9pPr marL="3657600" indent="0">
-              <a:buNone/>
-              <a:defRPr sz="1600" b="1"/>
-            </a:lvl9pPr>
+            </a:lvl5pPr>
           </a:lstStyle>
           <a:p>
-            <a:pPr lvl="0"/>
-            <a:r>
-              <a:rPr lang="en-US" smtClean="0"/>
+            <a:pPr lvl="0" eaLnBrk="1" latinLnBrk="0" hangingPunct="1"/>
+            <a:r>
+              <a:rPr kumimoji="0" lang="en-US" smtClean="0"/>
               <a:t>Click to edit Master text styles</a:t>
             </a:r>
           </a:p>
@@ -1499,13 +1567,13 @@
             <a:spLocks noGrp="1"/>
           </p:cNvSpPr>
           <p:nvPr>
-            <p:ph sz="half" idx="2"/>
+            <p:ph sz="quarter" idx="2"/>
           </p:nvPr>
         </p:nvSpPr>
         <p:spPr>
           <a:xfrm>
-            <a:off x="457200" y="2174875"/>
-            <a:ext cx="4040188" cy="3951288"/>
+            <a:off x="281444" y="1316037"/>
+            <a:ext cx="4290556" cy="3941763"/>
           </a:xfrm>
         </p:spPr>
         <p:txBody>
@@ -1526,136 +1594,59 @@
             <a:lvl5pPr>
               <a:defRPr sz="1600"/>
             </a:lvl5pPr>
-            <a:lvl6pPr>
-              <a:defRPr sz="1600"/>
-            </a:lvl6pPr>
-            <a:lvl7pPr>
-              <a:defRPr sz="1600"/>
-            </a:lvl7pPr>
-            <a:lvl8pPr>
-              <a:defRPr sz="1600"/>
-            </a:lvl8pPr>
-            <a:lvl9pPr>
-              <a:defRPr sz="1600"/>
-            </a:lvl9pPr>
           </a:lstStyle>
           <a:p>
-            <a:pPr lvl="0"/>
+            <a:pPr lvl="0" eaLnBrk="1" latinLnBrk="0" hangingPunct="1"/>
             <a:r>
               <a:rPr lang="en-US" smtClean="0"/>
               <a:t>Click to edit Master text styles</a:t>
             </a:r>
           </a:p>
           <a:p>
-            <a:pPr lvl="1"/>
+            <a:pPr lvl="1" eaLnBrk="1" latinLnBrk="0" hangingPunct="1"/>
             <a:r>
               <a:rPr lang="en-US" smtClean="0"/>
               <a:t>Second level</a:t>
             </a:r>
           </a:p>
           <a:p>
-            <a:pPr lvl="2"/>
+            <a:pPr lvl="2" eaLnBrk="1" latinLnBrk="0" hangingPunct="1"/>
             <a:r>
               <a:rPr lang="en-US" smtClean="0"/>
               <a:t>Third level</a:t>
             </a:r>
           </a:p>
           <a:p>
-            <a:pPr lvl="3"/>
+            <a:pPr lvl="3" eaLnBrk="1" latinLnBrk="0" hangingPunct="1"/>
             <a:r>
               <a:rPr lang="en-US" smtClean="0"/>
               <a:t>Fourth level</a:t>
             </a:r>
           </a:p>
           <a:p>
-            <a:pPr lvl="4"/>
+            <a:pPr lvl="4" eaLnBrk="1" latinLnBrk="0" hangingPunct="1"/>
             <a:r>
               <a:rPr lang="en-US" smtClean="0"/>
               <a:t>Fifth level</a:t>
             </a:r>
-            <a:endParaRPr lang="en-US"/>
-          </a:p>
-        </p:txBody>
-      </p:sp>
-      <p:sp>
-        <p:nvSpPr>
-          <p:cNvPr id="5" name="Text Placeholder 4"/>
-          <p:cNvSpPr>
-            <a:spLocks noGrp="1"/>
-          </p:cNvSpPr>
-          <p:nvPr>
-            <p:ph type="body" sz="quarter" idx="3"/>
+            <a:endParaRPr kumimoji="0" lang="en-US"/>
+          </a:p>
+        </p:txBody>
+      </p:sp>
+      <p:sp>
+        <p:nvSpPr>
+          <p:cNvPr id="28" name="Content Placeholder 27"/>
+          <p:cNvSpPr>
+            <a:spLocks noGrp="1"/>
+          </p:cNvSpPr>
+          <p:nvPr>
+            <p:ph sz="quarter" idx="4"/>
           </p:nvPr>
         </p:nvSpPr>
         <p:spPr>
           <a:xfrm>
-            <a:off x="4645025" y="1535113"/>
-            <a:ext cx="4041775" cy="639762"/>
-          </a:xfrm>
-        </p:spPr>
-        <p:txBody>
-          <a:bodyPr anchor="b"/>
-          <a:lstStyle>
-            <a:lvl1pPr marL="0" indent="0">
-              <a:buNone/>
-              <a:defRPr sz="2400" b="1"/>
-            </a:lvl1pPr>
-            <a:lvl2pPr marL="457200" indent="0">
-              <a:buNone/>
-              <a:defRPr sz="2000" b="1"/>
-            </a:lvl2pPr>
-            <a:lvl3pPr marL="914400" indent="0">
-              <a:buNone/>
-              <a:defRPr sz="1800" b="1"/>
-            </a:lvl3pPr>
-            <a:lvl4pPr marL="1371600" indent="0">
-              <a:buNone/>
-              <a:defRPr sz="1600" b="1"/>
-            </a:lvl4pPr>
-            <a:lvl5pPr marL="1828800" indent="0">
-              <a:buNone/>
-              <a:defRPr sz="1600" b="1"/>
-            </a:lvl5pPr>
-            <a:lvl6pPr marL="2286000" indent="0">
-              <a:buNone/>
-              <a:defRPr sz="1600" b="1"/>
-            </a:lvl6pPr>
-            <a:lvl7pPr marL="2743200" indent="0">
-              <a:buNone/>
-              <a:defRPr sz="1600" b="1"/>
-            </a:lvl7pPr>
-            <a:lvl8pPr marL="3200400" indent="0">
-              <a:buNone/>
-              <a:defRPr sz="1600" b="1"/>
-            </a:lvl8pPr>
-            <a:lvl9pPr marL="3657600" indent="0">
-              <a:buNone/>
-              <a:defRPr sz="1600" b="1"/>
-            </a:lvl9pPr>
-          </a:lstStyle>
-          <a:p>
-            <a:pPr lvl="0"/>
-            <a:r>
-              <a:rPr lang="en-US" smtClean="0"/>
-              <a:t>Click to edit Master text styles</a:t>
-            </a:r>
-          </a:p>
-        </p:txBody>
-      </p:sp>
-      <p:sp>
-        <p:nvSpPr>
-          <p:cNvPr id="6" name="Content Placeholder 5"/>
-          <p:cNvSpPr>
-            <a:spLocks noGrp="1"/>
-          </p:cNvSpPr>
-          <p:nvPr>
-            <p:ph sz="quarter" idx="4"/>
-          </p:nvPr>
-        </p:nvSpPr>
-        <p:spPr>
-          <a:xfrm>
-            <a:off x="4645025" y="2174875"/>
-            <a:ext cx="4041775" cy="3951288"/>
+            <a:off x="4648730" y="1316037"/>
+            <a:ext cx="4288536" cy="3941763"/>
           </a:xfrm>
         </p:spPr>
         <p:txBody>
@@ -1676,60 +1667,48 @@
             <a:lvl5pPr>
               <a:defRPr sz="1600"/>
             </a:lvl5pPr>
-            <a:lvl6pPr>
-              <a:defRPr sz="1600"/>
-            </a:lvl6pPr>
-            <a:lvl7pPr>
-              <a:defRPr sz="1600"/>
-            </a:lvl7pPr>
-            <a:lvl8pPr>
-              <a:defRPr sz="1600"/>
-            </a:lvl8pPr>
-            <a:lvl9pPr>
-              <a:defRPr sz="1600"/>
-            </a:lvl9pPr>
           </a:lstStyle>
           <a:p>
-            <a:pPr lvl="0"/>
+            <a:pPr lvl="0" eaLnBrk="1" latinLnBrk="0" hangingPunct="1"/>
             <a:r>
               <a:rPr lang="en-US" smtClean="0"/>
               <a:t>Click to edit Master text styles</a:t>
             </a:r>
           </a:p>
           <a:p>
-            <a:pPr lvl="1"/>
+            <a:pPr lvl="1" eaLnBrk="1" latinLnBrk="0" hangingPunct="1"/>
             <a:r>
               <a:rPr lang="en-US" smtClean="0"/>
               <a:t>Second level</a:t>
             </a:r>
           </a:p>
           <a:p>
-            <a:pPr lvl="2"/>
+            <a:pPr lvl="2" eaLnBrk="1" latinLnBrk="0" hangingPunct="1"/>
             <a:r>
               <a:rPr lang="en-US" smtClean="0"/>
               <a:t>Third level</a:t>
             </a:r>
           </a:p>
           <a:p>
-            <a:pPr lvl="3"/>
+            <a:pPr lvl="3" eaLnBrk="1" latinLnBrk="0" hangingPunct="1"/>
             <a:r>
               <a:rPr lang="en-US" smtClean="0"/>
               <a:t>Fourth level</a:t>
             </a:r>
           </a:p>
           <a:p>
-            <a:pPr lvl="4"/>
+            <a:pPr lvl="4" eaLnBrk="1" latinLnBrk="0" hangingPunct="1"/>
             <a:r>
               <a:rPr lang="en-US" smtClean="0"/>
               <a:t>Fifth level</a:t>
             </a:r>
-            <a:endParaRPr lang="en-US"/>
-          </a:p>
-        </p:txBody>
-      </p:sp>
-      <p:sp>
-        <p:nvSpPr>
-          <p:cNvPr id="7" name="Date Placeholder 6"/>
+            <a:endParaRPr kumimoji="0" lang="en-US"/>
+          </a:p>
+        </p:txBody>
+      </p:sp>
+      <p:sp>
+        <p:nvSpPr>
+          <p:cNvPr id="10" name="Date Placeholder 9"/>
           <p:cNvSpPr>
             <a:spLocks noGrp="1"/>
           </p:cNvSpPr>
@@ -1744,7 +1723,8 @@
           <a:p>
             <a:fld id="{E66BD9D4-BAB0-46F2-8832-33E39AEEB973}" type="datetimeFigureOut">
               <a:rPr lang="en-US" smtClean="0"/>
-              <a:t>11/14/2010</a:t>
+              <a:pPr/>
+              <a:t>11/15/10</a:t>
             </a:fld>
             <a:endParaRPr lang="en-US"/>
           </a:p>
@@ -1752,7 +1732,7 @@
       </p:sp>
       <p:sp>
         <p:nvSpPr>
-          <p:cNvPr id="8" name="Footer Placeholder 7"/>
+          <p:cNvPr id="6" name="Footer Placeholder 5"/>
           <p:cNvSpPr>
             <a:spLocks noGrp="1"/>
           </p:cNvSpPr>
@@ -1771,7 +1751,7 @@
       </p:sp>
       <p:sp>
         <p:nvSpPr>
-          <p:cNvPr id="9" name="Slide Number Placeholder 8"/>
+          <p:cNvPr id="7" name="Slide Number Placeholder 6"/>
           <p:cNvSpPr>
             <a:spLocks noGrp="1"/>
           </p:cNvSpPr>
@@ -1779,16 +1759,72 @@
             <p:ph type="sldNum" sz="quarter" idx="12"/>
           </p:nvPr>
         </p:nvSpPr>
-        <p:spPr/>
+        <p:spPr>
+          <a:xfrm>
+            <a:off x="8229600" y="6477000"/>
+            <a:ext cx="762000" cy="246888"/>
+          </a:xfrm>
+        </p:spPr>
         <p:txBody>
           <a:bodyPr/>
           <a:lstStyle/>
           <a:p>
             <a:fld id="{69E9DD7A-50D3-45C5-8B37-BEF0B6D21075}" type="slidenum">
               <a:rPr lang="en-US" smtClean="0"/>
+              <a:pPr/>
               <a:t>‹#›</a:t>
             </a:fld>
             <a:endParaRPr lang="en-US"/>
+          </a:p>
+        </p:txBody>
+      </p:sp>
+      <p:sp>
+        <p:nvSpPr>
+          <p:cNvPr id="11" name="Straight Connector 10"/>
+          <p:cNvSpPr>
+            <a:spLocks noChangeShapeType="1"/>
+          </p:cNvSpPr>
+          <p:nvPr/>
+        </p:nvSpPr>
+        <p:spPr bwMode="auto">
+          <a:xfrm>
+            <a:off x="514350" y="6019800"/>
+            <a:ext cx="8629650" cy="2381"/>
+          </a:xfrm>
+          <a:prstGeom prst="line">
+            <a:avLst/>
+          </a:prstGeom>
+          <a:noFill/>
+          <a:ln w="9525" cap="flat" cmpd="sng" algn="ctr">
+            <a:gradFill flip="none" rotWithShape="1">
+              <a:gsLst>
+                <a:gs pos="0">
+                  <a:schemeClr val="accent1">
+                    <a:alpha val="0"/>
+                  </a:schemeClr>
+                </a:gs>
+                <a:gs pos="17000">
+                  <a:schemeClr val="accent1"/>
+                </a:gs>
+                <a:gs pos="100000">
+                  <a:schemeClr val="accent1"/>
+                </a:gs>
+              </a:gsLst>
+              <a:lin ang="0" scaled="1"/>
+              <a:tileRect/>
+            </a:gradFill>
+            <a:prstDash val="solid"/>
+            <a:round/>
+            <a:headEnd type="none" w="med" len="med"/>
+            <a:tailEnd type="none" w="med" len="med"/>
+          </a:ln>
+          <a:effectLst/>
+        </p:spPr>
+        <p:txBody>
+          <a:bodyPr vert="horz" wrap="square" lIns="91440" tIns="45720" rIns="91440" bIns="45720" anchor="t" compatLnSpc="1"/>
+          <a:lstStyle/>
+          <a:p>
+            <a:endParaRPr kumimoji="0" lang="en-US"/>
           </a:p>
         </p:txBody>
       </p:sp>
@@ -1801,7 +1837,7 @@
 </file>
 
 <file path=ppt/slideLayouts/slideLayout6.xml><?xml version="1.0" encoding="utf-8"?>
-<p:sldLayout xmlns:a="http://schemas.openxmlformats.org/drawingml/2006/main" xmlns:r="http://schemas.openxmlformats.org/officeDocument/2006/relationships" xmlns:p="http://schemas.openxmlformats.org/presentationml/2006/main" type="titleOnly" preserve="1">
+<p:sldLayout xmlns:a="http://schemas.openxmlformats.org/drawingml/2006/main" xmlns:r="http://schemas.openxmlformats.org/officeDocument/2006/relationships" xmlns:mc="http://schemas.openxmlformats.org/markup-compatibility/2006" xmlns:mv="urn:schemas-microsoft-com:mac:vml" xmlns:p="http://schemas.openxmlformats.org/presentationml/2006/main" mc:Ignorable="mv" mc:PreserveAttributes="mv:*" type="titleOnly" preserve="1">
   <p:cSld name="Title Only">
     <p:spTree>
       <p:nvGrpSpPr>
@@ -1819,7 +1855,7 @@
       </p:grpSpPr>
       <p:sp>
         <p:nvSpPr>
-          <p:cNvPr id="2" name="Title 1"/>
+          <p:cNvPr id="30" name="Title 29"/>
           <p:cNvSpPr>
             <a:spLocks noGrp="1"/>
           </p:cNvSpPr>
@@ -1827,22 +1863,27 @@
             <p:ph type="title"/>
           </p:nvPr>
         </p:nvSpPr>
-        <p:spPr/>
-        <p:txBody>
-          <a:bodyPr/>
-          <a:lstStyle/>
-          <a:p>
-            <a:r>
-              <a:rPr lang="en-US" smtClean="0"/>
+        <p:spPr>
+          <a:xfrm>
+            <a:off x="301752" y="457200"/>
+            <a:ext cx="8686800" cy="841248"/>
+          </a:xfrm>
+        </p:spPr>
+        <p:txBody>
+          <a:bodyPr/>
+          <a:lstStyle/>
+          <a:p>
+            <a:r>
+              <a:rPr kumimoji="0" lang="en-US" smtClean="0"/>
               <a:t>Click to edit Master title style</a:t>
             </a:r>
-            <a:endParaRPr lang="en-US"/>
-          </a:p>
-        </p:txBody>
-      </p:sp>
-      <p:sp>
-        <p:nvSpPr>
-          <p:cNvPr id="3" name="Date Placeholder 2"/>
+            <a:endParaRPr kumimoji="0" lang="en-US"/>
+          </a:p>
+        </p:txBody>
+      </p:sp>
+      <p:sp>
+        <p:nvSpPr>
+          <p:cNvPr id="12" name="Date Placeholder 11"/>
           <p:cNvSpPr>
             <a:spLocks noGrp="1"/>
           </p:cNvSpPr>
@@ -1857,7 +1898,8 @@
           <a:p>
             <a:fld id="{E66BD9D4-BAB0-46F2-8832-33E39AEEB973}" type="datetimeFigureOut">
               <a:rPr lang="en-US" smtClean="0"/>
-              <a:t>11/14/2010</a:t>
+              <a:pPr/>
+              <a:t>11/15/10</a:t>
             </a:fld>
             <a:endParaRPr lang="en-US"/>
           </a:p>
@@ -1865,7 +1907,7 @@
       </p:sp>
       <p:sp>
         <p:nvSpPr>
-          <p:cNvPr id="4" name="Footer Placeholder 3"/>
+          <p:cNvPr id="21" name="Footer Placeholder 20"/>
           <p:cNvSpPr>
             <a:spLocks noGrp="1"/>
           </p:cNvSpPr>
@@ -1884,7 +1926,7 @@
       </p:sp>
       <p:sp>
         <p:nvSpPr>
-          <p:cNvPr id="5" name="Slide Number Placeholder 4"/>
+          <p:cNvPr id="6" name="Slide Number Placeholder 5"/>
           <p:cNvSpPr>
             <a:spLocks noGrp="1"/>
           </p:cNvSpPr>
@@ -1899,6 +1941,7 @@
           <a:p>
             <a:fld id="{69E9DD7A-50D3-45C5-8B37-BEF0B6D21075}" type="slidenum">
               <a:rPr lang="en-US" smtClean="0"/>
+              <a:pPr/>
               <a:t>‹#›</a:t>
             </a:fld>
             <a:endParaRPr lang="en-US"/>
@@ -1914,7 +1957,7 @@
 </file>
 
 <file path=ppt/slideLayouts/slideLayout7.xml><?xml version="1.0" encoding="utf-8"?>
-<p:sldLayout xmlns:a="http://schemas.openxmlformats.org/drawingml/2006/main" xmlns:r="http://schemas.openxmlformats.org/officeDocument/2006/relationships" xmlns:p="http://schemas.openxmlformats.org/presentationml/2006/main" type="blank" preserve="1">
+<p:sldLayout xmlns:a="http://schemas.openxmlformats.org/drawingml/2006/main" xmlns:r="http://schemas.openxmlformats.org/officeDocument/2006/relationships" xmlns:mc="http://schemas.openxmlformats.org/markup-compatibility/2006" xmlns:mv="urn:schemas-microsoft-com:mac:vml" xmlns:p="http://schemas.openxmlformats.org/presentationml/2006/main" mc:Ignorable="mv" mc:PreserveAttributes="mv:*" showMasterSp="0" type="blank" preserve="1">
   <p:cSld name="Blank">
     <p:spTree>
       <p:nvGrpSpPr>
@@ -1932,7 +1975,7 @@
       </p:grpSpPr>
       <p:sp>
         <p:nvSpPr>
-          <p:cNvPr id="2" name="Date Placeholder 1"/>
+          <p:cNvPr id="3" name="Date Placeholder 2"/>
           <p:cNvSpPr>
             <a:spLocks noGrp="1"/>
           </p:cNvSpPr>
@@ -1947,7 +1990,8 @@
           <a:p>
             <a:fld id="{E66BD9D4-BAB0-46F2-8832-33E39AEEB973}" type="datetimeFigureOut">
               <a:rPr lang="en-US" smtClean="0"/>
-              <a:t>11/14/2010</a:t>
+              <a:pPr/>
+              <a:t>11/15/10</a:t>
             </a:fld>
             <a:endParaRPr lang="en-US"/>
           </a:p>
@@ -1955,7 +1999,7 @@
       </p:sp>
       <p:sp>
         <p:nvSpPr>
-          <p:cNvPr id="3" name="Footer Placeholder 2"/>
+          <p:cNvPr id="24" name="Footer Placeholder 23"/>
           <p:cNvSpPr>
             <a:spLocks noGrp="1"/>
           </p:cNvSpPr>
@@ -1974,7 +2018,7 @@
       </p:sp>
       <p:sp>
         <p:nvSpPr>
-          <p:cNvPr id="4" name="Slide Number Placeholder 3"/>
+          <p:cNvPr id="7" name="Slide Number Placeholder 6"/>
           <p:cNvSpPr>
             <a:spLocks noGrp="1"/>
           </p:cNvSpPr>
@@ -1989,6 +2033,7 @@
           <a:p>
             <a:fld id="{69E9DD7A-50D3-45C5-8B37-BEF0B6D21075}" type="slidenum">
               <a:rPr lang="en-US" smtClean="0"/>
+              <a:pPr/>
               <a:t>‹#›</a:t>
             </a:fld>
             <a:endParaRPr lang="en-US"/>
@@ -2004,7 +2049,7 @@
 </file>
 
 <file path=ppt/slideLayouts/slideLayout8.xml><?xml version="1.0" encoding="utf-8"?>
-<p:sldLayout xmlns:a="http://schemas.openxmlformats.org/drawingml/2006/main" xmlns:r="http://schemas.openxmlformats.org/officeDocument/2006/relationships" xmlns:p="http://schemas.openxmlformats.org/presentationml/2006/main" type="objTx" preserve="1">
+<p:sldLayout xmlns:a="http://schemas.openxmlformats.org/drawingml/2006/main" xmlns:r="http://schemas.openxmlformats.org/officeDocument/2006/relationships" xmlns:mc="http://schemas.openxmlformats.org/markup-compatibility/2006" xmlns:mv="urn:schemas-microsoft-com:mac:vml" xmlns:p="http://schemas.openxmlformats.org/presentationml/2006/main" mc:Ignorable="mv" mc:PreserveAttributes="mv:*" showMasterSp="0" type="objTx" preserve="1">
   <p:cSld name="Content with Caption">
     <p:spTree>
       <p:nvGrpSpPr>
@@ -2022,7 +2067,57 @@
       </p:grpSpPr>
       <p:sp>
         <p:nvSpPr>
-          <p:cNvPr id="2" name="Title 1"/>
+          <p:cNvPr id="8" name="Straight Connector 7"/>
+          <p:cNvSpPr>
+            <a:spLocks noChangeShapeType="1"/>
+          </p:cNvSpPr>
+          <p:nvPr/>
+        </p:nvSpPr>
+        <p:spPr bwMode="auto">
+          <a:xfrm>
+            <a:off x="514350" y="5849117"/>
+            <a:ext cx="8629650" cy="2381"/>
+          </a:xfrm>
+          <a:prstGeom prst="line">
+            <a:avLst/>
+          </a:prstGeom>
+          <a:noFill/>
+          <a:ln w="9525" cap="flat" cmpd="sng" algn="ctr">
+            <a:gradFill flip="none" rotWithShape="1">
+              <a:gsLst>
+                <a:gs pos="0">
+                  <a:schemeClr val="accent1">
+                    <a:alpha val="0"/>
+                  </a:schemeClr>
+                </a:gs>
+                <a:gs pos="17000">
+                  <a:schemeClr val="accent1"/>
+                </a:gs>
+                <a:gs pos="100000">
+                  <a:schemeClr val="accent1"/>
+                </a:gs>
+              </a:gsLst>
+              <a:lin ang="0" scaled="1"/>
+              <a:tileRect/>
+            </a:gradFill>
+            <a:prstDash val="solid"/>
+            <a:round/>
+            <a:headEnd type="none" w="med" len="med"/>
+            <a:tailEnd type="none" w="med" len="med"/>
+          </a:ln>
+          <a:effectLst/>
+        </p:spPr>
+        <p:txBody>
+          <a:bodyPr vert="horz" wrap="square" lIns="91440" tIns="45720" rIns="91440" bIns="45720" anchor="t" compatLnSpc="1"/>
+          <a:lstStyle/>
+          <a:p>
+            <a:endParaRPr kumimoji="0" lang="en-US"/>
+          </a:p>
+        </p:txBody>
+      </p:sp>
+      <p:sp>
+        <p:nvSpPr>
+          <p:cNvPr id="12" name="Title 11"/>
           <p:cNvSpPr>
             <a:spLocks noGrp="1"/>
           </p:cNvSpPr>
@@ -2032,40 +2127,90 @@
         </p:nvSpPr>
         <p:spPr>
           <a:xfrm>
-            <a:off x="457200" y="273050"/>
-            <a:ext cx="3008313" cy="1162050"/>
+            <a:off x="457200" y="5486400"/>
+            <a:ext cx="8458200" cy="520700"/>
           </a:xfrm>
         </p:spPr>
         <p:txBody>
-          <a:bodyPr anchor="b"/>
+          <a:bodyPr anchor="ctr"/>
           <a:lstStyle>
             <a:lvl1pPr algn="l">
+              <a:buNone/>
               <a:defRPr sz="2000" b="1"/>
             </a:lvl1pPr>
           </a:lstStyle>
           <a:p>
             <a:r>
-              <a:rPr lang="en-US" smtClean="0"/>
+              <a:rPr kumimoji="0" lang="en-US" smtClean="0"/>
               <a:t>Click to edit Master title style</a:t>
             </a:r>
-            <a:endParaRPr lang="en-US"/>
-          </a:p>
-        </p:txBody>
-      </p:sp>
-      <p:sp>
-        <p:nvSpPr>
-          <p:cNvPr id="3" name="Content Placeholder 2"/>
-          <p:cNvSpPr>
-            <a:spLocks noGrp="1"/>
-          </p:cNvSpPr>
-          <p:nvPr>
-            <p:ph idx="1"/>
+            <a:endParaRPr kumimoji="0" lang="en-US"/>
+          </a:p>
+        </p:txBody>
+      </p:sp>
+      <p:sp>
+        <p:nvSpPr>
+          <p:cNvPr id="26" name="Text Placeholder 25"/>
+          <p:cNvSpPr>
+            <a:spLocks noGrp="1"/>
+          </p:cNvSpPr>
+          <p:nvPr>
+            <p:ph type="body" idx="2"/>
           </p:nvPr>
         </p:nvSpPr>
         <p:spPr>
           <a:xfrm>
-            <a:off x="3575050" y="273050"/>
-            <a:ext cx="5111750" cy="5853113"/>
+            <a:off x="457200" y="609600"/>
+            <a:ext cx="3008313" cy="4800600"/>
+          </a:xfrm>
+        </p:spPr>
+        <p:txBody>
+          <a:bodyPr/>
+          <a:lstStyle>
+            <a:lvl1pPr marL="0" indent="0">
+              <a:buNone/>
+              <a:defRPr sz="1400"/>
+            </a:lvl1pPr>
+            <a:lvl2pPr>
+              <a:buNone/>
+              <a:defRPr sz="1200"/>
+            </a:lvl2pPr>
+            <a:lvl3pPr>
+              <a:buNone/>
+              <a:defRPr sz="1000"/>
+            </a:lvl3pPr>
+            <a:lvl4pPr>
+              <a:buNone/>
+              <a:defRPr sz="900"/>
+            </a:lvl4pPr>
+            <a:lvl5pPr>
+              <a:buNone/>
+              <a:defRPr sz="900"/>
+            </a:lvl5pPr>
+          </a:lstStyle>
+          <a:p>
+            <a:pPr lvl="0" eaLnBrk="1" latinLnBrk="0" hangingPunct="1"/>
+            <a:r>
+              <a:rPr kumimoji="0" lang="en-US" smtClean="0"/>
+              <a:t>Click to edit Master text styles</a:t>
+            </a:r>
+          </a:p>
+        </p:txBody>
+      </p:sp>
+      <p:sp>
+        <p:nvSpPr>
+          <p:cNvPr id="14" name="Content Placeholder 13"/>
+          <p:cNvSpPr>
+            <a:spLocks noGrp="1"/>
+          </p:cNvSpPr>
+          <p:nvPr>
+            <p:ph sz="half" idx="1"/>
+          </p:nvPr>
+        </p:nvSpPr>
+        <p:spPr>
+          <a:xfrm>
+            <a:off x="3575050" y="609600"/>
+            <a:ext cx="5340350" cy="4800600"/>
           </a:xfrm>
         </p:spPr>
         <p:txBody>
@@ -2086,125 +2231,48 @@
             <a:lvl5pPr>
               <a:defRPr sz="2000"/>
             </a:lvl5pPr>
-            <a:lvl6pPr>
-              <a:defRPr sz="2000"/>
-            </a:lvl6pPr>
-            <a:lvl7pPr>
-              <a:defRPr sz="2000"/>
-            </a:lvl7pPr>
-            <a:lvl8pPr>
-              <a:defRPr sz="2000"/>
-            </a:lvl8pPr>
-            <a:lvl9pPr>
-              <a:defRPr sz="2000"/>
-            </a:lvl9pPr>
           </a:lstStyle>
           <a:p>
-            <a:pPr lvl="0"/>
+            <a:pPr lvl="0" eaLnBrk="1" latinLnBrk="0" hangingPunct="1"/>
             <a:r>
               <a:rPr lang="en-US" smtClean="0"/>
               <a:t>Click to edit Master text styles</a:t>
             </a:r>
           </a:p>
           <a:p>
-            <a:pPr lvl="1"/>
+            <a:pPr lvl="1" eaLnBrk="1" latinLnBrk="0" hangingPunct="1"/>
             <a:r>
               <a:rPr lang="en-US" smtClean="0"/>
               <a:t>Second level</a:t>
             </a:r>
           </a:p>
           <a:p>
-            <a:pPr lvl="2"/>
+            <a:pPr lvl="2" eaLnBrk="1" latinLnBrk="0" hangingPunct="1"/>
             <a:r>
               <a:rPr lang="en-US" smtClean="0"/>
               <a:t>Third level</a:t>
             </a:r>
           </a:p>
           <a:p>
-            <a:pPr lvl="3"/>
+            <a:pPr lvl="3" eaLnBrk="1" latinLnBrk="0" hangingPunct="1"/>
             <a:r>
               <a:rPr lang="en-US" smtClean="0"/>
               <a:t>Fourth level</a:t>
             </a:r>
           </a:p>
           <a:p>
-            <a:pPr lvl="4"/>
+            <a:pPr lvl="4" eaLnBrk="1" latinLnBrk="0" hangingPunct="1"/>
             <a:r>
               <a:rPr lang="en-US" smtClean="0"/>
               <a:t>Fifth level</a:t>
             </a:r>
-            <a:endParaRPr lang="en-US"/>
-          </a:p>
-        </p:txBody>
-      </p:sp>
-      <p:sp>
-        <p:nvSpPr>
-          <p:cNvPr id="4" name="Text Placeholder 3"/>
-          <p:cNvSpPr>
-            <a:spLocks noGrp="1"/>
-          </p:cNvSpPr>
-          <p:nvPr>
-            <p:ph type="body" sz="half" idx="2"/>
-          </p:nvPr>
-        </p:nvSpPr>
-        <p:spPr>
-          <a:xfrm>
-            <a:off x="457200" y="1435100"/>
-            <a:ext cx="3008313" cy="4691063"/>
-          </a:xfrm>
-        </p:spPr>
-        <p:txBody>
-          <a:bodyPr/>
-          <a:lstStyle>
-            <a:lvl1pPr marL="0" indent="0">
-              <a:buNone/>
-              <a:defRPr sz="1400"/>
-            </a:lvl1pPr>
-            <a:lvl2pPr marL="457200" indent="0">
-              <a:buNone/>
-              <a:defRPr sz="1200"/>
-            </a:lvl2pPr>
-            <a:lvl3pPr marL="914400" indent="0">
-              <a:buNone/>
-              <a:defRPr sz="1000"/>
-            </a:lvl3pPr>
-            <a:lvl4pPr marL="1371600" indent="0">
-              <a:buNone/>
-              <a:defRPr sz="900"/>
-            </a:lvl4pPr>
-            <a:lvl5pPr marL="1828800" indent="0">
-              <a:buNone/>
-              <a:defRPr sz="900"/>
-            </a:lvl5pPr>
-            <a:lvl6pPr marL="2286000" indent="0">
-              <a:buNone/>
-              <a:defRPr sz="900"/>
-            </a:lvl6pPr>
-            <a:lvl7pPr marL="2743200" indent="0">
-              <a:buNone/>
-              <a:defRPr sz="900"/>
-            </a:lvl7pPr>
-            <a:lvl8pPr marL="3200400" indent="0">
-              <a:buNone/>
-              <a:defRPr sz="900"/>
-            </a:lvl8pPr>
-            <a:lvl9pPr marL="3657600" indent="0">
-              <a:buNone/>
-              <a:defRPr sz="900"/>
-            </a:lvl9pPr>
-          </a:lstStyle>
-          <a:p>
-            <a:pPr lvl="0"/>
-            <a:r>
-              <a:rPr lang="en-US" smtClean="0"/>
-              <a:t>Click to edit Master text styles</a:t>
-            </a:r>
-          </a:p>
-        </p:txBody>
-      </p:sp>
-      <p:sp>
-        <p:nvSpPr>
-          <p:cNvPr id="5" name="Date Placeholder 4"/>
+            <a:endParaRPr kumimoji="0" lang="en-US"/>
+          </a:p>
+        </p:txBody>
+      </p:sp>
+      <p:sp>
+        <p:nvSpPr>
+          <p:cNvPr id="25" name="Date Placeholder 24"/>
           <p:cNvSpPr>
             <a:spLocks noGrp="1"/>
           </p:cNvSpPr>
@@ -2219,7 +2287,8 @@
           <a:p>
             <a:fld id="{E66BD9D4-BAB0-46F2-8832-33E39AEEB973}" type="datetimeFigureOut">
               <a:rPr lang="en-US" smtClean="0"/>
-              <a:t>11/14/2010</a:t>
+              <a:pPr/>
+              <a:t>11/15/10</a:t>
             </a:fld>
             <a:endParaRPr lang="en-US"/>
           </a:p>
@@ -2227,7 +2296,7 @@
       </p:sp>
       <p:sp>
         <p:nvSpPr>
-          <p:cNvPr id="6" name="Footer Placeholder 5"/>
+          <p:cNvPr id="29" name="Footer Placeholder 28"/>
           <p:cNvSpPr>
             <a:spLocks noGrp="1"/>
           </p:cNvSpPr>
@@ -2259,11 +2328,12 @@
           <a:bodyPr/>
           <a:lstStyle/>
           <a:p>
-            <a:fld id="{69E9DD7A-50D3-45C5-8B37-BEF0B6D21075}" type="slidenum">
-              <a:rPr lang="en-US" smtClean="0"/>
+            <a:fld id="{69E29E33-B620-47F9-BB04-8846C2A5AFCC}" type="slidenum">
+              <a:rPr kumimoji="0" lang="en-US" smtClean="0"/>
+              <a:pPr/>
               <a:t>‹#›</a:t>
             </a:fld>
-            <a:endParaRPr lang="en-US"/>
+            <a:endParaRPr kumimoji="0" lang="en-US"/>
           </a:p>
         </p:txBody>
       </p:sp>
@@ -2276,7 +2346,7 @@
 </file>
 
 <file path=ppt/slideLayouts/slideLayout9.xml><?xml version="1.0" encoding="utf-8"?>
-<p:sldLayout xmlns:a="http://schemas.openxmlformats.org/drawingml/2006/main" xmlns:r="http://schemas.openxmlformats.org/officeDocument/2006/relationships" xmlns:p="http://schemas.openxmlformats.org/presentationml/2006/main" type="picTx" preserve="1">
+<p:sldLayout xmlns:a="http://schemas.openxmlformats.org/drawingml/2006/main" xmlns:r="http://schemas.openxmlformats.org/officeDocument/2006/relationships" xmlns:mc="http://schemas.openxmlformats.org/markup-compatibility/2006" xmlns:mv="urn:schemas-microsoft-com:mac:vml" xmlns:p="http://schemas.openxmlformats.org/presentationml/2006/main" mc:Ignorable="mv" mc:PreserveAttributes="mv:*" showMasterSp="0" type="picTx" preserve="1">
   <p:cSld name="Picture with Caption">
     <p:spTree>
       <p:nvGrpSpPr>
@@ -2294,51 +2364,30 @@
       </p:grpSpPr>
       <p:sp>
         <p:nvSpPr>
-          <p:cNvPr id="2" name="Title 1"/>
-          <p:cNvSpPr>
-            <a:spLocks noGrp="1"/>
-          </p:cNvSpPr>
-          <p:nvPr>
-            <p:ph type="title"/>
+          <p:cNvPr id="13" name="Picture Placeholder 12"/>
+          <p:cNvSpPr>
+            <a:spLocks noGrp="1"/>
+          </p:cNvSpPr>
+          <p:nvPr>
+            <p:ph type="pic" idx="1"/>
           </p:nvPr>
         </p:nvSpPr>
         <p:spPr>
           <a:xfrm>
-            <a:off x="1792288" y="4800600"/>
-            <a:ext cx="5486400" cy="566738"/>
+            <a:off x="3505200" y="616634"/>
+            <a:ext cx="5029200" cy="3657600"/>
           </a:xfrm>
-        </p:spPr>
-        <p:txBody>
-          <a:bodyPr anchor="b"/>
-          <a:lstStyle>
-            <a:lvl1pPr algn="l">
-              <a:defRPr sz="2000" b="1"/>
-            </a:lvl1pPr>
-          </a:lstStyle>
-          <a:p>
-            <a:r>
-              <a:rPr lang="en-US" smtClean="0"/>
-              <a:t>Click to edit Master title style</a:t>
-            </a:r>
-            <a:endParaRPr lang="en-US"/>
-          </a:p>
-        </p:txBody>
-      </p:sp>
-      <p:sp>
-        <p:nvSpPr>
-          <p:cNvPr id="3" name="Picture Placeholder 2"/>
-          <p:cNvSpPr>
-            <a:spLocks noGrp="1"/>
-          </p:cNvSpPr>
-          <p:nvPr>
-            <p:ph type="pic" idx="1"/>
-          </p:nvPr>
-        </p:nvSpPr>
-        <p:spPr>
-          <a:xfrm>
-            <a:off x="1792288" y="612775"/>
-            <a:ext cx="5486400" cy="4114800"/>
-          </a:xfrm>
+          <a:solidFill>
+            <a:schemeClr val="bg1"/>
+          </a:solidFill>
+          <a:ln w="6350">
+            <a:solidFill>
+              <a:schemeClr val="accent1"/>
+            </a:solidFill>
+          </a:ln>
+          <a:effectLst>
+            <a:reflection blurRad="1000" stA="49000" endA="500" endPos="10000" dist="900" dir="5400000" sy="-90000" algn="bl" rotWithShape="0"/>
+          </a:effectLst>
         </p:spPr>
         <p:txBody>
           <a:bodyPr/>
@@ -2347,171 +2396,158 @@
               <a:buNone/>
               <a:defRPr sz="3200"/>
             </a:lvl1pPr>
-            <a:lvl2pPr marL="457200" indent="0">
-              <a:buNone/>
-              <a:defRPr sz="2800"/>
-            </a:lvl2pPr>
-            <a:lvl3pPr marL="914400" indent="0">
-              <a:buNone/>
-              <a:defRPr sz="2400"/>
-            </a:lvl3pPr>
-            <a:lvl4pPr marL="1371600" indent="0">
-              <a:buNone/>
-              <a:defRPr sz="2000"/>
-            </a:lvl4pPr>
-            <a:lvl5pPr marL="1828800" indent="0">
-              <a:buNone/>
-              <a:defRPr sz="2000"/>
-            </a:lvl5pPr>
-            <a:lvl6pPr marL="2286000" indent="0">
-              <a:buNone/>
-              <a:defRPr sz="2000"/>
-            </a:lvl6pPr>
-            <a:lvl7pPr marL="2743200" indent="0">
-              <a:buNone/>
-              <a:defRPr sz="2000"/>
-            </a:lvl7pPr>
-            <a:lvl8pPr marL="3200400" indent="0">
-              <a:buNone/>
-              <a:defRPr sz="2000"/>
-            </a:lvl8pPr>
-            <a:lvl9pPr marL="3657600" indent="0">
-              <a:buNone/>
-              <a:defRPr sz="2000"/>
-            </a:lvl9pPr>
           </a:lstStyle>
           <a:p>
+            <a:r>
+              <a:rPr kumimoji="0" lang="en-US" smtClean="0"/>
+              <a:t>Click icon to add picture</a:t>
+            </a:r>
+            <a:endParaRPr kumimoji="0" lang="en-US" dirty="0"/>
+          </a:p>
+        </p:txBody>
+      </p:sp>
+      <p:sp>
+        <p:nvSpPr>
+          <p:cNvPr id="7" name="Date Placeholder 6"/>
+          <p:cNvSpPr>
+            <a:spLocks noGrp="1"/>
+          </p:cNvSpPr>
+          <p:nvPr>
+            <p:ph type="dt" sz="half" idx="10"/>
+          </p:nvPr>
+        </p:nvSpPr>
+        <p:spPr/>
+        <p:txBody>
+          <a:bodyPr/>
+          <a:lstStyle/>
+          <a:p>
+            <a:fld id="{E66BD9D4-BAB0-46F2-8832-33E39AEEB973}" type="datetimeFigureOut">
+              <a:rPr lang="en-US" smtClean="0"/>
+              <a:pPr/>
+              <a:t>11/15/10</a:t>
+            </a:fld>
             <a:endParaRPr lang="en-US"/>
           </a:p>
         </p:txBody>
       </p:sp>
       <p:sp>
         <p:nvSpPr>
-          <p:cNvPr id="4" name="Text Placeholder 3"/>
-          <p:cNvSpPr>
-            <a:spLocks noGrp="1"/>
-          </p:cNvSpPr>
-          <p:nvPr>
-            <p:ph type="body" sz="half" idx="2"/>
+          <p:cNvPr id="5" name="Footer Placeholder 4"/>
+          <p:cNvSpPr>
+            <a:spLocks noGrp="1"/>
+          </p:cNvSpPr>
+          <p:nvPr>
+            <p:ph type="ftr" sz="quarter" idx="11"/>
+          </p:nvPr>
+        </p:nvSpPr>
+        <p:spPr/>
+        <p:txBody>
+          <a:bodyPr/>
+          <a:lstStyle/>
+          <a:p>
+            <a:endParaRPr lang="en-US"/>
+          </a:p>
+        </p:txBody>
+      </p:sp>
+      <p:sp>
+        <p:nvSpPr>
+          <p:cNvPr id="31" name="Slide Number Placeholder 30"/>
+          <p:cNvSpPr>
+            <a:spLocks noGrp="1"/>
+          </p:cNvSpPr>
+          <p:nvPr>
+            <p:ph type="sldNum" sz="quarter" idx="12"/>
+          </p:nvPr>
+        </p:nvSpPr>
+        <p:spPr/>
+        <p:txBody>
+          <a:bodyPr/>
+          <a:lstStyle/>
+          <a:p>
+            <a:fld id="{69E9DD7A-50D3-45C5-8B37-BEF0B6D21075}" type="slidenum">
+              <a:rPr lang="en-US" smtClean="0"/>
+              <a:pPr/>
+              <a:t>‹#›</a:t>
+            </a:fld>
+            <a:endParaRPr lang="en-US"/>
+          </a:p>
+        </p:txBody>
+      </p:sp>
+      <p:sp>
+        <p:nvSpPr>
+          <p:cNvPr id="17" name="Title 16"/>
+          <p:cNvSpPr>
+            <a:spLocks noGrp="1"/>
+          </p:cNvSpPr>
+          <p:nvPr>
+            <p:ph type="title"/>
           </p:nvPr>
         </p:nvSpPr>
         <p:spPr>
           <a:xfrm>
-            <a:off x="1792288" y="5367338"/>
-            <a:ext cx="5486400" cy="804862"/>
+            <a:off x="381000" y="4993760"/>
+            <a:ext cx="5867400" cy="522288"/>
           </a:xfrm>
         </p:spPr>
         <p:txBody>
-          <a:bodyPr/>
+          <a:bodyPr anchor="ctr"/>
+          <a:lstStyle>
+            <a:lvl1pPr algn="l">
+              <a:buNone/>
+              <a:defRPr sz="2000" b="1"/>
+            </a:lvl1pPr>
+          </a:lstStyle>
+          <a:p>
+            <a:r>
+              <a:rPr kumimoji="0" lang="en-US" smtClean="0"/>
+              <a:t>Click to edit Master title style</a:t>
+            </a:r>
+            <a:endParaRPr kumimoji="0" lang="en-US"/>
+          </a:p>
+        </p:txBody>
+      </p:sp>
+      <p:sp>
+        <p:nvSpPr>
+          <p:cNvPr id="26" name="Text Placeholder 25"/>
+          <p:cNvSpPr>
+            <a:spLocks noGrp="1"/>
+          </p:cNvSpPr>
+          <p:nvPr>
+            <p:ph type="body" sz="half" idx="2"/>
+          </p:nvPr>
+        </p:nvSpPr>
+        <p:spPr>
+          <a:xfrm>
+            <a:off x="381000" y="5533218"/>
+            <a:ext cx="5867400" cy="768350"/>
+          </a:xfrm>
+        </p:spPr>
+        <p:txBody>
+          <a:bodyPr lIns="109728" tIns="0"/>
           <a:lstStyle>
             <a:lvl1pPr marL="0" indent="0">
               <a:buNone/>
               <a:defRPr sz="1400"/>
             </a:lvl1pPr>
-            <a:lvl2pPr marL="457200" indent="0">
-              <a:buNone/>
+            <a:lvl2pPr>
               <a:defRPr sz="1200"/>
             </a:lvl2pPr>
-            <a:lvl3pPr marL="914400" indent="0">
-              <a:buNone/>
+            <a:lvl3pPr>
               <a:defRPr sz="1000"/>
             </a:lvl3pPr>
-            <a:lvl4pPr marL="1371600" indent="0">
-              <a:buNone/>
+            <a:lvl4pPr>
               <a:defRPr sz="900"/>
             </a:lvl4pPr>
-            <a:lvl5pPr marL="1828800" indent="0">
-              <a:buNone/>
+            <a:lvl5pPr>
               <a:defRPr sz="900"/>
             </a:lvl5pPr>
-            <a:lvl6pPr marL="2286000" indent="0">
-              <a:buNone/>
-              <a:defRPr sz="900"/>
-            </a:lvl6pPr>
-            <a:lvl7pPr marL="2743200" indent="0">
-              <a:buNone/>
-              <a:defRPr sz="900"/>
-            </a:lvl7pPr>
-            <a:lvl8pPr marL="3200400" indent="0">
-              <a:buNone/>
-              <a:defRPr sz="900"/>
-            </a:lvl8pPr>
-            <a:lvl9pPr marL="3657600" indent="0">
-              <a:buNone/>
-              <a:defRPr sz="900"/>
-            </a:lvl9pPr>
           </a:lstStyle>
           <a:p>
-            <a:pPr lvl="0"/>
-            <a:r>
-              <a:rPr lang="en-US" smtClean="0"/>
+            <a:pPr lvl="0" eaLnBrk="1" latinLnBrk="0" hangingPunct="1"/>
+            <a:r>
+              <a:rPr kumimoji="0" lang="en-US" smtClean="0"/>
               <a:t>Click to edit Master text styles</a:t>
             </a:r>
-          </a:p>
-        </p:txBody>
-      </p:sp>
-      <p:sp>
-        <p:nvSpPr>
-          <p:cNvPr id="5" name="Date Placeholder 4"/>
-          <p:cNvSpPr>
-            <a:spLocks noGrp="1"/>
-          </p:cNvSpPr>
-          <p:nvPr>
-            <p:ph type="dt" sz="half" idx="10"/>
-          </p:nvPr>
-        </p:nvSpPr>
-        <p:spPr/>
-        <p:txBody>
-          <a:bodyPr/>
-          <a:lstStyle/>
-          <a:p>
-            <a:fld id="{E66BD9D4-BAB0-46F2-8832-33E39AEEB973}" type="datetimeFigureOut">
-              <a:rPr lang="en-US" smtClean="0"/>
-              <a:t>11/14/2010</a:t>
-            </a:fld>
-            <a:endParaRPr lang="en-US"/>
-          </a:p>
-        </p:txBody>
-      </p:sp>
-      <p:sp>
-        <p:nvSpPr>
-          <p:cNvPr id="6" name="Footer Placeholder 5"/>
-          <p:cNvSpPr>
-            <a:spLocks noGrp="1"/>
-          </p:cNvSpPr>
-          <p:nvPr>
-            <p:ph type="ftr" sz="quarter" idx="11"/>
-          </p:nvPr>
-        </p:nvSpPr>
-        <p:spPr/>
-        <p:txBody>
-          <a:bodyPr/>
-          <a:lstStyle/>
-          <a:p>
-            <a:endParaRPr lang="en-US"/>
-          </a:p>
-        </p:txBody>
-      </p:sp>
-      <p:sp>
-        <p:nvSpPr>
-          <p:cNvPr id="7" name="Slide Number Placeholder 6"/>
-          <p:cNvSpPr>
-            <a:spLocks noGrp="1"/>
-          </p:cNvSpPr>
-          <p:nvPr>
-            <p:ph type="sldNum" sz="quarter" idx="12"/>
-          </p:nvPr>
-        </p:nvSpPr>
-        <p:spPr/>
-        <p:txBody>
-          <a:bodyPr/>
-          <a:lstStyle/>
-          <a:p>
-            <a:fld id="{69E9DD7A-50D3-45C5-8B37-BEF0B6D21075}" type="slidenum">
-              <a:rPr lang="en-US" smtClean="0"/>
-              <a:t>‹#›</a:t>
-            </a:fld>
-            <a:endParaRPr lang="en-US"/>
           </a:p>
         </p:txBody>
       </p:sp>
@@ -2524,10 +2560,10 @@
 </file>
 
 <file path=ppt/slideMasters/slideMaster1.xml><?xml version="1.0" encoding="utf-8"?>
-<p:sldMaster xmlns:a="http://schemas.openxmlformats.org/drawingml/2006/main" xmlns:r="http://schemas.openxmlformats.org/officeDocument/2006/relationships" xmlns:p="http://schemas.openxmlformats.org/presentationml/2006/main">
+<p:sldMaster xmlns:a="http://schemas.openxmlformats.org/drawingml/2006/main" xmlns:r="http://schemas.openxmlformats.org/officeDocument/2006/relationships" xmlns:mc="http://schemas.openxmlformats.org/markup-compatibility/2006" xmlns:mv="urn:schemas-microsoft-com:mac:vml" xmlns:p="http://schemas.openxmlformats.org/presentationml/2006/main" mc:Ignorable="mv" mc:PreserveAttributes="mv:*">
   <p:cSld>
     <p:bg>
-      <p:bgRef idx="1001">
+      <p:bgRef idx="1003">
         <a:schemeClr val="bg1"/>
       </p:bgRef>
     </p:bg>
@@ -2547,215 +2583,367 @@
       </p:grpSpPr>
       <p:sp>
         <p:nvSpPr>
-          <p:cNvPr id="2" name="Title Placeholder 1"/>
-          <p:cNvSpPr>
-            <a:spLocks noGrp="1"/>
-          </p:cNvSpPr>
-          <p:nvPr>
-            <p:ph type="title"/>
+          <p:cNvPr id="7" name="Straight Connector 6"/>
+          <p:cNvSpPr>
+            <a:spLocks noChangeShapeType="1"/>
+          </p:cNvSpPr>
+          <p:nvPr/>
+        </p:nvSpPr>
+        <p:spPr bwMode="auto">
+          <a:xfrm>
+            <a:off x="514350" y="1050898"/>
+            <a:ext cx="8629650" cy="2381"/>
+          </a:xfrm>
+          <a:prstGeom prst="line">
+            <a:avLst/>
+          </a:prstGeom>
+          <a:noFill/>
+          <a:ln w="9525" cap="flat" cmpd="sng" algn="ctr">
+            <a:gradFill flip="none" rotWithShape="1">
+              <a:gsLst>
+                <a:gs pos="0">
+                  <a:schemeClr val="accent1">
+                    <a:alpha val="0"/>
+                  </a:schemeClr>
+                </a:gs>
+                <a:gs pos="17000">
+                  <a:schemeClr val="accent1"/>
+                </a:gs>
+                <a:gs pos="100000">
+                  <a:schemeClr val="accent1"/>
+                </a:gs>
+              </a:gsLst>
+              <a:lin ang="0" scaled="1"/>
+              <a:tileRect/>
+            </a:gradFill>
+            <a:prstDash val="solid"/>
+            <a:round/>
+            <a:headEnd type="none" w="med" len="med"/>
+            <a:tailEnd type="none" w="med" len="med"/>
+          </a:ln>
+          <a:effectLst/>
+        </p:spPr>
+        <p:txBody>
+          <a:bodyPr vert="horz" wrap="square" lIns="91440" tIns="45720" rIns="91440" bIns="45720" anchor="t" compatLnSpc="1"/>
+          <a:lstStyle/>
+          <a:p>
+            <a:endParaRPr kumimoji="0" lang="en-US"/>
+          </a:p>
+        </p:txBody>
+      </p:sp>
+      <p:sp>
+        <p:nvSpPr>
+          <p:cNvPr id="8" name="Text Placeholder 7"/>
+          <p:cNvSpPr>
+            <a:spLocks noGrp="1"/>
+          </p:cNvSpPr>
+          <p:nvPr>
+            <p:ph type="body" idx="1"/>
           </p:nvPr>
         </p:nvSpPr>
         <p:spPr>
           <a:xfrm>
-            <a:off x="457200" y="274638"/>
-            <a:ext cx="8229600" cy="1143000"/>
+            <a:off x="304800" y="1554162"/>
+            <a:ext cx="8686800" cy="4525963"/>
           </a:xfrm>
           <a:prstGeom prst="rect">
             <a:avLst/>
           </a:prstGeom>
         </p:spPr>
         <p:txBody>
-          <a:bodyPr vert="horz" lIns="91440" tIns="45720" rIns="91440" bIns="45720" rtlCol="0" anchor="ctr">
+          <a:bodyPr vert="horz">
             <a:normAutofit/>
           </a:bodyPr>
           <a:lstStyle/>
           <a:p>
-            <a:r>
-              <a:rPr lang="en-US" smtClean="0"/>
-              <a:t>Click to edit Master title style</a:t>
-            </a:r>
-            <a:endParaRPr lang="en-US"/>
-          </a:p>
-        </p:txBody>
-      </p:sp>
-      <p:sp>
-        <p:nvSpPr>
-          <p:cNvPr id="3" name="Text Placeholder 2"/>
-          <p:cNvSpPr>
-            <a:spLocks noGrp="1"/>
-          </p:cNvSpPr>
-          <p:nvPr>
-            <p:ph type="body" idx="1"/>
+            <a:pPr lvl="0" eaLnBrk="1" latinLnBrk="0" hangingPunct="1"/>
+            <a:r>
+              <a:rPr kumimoji="0" lang="en-US" smtClean="0"/>
+              <a:t>Click to edit Master text styles</a:t>
+            </a:r>
+          </a:p>
+          <a:p>
+            <a:pPr lvl="1" eaLnBrk="1" latinLnBrk="0" hangingPunct="1"/>
+            <a:r>
+              <a:rPr kumimoji="0" lang="en-US" smtClean="0"/>
+              <a:t>Second level</a:t>
+            </a:r>
+          </a:p>
+          <a:p>
+            <a:pPr lvl="2" eaLnBrk="1" latinLnBrk="0" hangingPunct="1"/>
+            <a:r>
+              <a:rPr kumimoji="0" lang="en-US" smtClean="0"/>
+              <a:t>Third level</a:t>
+            </a:r>
+          </a:p>
+          <a:p>
+            <a:pPr lvl="3" eaLnBrk="1" latinLnBrk="0" hangingPunct="1"/>
+            <a:r>
+              <a:rPr kumimoji="0" lang="en-US" smtClean="0"/>
+              <a:t>Fourth level</a:t>
+            </a:r>
+          </a:p>
+          <a:p>
+            <a:pPr lvl="4" eaLnBrk="1" latinLnBrk="0" hangingPunct="1"/>
+            <a:r>
+              <a:rPr kumimoji="0" lang="en-US" smtClean="0"/>
+              <a:t>Fifth level</a:t>
+            </a:r>
+            <a:endParaRPr kumimoji="0" lang="en-US"/>
+          </a:p>
+        </p:txBody>
+      </p:sp>
+      <p:sp>
+        <p:nvSpPr>
+          <p:cNvPr id="11" name="Date Placeholder 10"/>
+          <p:cNvSpPr>
+            <a:spLocks noGrp="1"/>
+          </p:cNvSpPr>
+          <p:nvPr>
+            <p:ph type="dt" sz="half" idx="2"/>
           </p:nvPr>
         </p:nvSpPr>
         <p:spPr>
           <a:xfrm>
-            <a:off x="457200" y="1600200"/>
-            <a:ext cx="8229600" cy="4525963"/>
+            <a:off x="6477000" y="76200"/>
+            <a:ext cx="2514600" cy="288925"/>
           </a:xfrm>
           <a:prstGeom prst="rect">
             <a:avLst/>
           </a:prstGeom>
         </p:spPr>
         <p:txBody>
-          <a:bodyPr vert="horz" lIns="91440" tIns="45720" rIns="91440" bIns="45720" rtlCol="0">
-            <a:normAutofit/>
-          </a:bodyPr>
-          <a:lstStyle/>
-          <a:p>
-            <a:pPr lvl="0"/>
-            <a:r>
-              <a:rPr lang="en-US" smtClean="0"/>
-              <a:t>Click to edit Master text styles</a:t>
-            </a:r>
-          </a:p>
-          <a:p>
-            <a:pPr lvl="1"/>
-            <a:r>
-              <a:rPr lang="en-US" smtClean="0"/>
-              <a:t>Second level</a:t>
-            </a:r>
-          </a:p>
-          <a:p>
-            <a:pPr lvl="2"/>
-            <a:r>
-              <a:rPr lang="en-US" smtClean="0"/>
-              <a:t>Third level</a:t>
-            </a:r>
-          </a:p>
-          <a:p>
-            <a:pPr lvl="3"/>
-            <a:r>
-              <a:rPr lang="en-US" smtClean="0"/>
-              <a:t>Fourth level</a:t>
-            </a:r>
-          </a:p>
-          <a:p>
-            <a:pPr lvl="4"/>
-            <a:r>
-              <a:rPr lang="en-US" smtClean="0"/>
-              <a:t>Fifth level</a:t>
-            </a:r>
+          <a:bodyPr vert="horz"/>
+          <a:lstStyle>
+            <a:lvl1pPr algn="l" eaLnBrk="1" latinLnBrk="0" hangingPunct="1">
+              <a:defRPr kumimoji="0" sz="1200">
+                <a:solidFill>
+                  <a:schemeClr val="accent1">
+                    <a:shade val="75000"/>
+                  </a:schemeClr>
+                </a:solidFill>
+              </a:defRPr>
+            </a:lvl1pPr>
+          </a:lstStyle>
+          <a:p>
+            <a:fld id="{E66BD9D4-BAB0-46F2-8832-33E39AEEB973}" type="datetimeFigureOut">
+              <a:rPr lang="en-US" smtClean="0"/>
+              <a:pPr/>
+              <a:t>11/15/10</a:t>
+            </a:fld>
             <a:endParaRPr lang="en-US"/>
           </a:p>
         </p:txBody>
       </p:sp>
       <p:sp>
         <p:nvSpPr>
-          <p:cNvPr id="4" name="Date Placeholder 3"/>
-          <p:cNvSpPr>
-            <a:spLocks noGrp="1"/>
-          </p:cNvSpPr>
-          <p:nvPr>
-            <p:ph type="dt" sz="half" idx="2"/>
+          <p:cNvPr id="28" name="Footer Placeholder 27"/>
+          <p:cNvSpPr>
+            <a:spLocks noGrp="1"/>
+          </p:cNvSpPr>
+          <p:nvPr>
+            <p:ph type="ftr" sz="quarter" idx="3"/>
           </p:nvPr>
         </p:nvSpPr>
         <p:spPr>
           <a:xfrm>
-            <a:off x="457200" y="6356350"/>
-            <a:ext cx="2133600" cy="365125"/>
+            <a:off x="3124200" y="76200"/>
+            <a:ext cx="3352800" cy="288925"/>
           </a:xfrm>
           <a:prstGeom prst="rect">
             <a:avLst/>
           </a:prstGeom>
         </p:spPr>
         <p:txBody>
-          <a:bodyPr vert="horz" lIns="91440" tIns="45720" rIns="91440" bIns="45720" rtlCol="0" anchor="ctr"/>
+          <a:bodyPr vert="horz"/>
           <a:lstStyle>
-            <a:lvl1pPr algn="l">
-              <a:defRPr sz="1200">
+            <a:lvl1pPr algn="r" eaLnBrk="1" latinLnBrk="0" hangingPunct="1">
+              <a:defRPr kumimoji="0" sz="1200">
                 <a:solidFill>
-                  <a:schemeClr val="tx1">
-                    <a:tint val="75000"/>
+                  <a:schemeClr val="accent1">
+                    <a:shade val="75000"/>
                   </a:schemeClr>
                 </a:solidFill>
               </a:defRPr>
             </a:lvl1pPr>
           </a:lstStyle>
           <a:p>
-            <a:fld id="{E66BD9D4-BAB0-46F2-8832-33E39AEEB973}" type="datetimeFigureOut">
-              <a:rPr lang="en-US" smtClean="0"/>
-              <a:t>11/14/2010</a:t>
-            </a:fld>
             <a:endParaRPr lang="en-US"/>
           </a:p>
         </p:txBody>
       </p:sp>
       <p:sp>
         <p:nvSpPr>
-          <p:cNvPr id="5" name="Footer Placeholder 4"/>
-          <p:cNvSpPr>
-            <a:spLocks noGrp="1"/>
-          </p:cNvSpPr>
-          <p:nvPr>
-            <p:ph type="ftr" sz="quarter" idx="3"/>
+          <p:cNvPr id="5" name="Slide Number Placeholder 4"/>
+          <p:cNvSpPr>
+            <a:spLocks noGrp="1"/>
+          </p:cNvSpPr>
+          <p:nvPr>
+            <p:ph type="sldNum" sz="quarter" idx="4"/>
           </p:nvPr>
         </p:nvSpPr>
         <p:spPr>
           <a:xfrm>
-            <a:off x="3124200" y="6356350"/>
-            <a:ext cx="2895600" cy="365125"/>
+            <a:off x="8229600" y="6477000"/>
+            <a:ext cx="762000" cy="244475"/>
           </a:xfrm>
           <a:prstGeom prst="rect">
             <a:avLst/>
           </a:prstGeom>
         </p:spPr>
         <p:txBody>
-          <a:bodyPr vert="horz" lIns="91440" tIns="45720" rIns="91440" bIns="45720" rtlCol="0" anchor="ctr"/>
+          <a:bodyPr vert="horz"/>
           <a:lstStyle>
-            <a:lvl1pPr algn="ctr">
-              <a:defRPr sz="1200">
+            <a:lvl1pPr algn="r" eaLnBrk="1" latinLnBrk="0" hangingPunct="1">
+              <a:defRPr kumimoji="0" sz="1200">
                 <a:solidFill>
-                  <a:schemeClr val="tx1">
-                    <a:tint val="75000"/>
+                  <a:schemeClr val="accent1">
+                    <a:shade val="75000"/>
                   </a:schemeClr>
                 </a:solidFill>
               </a:defRPr>
             </a:lvl1pPr>
           </a:lstStyle>
           <a:p>
+            <a:fld id="{69E9DD7A-50D3-45C5-8B37-BEF0B6D21075}" type="slidenum">
+              <a:rPr lang="en-US" smtClean="0"/>
+              <a:pPr/>
+              <a:t>‹#›</a:t>
+            </a:fld>
             <a:endParaRPr lang="en-US"/>
           </a:p>
         </p:txBody>
       </p:sp>
       <p:sp>
         <p:nvSpPr>
-          <p:cNvPr id="6" name="Slide Number Placeholder 5"/>
-          <p:cNvSpPr>
-            <a:spLocks noGrp="1"/>
-          </p:cNvSpPr>
-          <p:nvPr>
-            <p:ph type="sldNum" sz="quarter" idx="4"/>
+          <p:cNvPr id="10" name="Title Placeholder 9"/>
+          <p:cNvSpPr>
+            <a:spLocks noGrp="1"/>
+          </p:cNvSpPr>
+          <p:nvPr>
+            <p:ph type="title"/>
           </p:nvPr>
         </p:nvSpPr>
         <p:spPr>
           <a:xfrm>
-            <a:off x="6553200" y="6356350"/>
-            <a:ext cx="2133600" cy="365125"/>
+            <a:off x="304800" y="457200"/>
+            <a:ext cx="8686800" cy="838200"/>
           </a:xfrm>
           <a:prstGeom prst="rect">
             <a:avLst/>
           </a:prstGeom>
         </p:spPr>
         <p:txBody>
-          <a:bodyPr vert="horz" lIns="91440" tIns="45720" rIns="91440" bIns="45720" rtlCol="0" anchor="ctr"/>
-          <a:lstStyle>
-            <a:lvl1pPr algn="r">
-              <a:defRPr sz="1200">
-                <a:solidFill>
-                  <a:schemeClr val="tx1">
-                    <a:tint val="75000"/>
+          <a:bodyPr vert="horz" anchor="ctr">
+            <a:normAutofit/>
+          </a:bodyPr>
+          <a:lstStyle/>
+          <a:p>
+            <a:r>
+              <a:rPr kumimoji="0" lang="en-US" smtClean="0"/>
+              <a:t>Click to edit Master title style</a:t>
+            </a:r>
+            <a:endParaRPr kumimoji="0" lang="en-US"/>
+          </a:p>
+        </p:txBody>
+      </p:sp>
+      <p:sp>
+        <p:nvSpPr>
+          <p:cNvPr id="9" name="Straight Connector 8"/>
+          <p:cNvSpPr>
+            <a:spLocks noChangeShapeType="1"/>
+          </p:cNvSpPr>
+          <p:nvPr/>
+        </p:nvSpPr>
+        <p:spPr bwMode="auto">
+          <a:xfrm>
+            <a:off x="514350" y="1050898"/>
+            <a:ext cx="8629650" cy="2381"/>
+          </a:xfrm>
+          <a:prstGeom prst="line">
+            <a:avLst/>
+          </a:prstGeom>
+          <a:noFill/>
+          <a:ln w="9525" cap="flat" cmpd="sng" algn="ctr">
+            <a:gradFill flip="none" rotWithShape="1">
+              <a:gsLst>
+                <a:gs pos="0">
+                  <a:schemeClr val="accent1">
+                    <a:alpha val="0"/>
                   </a:schemeClr>
-                </a:solidFill>
-              </a:defRPr>
-            </a:lvl1pPr>
-          </a:lstStyle>
-          <a:p>
-            <a:fld id="{69E9DD7A-50D3-45C5-8B37-BEF0B6D21075}" type="slidenum">
-              <a:rPr lang="en-US" smtClean="0"/>
-              <a:t>‹#›</a:t>
-            </a:fld>
-            <a:endParaRPr lang="en-US"/>
+                </a:gs>
+                <a:gs pos="17000">
+                  <a:schemeClr val="accent1"/>
+                </a:gs>
+                <a:gs pos="100000">
+                  <a:schemeClr val="accent1"/>
+                </a:gs>
+              </a:gsLst>
+              <a:lin ang="0" scaled="1"/>
+              <a:tileRect/>
+            </a:gradFill>
+            <a:prstDash val="solid"/>
+            <a:round/>
+            <a:headEnd type="none" w="med" len="med"/>
+            <a:tailEnd type="none" w="med" len="med"/>
+          </a:ln>
+          <a:effectLst/>
+        </p:spPr>
+        <p:txBody>
+          <a:bodyPr vert="horz" wrap="square" lIns="91440" tIns="45720" rIns="91440" bIns="45720" anchor="t" compatLnSpc="1"/>
+          <a:lstStyle/>
+          <a:p>
+            <a:endParaRPr kumimoji="0" lang="en-US"/>
+          </a:p>
+        </p:txBody>
+      </p:sp>
+      <p:sp>
+        <p:nvSpPr>
+          <p:cNvPr id="12" name="Straight Connector 11"/>
+          <p:cNvSpPr>
+            <a:spLocks noChangeShapeType="1"/>
+          </p:cNvSpPr>
+          <p:nvPr/>
+        </p:nvSpPr>
+        <p:spPr bwMode="auto">
+          <a:xfrm>
+            <a:off x="514350" y="1057986"/>
+            <a:ext cx="8629650" cy="2381"/>
+          </a:xfrm>
+          <a:prstGeom prst="line">
+            <a:avLst/>
+          </a:prstGeom>
+          <a:noFill/>
+          <a:ln w="9525" cap="flat" cmpd="sng" algn="ctr">
+            <a:gradFill flip="none" rotWithShape="1">
+              <a:gsLst>
+                <a:gs pos="0">
+                  <a:schemeClr val="accent1">
+                    <a:alpha val="0"/>
+                  </a:schemeClr>
+                </a:gs>
+                <a:gs pos="17000">
+                  <a:schemeClr val="accent1"/>
+                </a:gs>
+                <a:gs pos="100000">
+                  <a:schemeClr val="accent1"/>
+                </a:gs>
+              </a:gsLst>
+              <a:lin ang="0" scaled="1"/>
+              <a:tileRect/>
+            </a:gradFill>
+            <a:prstDash val="solid"/>
+            <a:round/>
+            <a:headEnd type="none" w="med" len="med"/>
+            <a:tailEnd type="none" w="med" len="med"/>
+          </a:ln>
+          <a:effectLst/>
+        </p:spPr>
+        <p:txBody>
+          <a:bodyPr vert="horz" wrap="square" lIns="91440" tIns="45720" rIns="91440" bIns="45720" anchor="t" compatLnSpc="1"/>
+          <a:lstStyle/>
+          <a:p>
+            <a:endParaRPr kumimoji="0" lang="en-US"/>
           </a:p>
         </p:txBody>
       </p:sp>
@@ -2763,29 +2951,32 @@
   </p:cSld>
   <p:clrMap bg1="lt1" tx1="dk1" bg2="lt2" tx2="dk2" accent1="accent1" accent2="accent2" accent3="accent3" accent4="accent4" accent5="accent5" accent6="accent6" hlink="hlink" folHlink="folHlink"/>
   <p:sldLayoutIdLst>
-    <p:sldLayoutId id="2147483649" r:id="rId1"/>
-    <p:sldLayoutId id="2147483650" r:id="rId2"/>
-    <p:sldLayoutId id="2147483651" r:id="rId3"/>
-    <p:sldLayoutId id="2147483652" r:id="rId4"/>
-    <p:sldLayoutId id="2147483653" r:id="rId5"/>
-    <p:sldLayoutId id="2147483654" r:id="rId6"/>
-    <p:sldLayoutId id="2147483655" r:id="rId7"/>
-    <p:sldLayoutId id="2147483656" r:id="rId8"/>
-    <p:sldLayoutId id="2147483657" r:id="rId9"/>
-    <p:sldLayoutId id="2147483658" r:id="rId10"/>
-    <p:sldLayoutId id="2147483659" r:id="rId11"/>
+    <p:sldLayoutId id="2147484488" r:id="rId1"/>
+    <p:sldLayoutId id="2147484489" r:id="rId2"/>
+    <p:sldLayoutId id="2147484490" r:id="rId3"/>
+    <p:sldLayoutId id="2147484491" r:id="rId4"/>
+    <p:sldLayoutId id="2147484492" r:id="rId5"/>
+    <p:sldLayoutId id="2147484493" r:id="rId6"/>
+    <p:sldLayoutId id="2147484494" r:id="rId7"/>
+    <p:sldLayoutId id="2147484495" r:id="rId8"/>
+    <p:sldLayoutId id="2147484496" r:id="rId9"/>
+    <p:sldLayoutId id="2147484497" r:id="rId10"/>
+    <p:sldLayoutId id="2147484498" r:id="rId11"/>
   </p:sldLayoutIdLst>
   <p:txStyles>
     <p:titleStyle>
-      <a:lvl1pPr algn="ctr" defTabSz="914400" rtl="0" eaLnBrk="1" latinLnBrk="0" hangingPunct="1">
+      <a:lvl1pPr algn="l" rtl="0" eaLnBrk="1" latinLnBrk="0" hangingPunct="1">
         <a:spcBef>
           <a:spcPct val="0"/>
         </a:spcBef>
         <a:buNone/>
-        <a:defRPr sz="4400" kern="1200">
+        <a:defRPr kumimoji="0" sz="3600" kern="1200" cap="all" baseline="0">
           <a:solidFill>
-            <a:schemeClr val="tx1"/>
+            <a:schemeClr val="tx2"/>
           </a:solidFill>
+          <a:effectLst>
+            <a:reflection blurRad="12700" stA="48000" endA="300" endPos="55000" dir="5400000" sy="-90000" algn="bl" rotWithShape="0"/>
+          </a:effectLst>
           <a:latin typeface="+mj-lt"/>
           <a:ea typeface="+mj-ea"/>
           <a:cs typeface="+mj-cs"/>
@@ -2793,13 +2984,181 @@
       </a:lvl1pPr>
     </p:titleStyle>
     <p:bodyStyle>
-      <a:lvl1pPr marL="342900" indent="-342900" algn="l" defTabSz="914400" rtl="0" eaLnBrk="1" latinLnBrk="0" hangingPunct="1">
+      <a:lvl1pPr marL="342900" indent="-342900" algn="l" rtl="0" eaLnBrk="1" latinLnBrk="0" hangingPunct="1">
         <a:spcBef>
           <a:spcPct val="20000"/>
         </a:spcBef>
-        <a:buFont typeface="Arial" pitchFamily="34" charset="0"/>
-        <a:buChar char="•"/>
-        <a:defRPr sz="3200" kern="1200">
+        <a:buClr>
+          <a:schemeClr val="accent1"/>
+        </a:buClr>
+        <a:buSzPct val="70000"/>
+        <a:buFont typeface="Wingdings 2"/>
+        <a:buChar char=""/>
+        <a:defRPr kumimoji="0" sz="3200" kern="1200">
+          <a:solidFill>
+            <a:schemeClr val="tx2"/>
+          </a:solidFill>
+          <a:latin typeface="+mn-lt"/>
+          <a:ea typeface="+mn-ea"/>
+          <a:cs typeface="+mn-cs"/>
+        </a:defRPr>
+      </a:lvl1pPr>
+      <a:lvl2pPr marL="742950" indent="-285750" algn="l" rtl="0" eaLnBrk="1" latinLnBrk="0" hangingPunct="1">
+        <a:spcBef>
+          <a:spcPct val="20000"/>
+        </a:spcBef>
+        <a:buClr>
+          <a:schemeClr val="accent1"/>
+        </a:buClr>
+        <a:buSzPct val="70000"/>
+        <a:buFont typeface="Wingdings 2"/>
+        <a:buChar char=""/>
+        <a:defRPr kumimoji="0" sz="2800" kern="1200">
+          <a:solidFill>
+            <a:schemeClr val="tx2"/>
+          </a:solidFill>
+          <a:latin typeface="+mn-lt"/>
+          <a:ea typeface="+mn-ea"/>
+          <a:cs typeface="+mn-cs"/>
+        </a:defRPr>
+      </a:lvl2pPr>
+      <a:lvl3pPr marL="1143000" indent="-228600" algn="l" rtl="0" eaLnBrk="1" latinLnBrk="0" hangingPunct="1">
+        <a:spcBef>
+          <a:spcPct val="20000"/>
+        </a:spcBef>
+        <a:buClr>
+          <a:schemeClr val="accent1"/>
+        </a:buClr>
+        <a:buSzPct val="70000"/>
+        <a:buFont typeface="Wingdings 2"/>
+        <a:buChar char=""/>
+        <a:defRPr kumimoji="0" sz="2400" kern="1200">
+          <a:solidFill>
+            <a:schemeClr val="tx2"/>
+          </a:solidFill>
+          <a:latin typeface="+mn-lt"/>
+          <a:ea typeface="+mn-ea"/>
+          <a:cs typeface="+mn-cs"/>
+        </a:defRPr>
+      </a:lvl3pPr>
+      <a:lvl4pPr marL="1600200" indent="-228600" algn="l" rtl="0" eaLnBrk="1" latinLnBrk="0" hangingPunct="1">
+        <a:spcBef>
+          <a:spcPct val="20000"/>
+        </a:spcBef>
+        <a:buClr>
+          <a:schemeClr val="accent1"/>
+        </a:buClr>
+        <a:buSzPct val="70000"/>
+        <a:buFont typeface="Wingdings 2"/>
+        <a:buChar char=""/>
+        <a:defRPr kumimoji="0" sz="2000" kern="1200">
+          <a:solidFill>
+            <a:schemeClr val="tx2"/>
+          </a:solidFill>
+          <a:latin typeface="+mn-lt"/>
+          <a:ea typeface="+mn-ea"/>
+          <a:cs typeface="+mn-cs"/>
+        </a:defRPr>
+      </a:lvl4pPr>
+      <a:lvl5pPr marL="2057400" indent="-228600" algn="l" rtl="0" eaLnBrk="1" latinLnBrk="0" hangingPunct="1">
+        <a:spcBef>
+          <a:spcPct val="20000"/>
+        </a:spcBef>
+        <a:buClr>
+          <a:schemeClr val="accent1"/>
+        </a:buClr>
+        <a:buSzPct val="60000"/>
+        <a:buFont typeface="Wingdings 2"/>
+        <a:buChar char=""/>
+        <a:defRPr kumimoji="0" sz="1800" kern="1200">
+          <a:solidFill>
+            <a:schemeClr val="tx2"/>
+          </a:solidFill>
+          <a:latin typeface="+mn-lt"/>
+          <a:ea typeface="+mn-ea"/>
+          <a:cs typeface="+mn-cs"/>
+        </a:defRPr>
+      </a:lvl5pPr>
+      <a:lvl6pPr marL="2514600" indent="-228600" algn="l" rtl="0" eaLnBrk="1" latinLnBrk="0" hangingPunct="1">
+        <a:spcBef>
+          <a:spcPct val="20000"/>
+        </a:spcBef>
+        <a:buClr>
+          <a:schemeClr val="accent1"/>
+        </a:buClr>
+        <a:buSzPct val="60000"/>
+        <a:buFont typeface="Wingdings 2"/>
+        <a:buChar char=""/>
+        <a:defRPr kumimoji="0" sz="1800" kern="1200">
+          <a:solidFill>
+            <a:schemeClr val="tx2"/>
+          </a:solidFill>
+          <a:latin typeface="+mn-lt"/>
+          <a:ea typeface="+mn-ea"/>
+          <a:cs typeface="+mn-cs"/>
+        </a:defRPr>
+      </a:lvl6pPr>
+      <a:lvl7pPr marL="2971800" indent="-228600" algn="l" rtl="0" eaLnBrk="1" latinLnBrk="0" hangingPunct="1">
+        <a:spcBef>
+          <a:spcPct val="20000"/>
+        </a:spcBef>
+        <a:buClr>
+          <a:schemeClr val="accent1"/>
+        </a:buClr>
+        <a:buSzPct val="60000"/>
+        <a:buFont typeface="Wingdings 2"/>
+        <a:buChar char=""/>
+        <a:defRPr kumimoji="0" sz="1600" kern="1200">
+          <a:solidFill>
+            <a:schemeClr val="tx2"/>
+          </a:solidFill>
+          <a:latin typeface="+mn-lt"/>
+          <a:ea typeface="+mn-ea"/>
+          <a:cs typeface="+mn-cs"/>
+        </a:defRPr>
+      </a:lvl7pPr>
+      <a:lvl8pPr marL="3429000" indent="-228600" algn="l" rtl="0" eaLnBrk="1" latinLnBrk="0" hangingPunct="1">
+        <a:spcBef>
+          <a:spcPct val="20000"/>
+        </a:spcBef>
+        <a:buClr>
+          <a:schemeClr val="accent1"/>
+        </a:buClr>
+        <a:buSzPct val="60000"/>
+        <a:buFont typeface="Wingdings 2"/>
+        <a:buChar char=""/>
+        <a:defRPr kumimoji="0" sz="1600" kern="1200" baseline="0">
+          <a:solidFill>
+            <a:schemeClr val="tx2"/>
+          </a:solidFill>
+          <a:latin typeface="+mn-lt"/>
+          <a:ea typeface="+mn-ea"/>
+          <a:cs typeface="+mn-cs"/>
+        </a:defRPr>
+      </a:lvl8pPr>
+      <a:lvl9pPr marL="3886200" indent="-228600" algn="l" rtl="0" eaLnBrk="1" latinLnBrk="0" hangingPunct="1">
+        <a:spcBef>
+          <a:spcPct val="20000"/>
+        </a:spcBef>
+        <a:buClr>
+          <a:schemeClr val="accent1"/>
+        </a:buClr>
+        <a:buSzPct val="60000"/>
+        <a:buFont typeface="Wingdings 2"/>
+        <a:buChar char=""/>
+        <a:defRPr kumimoji="0" sz="1400" kern="1200" baseline="0">
+          <a:solidFill>
+            <a:schemeClr val="tx2"/>
+          </a:solidFill>
+          <a:latin typeface="+mn-lt"/>
+          <a:ea typeface="+mn-ea"/>
+          <a:cs typeface="+mn-cs"/>
+        </a:defRPr>
+      </a:lvl9pPr>
+    </p:bodyStyle>
+    <p:otherStyle>
+      <a:lvl1pPr marL="0" algn="l" rtl="0" eaLnBrk="1" latinLnBrk="0" hangingPunct="1">
+        <a:defRPr kumimoji="0" kern="1200">
           <a:solidFill>
             <a:schemeClr val="tx1"/>
           </a:solidFill>
@@ -2808,13 +3167,8 @@
           <a:cs typeface="+mn-cs"/>
         </a:defRPr>
       </a:lvl1pPr>
-      <a:lvl2pPr marL="742950" indent="-285750" algn="l" defTabSz="914400" rtl="0" eaLnBrk="1" latinLnBrk="0" hangingPunct="1">
-        <a:spcBef>
-          <a:spcPct val="20000"/>
-        </a:spcBef>
-        <a:buFont typeface="Arial" pitchFamily="34" charset="0"/>
-        <a:buChar char="–"/>
-        <a:defRPr sz="2800" kern="1200">
+      <a:lvl2pPr marL="457200" algn="l" rtl="0" eaLnBrk="1" latinLnBrk="0" hangingPunct="1">
+        <a:defRPr kumimoji="0" kern="1200">
           <a:solidFill>
             <a:schemeClr val="tx1"/>
           </a:solidFill>
@@ -2823,13 +3177,8 @@
           <a:cs typeface="+mn-cs"/>
         </a:defRPr>
       </a:lvl2pPr>
-      <a:lvl3pPr marL="1143000" indent="-228600" algn="l" defTabSz="914400" rtl="0" eaLnBrk="1" latinLnBrk="0" hangingPunct="1">
-        <a:spcBef>
-          <a:spcPct val="20000"/>
-        </a:spcBef>
-        <a:buFont typeface="Arial" pitchFamily="34" charset="0"/>
-        <a:buChar char="•"/>
-        <a:defRPr sz="2400" kern="1200">
+      <a:lvl3pPr marL="914400" algn="l" rtl="0" eaLnBrk="1" latinLnBrk="0" hangingPunct="1">
+        <a:defRPr kumimoji="0" kern="1200">
           <a:solidFill>
             <a:schemeClr val="tx1"/>
           </a:solidFill>
@@ -2838,13 +3187,8 @@
           <a:cs typeface="+mn-cs"/>
         </a:defRPr>
       </a:lvl3pPr>
-      <a:lvl4pPr marL="1600200" indent="-228600" algn="l" defTabSz="914400" rtl="0" eaLnBrk="1" latinLnBrk="0" hangingPunct="1">
-        <a:spcBef>
-          <a:spcPct val="20000"/>
-        </a:spcBef>
-        <a:buFont typeface="Arial" pitchFamily="34" charset="0"/>
-        <a:buChar char="–"/>
-        <a:defRPr sz="2000" kern="1200">
+      <a:lvl4pPr marL="1371600" algn="l" rtl="0" eaLnBrk="1" latinLnBrk="0" hangingPunct="1">
+        <a:defRPr kumimoji="0" kern="1200">
           <a:solidFill>
             <a:schemeClr val="tx1"/>
           </a:solidFill>
@@ -2853,13 +3197,8 @@
           <a:cs typeface="+mn-cs"/>
         </a:defRPr>
       </a:lvl4pPr>
-      <a:lvl5pPr marL="2057400" indent="-228600" algn="l" defTabSz="914400" rtl="0" eaLnBrk="1" latinLnBrk="0" hangingPunct="1">
-        <a:spcBef>
-          <a:spcPct val="20000"/>
-        </a:spcBef>
-        <a:buFont typeface="Arial" pitchFamily="34" charset="0"/>
-        <a:buChar char="»"/>
-        <a:defRPr sz="2000" kern="1200">
+      <a:lvl5pPr marL="1828800" algn="l" rtl="0" eaLnBrk="1" latinLnBrk="0" hangingPunct="1">
+        <a:defRPr kumimoji="0" kern="1200">
           <a:solidFill>
             <a:schemeClr val="tx1"/>
           </a:solidFill>
@@ -2868,13 +3207,8 @@
           <a:cs typeface="+mn-cs"/>
         </a:defRPr>
       </a:lvl5pPr>
-      <a:lvl6pPr marL="2514600" indent="-228600" algn="l" defTabSz="914400" rtl="0" eaLnBrk="1" latinLnBrk="0" hangingPunct="1">
-        <a:spcBef>
-          <a:spcPct val="20000"/>
-        </a:spcBef>
-        <a:buFont typeface="Arial" pitchFamily="34" charset="0"/>
-        <a:buChar char="•"/>
-        <a:defRPr sz="2000" kern="1200">
+      <a:lvl6pPr marL="2286000" algn="l" rtl="0" eaLnBrk="1" latinLnBrk="0" hangingPunct="1">
+        <a:defRPr kumimoji="0" kern="1200">
           <a:solidFill>
             <a:schemeClr val="tx1"/>
           </a:solidFill>
@@ -2883,13 +3217,8 @@
           <a:cs typeface="+mn-cs"/>
         </a:defRPr>
       </a:lvl6pPr>
-      <a:lvl7pPr marL="2971800" indent="-228600" algn="l" defTabSz="914400" rtl="0" eaLnBrk="1" latinLnBrk="0" hangingPunct="1">
-        <a:spcBef>
-          <a:spcPct val="20000"/>
-        </a:spcBef>
-        <a:buFont typeface="Arial" pitchFamily="34" charset="0"/>
-        <a:buChar char="•"/>
-        <a:defRPr sz="2000" kern="1200">
+      <a:lvl7pPr marL="2743200" algn="l" rtl="0" eaLnBrk="1" latinLnBrk="0" hangingPunct="1">
+        <a:defRPr kumimoji="0" kern="1200">
           <a:solidFill>
             <a:schemeClr val="tx1"/>
           </a:solidFill>
@@ -2898,13 +3227,8 @@
           <a:cs typeface="+mn-cs"/>
         </a:defRPr>
       </a:lvl7pPr>
-      <a:lvl8pPr marL="3429000" indent="-228600" algn="l" defTabSz="914400" rtl="0" eaLnBrk="1" latinLnBrk="0" hangingPunct="1">
-        <a:spcBef>
-          <a:spcPct val="20000"/>
-        </a:spcBef>
-        <a:buFont typeface="Arial" pitchFamily="34" charset="0"/>
-        <a:buChar char="•"/>
-        <a:defRPr sz="2000" kern="1200">
+      <a:lvl8pPr marL="3200400" algn="l" rtl="0" eaLnBrk="1" latinLnBrk="0" hangingPunct="1">
+        <a:defRPr kumimoji="0" kern="1200">
           <a:solidFill>
             <a:schemeClr val="tx1"/>
           </a:solidFill>
@@ -2913,108 +3237,8 @@
           <a:cs typeface="+mn-cs"/>
         </a:defRPr>
       </a:lvl8pPr>
-      <a:lvl9pPr marL="3886200" indent="-228600" algn="l" defTabSz="914400" rtl="0" eaLnBrk="1" latinLnBrk="0" hangingPunct="1">
-        <a:spcBef>
-          <a:spcPct val="20000"/>
-        </a:spcBef>
-        <a:buFont typeface="Arial" pitchFamily="34" charset="0"/>
-        <a:buChar char="•"/>
-        <a:defRPr sz="2000" kern="1200">
-          <a:solidFill>
-            <a:schemeClr val="tx1"/>
-          </a:solidFill>
-          <a:latin typeface="+mn-lt"/>
-          <a:ea typeface="+mn-ea"/>
-          <a:cs typeface="+mn-cs"/>
-        </a:defRPr>
-      </a:lvl9pPr>
-    </p:bodyStyle>
-    <p:otherStyle>
-      <a:defPPr>
-        <a:defRPr lang="en-US"/>
-      </a:defPPr>
-      <a:lvl1pPr marL="0" algn="l" defTabSz="914400" rtl="0" eaLnBrk="1" latinLnBrk="0" hangingPunct="1">
-        <a:defRPr sz="1800" kern="1200">
-          <a:solidFill>
-            <a:schemeClr val="tx1"/>
-          </a:solidFill>
-          <a:latin typeface="+mn-lt"/>
-          <a:ea typeface="+mn-ea"/>
-          <a:cs typeface="+mn-cs"/>
-        </a:defRPr>
-      </a:lvl1pPr>
-      <a:lvl2pPr marL="457200" algn="l" defTabSz="914400" rtl="0" eaLnBrk="1" latinLnBrk="0" hangingPunct="1">
-        <a:defRPr sz="1800" kern="1200">
-          <a:solidFill>
-            <a:schemeClr val="tx1"/>
-          </a:solidFill>
-          <a:latin typeface="+mn-lt"/>
-          <a:ea typeface="+mn-ea"/>
-          <a:cs typeface="+mn-cs"/>
-        </a:defRPr>
-      </a:lvl2pPr>
-      <a:lvl3pPr marL="914400" algn="l" defTabSz="914400" rtl="0" eaLnBrk="1" latinLnBrk="0" hangingPunct="1">
-        <a:defRPr sz="1800" kern="1200">
-          <a:solidFill>
-            <a:schemeClr val="tx1"/>
-          </a:solidFill>
-          <a:latin typeface="+mn-lt"/>
-          <a:ea typeface="+mn-ea"/>
-          <a:cs typeface="+mn-cs"/>
-        </a:defRPr>
-      </a:lvl3pPr>
-      <a:lvl4pPr marL="1371600" algn="l" defTabSz="914400" rtl="0" eaLnBrk="1" latinLnBrk="0" hangingPunct="1">
-        <a:defRPr sz="1800" kern="1200">
-          <a:solidFill>
-            <a:schemeClr val="tx1"/>
-          </a:solidFill>
-          <a:latin typeface="+mn-lt"/>
-          <a:ea typeface="+mn-ea"/>
-          <a:cs typeface="+mn-cs"/>
-        </a:defRPr>
-      </a:lvl4pPr>
-      <a:lvl5pPr marL="1828800" algn="l" defTabSz="914400" rtl="0" eaLnBrk="1" latinLnBrk="0" hangingPunct="1">
-        <a:defRPr sz="1800" kern="1200">
-          <a:solidFill>
-            <a:schemeClr val="tx1"/>
-          </a:solidFill>
-          <a:latin typeface="+mn-lt"/>
-          <a:ea typeface="+mn-ea"/>
-          <a:cs typeface="+mn-cs"/>
-        </a:defRPr>
-      </a:lvl5pPr>
-      <a:lvl6pPr marL="2286000" algn="l" defTabSz="914400" rtl="0" eaLnBrk="1" latinLnBrk="0" hangingPunct="1">
-        <a:defRPr sz="1800" kern="1200">
-          <a:solidFill>
-            <a:schemeClr val="tx1"/>
-          </a:solidFill>
-          <a:latin typeface="+mn-lt"/>
-          <a:ea typeface="+mn-ea"/>
-          <a:cs typeface="+mn-cs"/>
-        </a:defRPr>
-      </a:lvl6pPr>
-      <a:lvl7pPr marL="2743200" algn="l" defTabSz="914400" rtl="0" eaLnBrk="1" latinLnBrk="0" hangingPunct="1">
-        <a:defRPr sz="1800" kern="1200">
-          <a:solidFill>
-            <a:schemeClr val="tx1"/>
-          </a:solidFill>
-          <a:latin typeface="+mn-lt"/>
-          <a:ea typeface="+mn-ea"/>
-          <a:cs typeface="+mn-cs"/>
-        </a:defRPr>
-      </a:lvl7pPr>
-      <a:lvl8pPr marL="3200400" algn="l" defTabSz="914400" rtl="0" eaLnBrk="1" latinLnBrk="0" hangingPunct="1">
-        <a:defRPr sz="1800" kern="1200">
-          <a:solidFill>
-            <a:schemeClr val="tx1"/>
-          </a:solidFill>
-          <a:latin typeface="+mn-lt"/>
-          <a:ea typeface="+mn-ea"/>
-          <a:cs typeface="+mn-cs"/>
-        </a:defRPr>
-      </a:lvl8pPr>
-      <a:lvl9pPr marL="3657600" algn="l" defTabSz="914400" rtl="0" eaLnBrk="1" latinLnBrk="0" hangingPunct="1">
-        <a:defRPr sz="1800" kern="1200">
+      <a:lvl9pPr marL="3657600" algn="l" rtl="0" eaLnBrk="1" latinLnBrk="0" hangingPunct="1">
+        <a:defRPr kumimoji="0" kern="1200">
           <a:solidFill>
             <a:schemeClr val="tx1"/>
           </a:solidFill>
@@ -3029,7 +3253,7 @@
 </file>
 
 <file path=ppt/slides/slide1.xml><?xml version="1.0" encoding="utf-8"?>
-<p:sld xmlns:a="http://schemas.openxmlformats.org/drawingml/2006/main" xmlns:r="http://schemas.openxmlformats.org/officeDocument/2006/relationships" xmlns:p="http://schemas.openxmlformats.org/presentationml/2006/main">
+<p:sld xmlns:a="http://schemas.openxmlformats.org/drawingml/2006/main" xmlns:r="http://schemas.openxmlformats.org/officeDocument/2006/relationships" xmlns:mc="http://schemas.openxmlformats.org/markup-compatibility/2006" xmlns:mv="urn:schemas-microsoft-com:mac:vml" xmlns:p="http://schemas.openxmlformats.org/presentationml/2006/main" mc:Ignorable="mv" mc:PreserveAttributes="mv:*">
   <p:cSld>
     <p:spTree>
       <p:nvGrpSpPr>
@@ -3055,9 +3279,16 @@
             <p:ph type="ctrTitle"/>
           </p:nvPr>
         </p:nvSpPr>
-        <p:spPr/>
-        <p:txBody>
-          <a:bodyPr/>
+        <p:spPr>
+          <a:xfrm>
+            <a:off x="381000" y="4495800"/>
+            <a:ext cx="8382000" cy="1752600"/>
+          </a:xfrm>
+        </p:spPr>
+        <p:txBody>
+          <a:bodyPr>
+            <a:normAutofit/>
+          </a:bodyPr>
           <a:lstStyle/>
           <a:p>
             <a:pPr marL="0" marR="0" indent="0" algn="ctr" defTabSz="914400" rtl="0" eaLnBrk="1" fontAlgn="auto" latinLnBrk="0" hangingPunct="1">
@@ -3117,42 +3348,26 @@
             <p:ph type="subTitle" idx="1"/>
           </p:nvPr>
         </p:nvSpPr>
-        <p:spPr/>
+        <p:spPr>
+          <a:xfrm>
+            <a:off x="381000" y="2971800"/>
+            <a:ext cx="8458200" cy="1143000"/>
+          </a:xfrm>
+        </p:spPr>
         <p:txBody>
           <a:bodyPr>
-            <a:normAutofit fontScale="85000" lnSpcReduction="20000"/>
+            <a:normAutofit fontScale="70000" lnSpcReduction="20000"/>
           </a:bodyPr>
           <a:lstStyle/>
           <a:p>
-            <a:pPr marL="0" marR="0" lvl="0" indent="0" algn="ctr" defTabSz="914400" rtl="0" eaLnBrk="1" fontAlgn="auto" latinLnBrk="0" hangingPunct="1">
-              <a:lnSpc>
-                <a:spcPct val="100000"/>
-              </a:lnSpc>
-              <a:spcBef>
-                <a:spcPct val="20000"/>
-              </a:spcBef>
-              <a:spcAft>
-                <a:spcPts val="0"/>
-              </a:spcAft>
-              <a:buClrTx/>
-              <a:buSzTx/>
-              <a:buFont typeface="Arial" pitchFamily="34" charset="0"/>
-              <a:buNone/>
-              <a:tabLst/>
-              <a:defRPr/>
-            </a:pPr>
-            <a:r>
-              <a:rPr lang="en-US" sz="3200" kern="1200" baseline="0" dirty="0" smtClean="0">
-                <a:solidFill>
-                  <a:schemeClr val="tx1">
-                    <a:tint val="75000"/>
-                  </a:schemeClr>
-                </a:solidFill>
-                <a:latin typeface="+mn-lt"/>
-                <a:ea typeface="+mn-ea"/>
-                <a:cs typeface="+mn-cs"/>
-              </a:rPr>
-              <a:t>Sarah Cooley</a:t>
+            <a:pPr lvl="0"/>
+            <a:r>
+              <a:rPr lang="en-US" baseline="0" dirty="0" smtClean="0"/>
+              <a:t>Sarah</a:t>
+            </a:r>
+            <a:r>
+              <a:rPr lang="en-US" dirty="0" smtClean="0"/>
+              <a:t> Cooley</a:t>
             </a:r>
             <a:endParaRPr lang="en-US" baseline="0" dirty="0" smtClean="0"/>
           </a:p>
@@ -3164,7 +3379,11 @@
             </a:r>
             <a:r>
               <a:rPr lang="en-US" baseline="0" dirty="0" smtClean="0"/>
-              <a:t> Rasmussen</a:t>
+              <a:t> </a:t>
+            </a:r>
+            <a:r>
+              <a:rPr lang="en-US" baseline="0" dirty="0" smtClean="0"/>
+              <a:t>Rasmussen</a:t>
             </a:r>
           </a:p>
           <a:p>
@@ -3198,7 +3417,7 @@
 </file>
 
 <file path=ppt/slides/slide10.xml><?xml version="1.0" encoding="utf-8"?>
-<p:sld xmlns:a="http://schemas.openxmlformats.org/drawingml/2006/main" xmlns:r="http://schemas.openxmlformats.org/officeDocument/2006/relationships" xmlns:p="http://schemas.openxmlformats.org/presentationml/2006/main">
+<p:sld xmlns:a="http://schemas.openxmlformats.org/drawingml/2006/main" xmlns:r="http://schemas.openxmlformats.org/officeDocument/2006/relationships" xmlns:mc="http://schemas.openxmlformats.org/markup-compatibility/2006" xmlns:mv="urn:schemas-microsoft-com:mac:vml" xmlns:p="http://schemas.openxmlformats.org/presentationml/2006/main" mc:Ignorable="mv" mc:PreserveAttributes="mv:*">
   <p:cSld>
     <p:spTree>
       <p:nvGrpSpPr>
@@ -3323,7 +3542,7 @@
 </file>
 
 <file path=ppt/slides/slide11.xml><?xml version="1.0" encoding="utf-8"?>
-<p:sld xmlns:a="http://schemas.openxmlformats.org/drawingml/2006/main" xmlns:r="http://schemas.openxmlformats.org/officeDocument/2006/relationships" xmlns:p="http://schemas.openxmlformats.org/presentationml/2006/main">
+<p:sld xmlns:a="http://schemas.openxmlformats.org/drawingml/2006/main" xmlns:r="http://schemas.openxmlformats.org/officeDocument/2006/relationships" xmlns:mc="http://schemas.openxmlformats.org/markup-compatibility/2006" xmlns:mv="urn:schemas-microsoft-com:mac:vml" xmlns:p="http://schemas.openxmlformats.org/presentationml/2006/main" mc:Ignorable="mv" mc:PreserveAttributes="mv:*">
   <p:cSld>
     <p:spTree>
       <p:nvGrpSpPr>
@@ -3390,7 +3609,7 @@
 </file>
 
 <file path=ppt/slides/slide2.xml><?xml version="1.0" encoding="utf-8"?>
-<p:sld xmlns:a="http://schemas.openxmlformats.org/drawingml/2006/main" xmlns:r="http://schemas.openxmlformats.org/officeDocument/2006/relationships" xmlns:p="http://schemas.openxmlformats.org/presentationml/2006/main">
+<p:sld xmlns:a="http://schemas.openxmlformats.org/drawingml/2006/main" xmlns:r="http://schemas.openxmlformats.org/officeDocument/2006/relationships" xmlns:mc="http://schemas.openxmlformats.org/markup-compatibility/2006" xmlns:mv="urn:schemas-microsoft-com:mac:vml" xmlns:p="http://schemas.openxmlformats.org/presentationml/2006/main" mc:Ignorable="mv" mc:PreserveAttributes="mv:*">
   <p:cSld>
     <p:spTree>
       <p:nvGrpSpPr>
@@ -3445,27 +3664,22 @@
         </p:nvSpPr>
         <p:spPr/>
         <p:txBody>
-          <a:bodyPr/>
+          <a:bodyPr>
+            <a:normAutofit/>
+          </a:bodyPr>
           <a:lstStyle/>
           <a:p>
             <a:r>
               <a:rPr lang="en-US" dirty="0" smtClean="0"/>
               <a:t>IARC Competition</a:t>
             </a:r>
+            <a:endParaRPr lang="en-US" dirty="0" smtClean="0"/>
           </a:p>
           <a:p>
             <a:pPr lvl="1"/>
             <a:r>
               <a:rPr lang="en-US" dirty="0" smtClean="0"/>
-              <a:t>Autonomous</a:t>
-            </a:r>
-            <a:r>
-              <a:rPr lang="en-US" dirty="0"/>
-              <a:t> </a:t>
-            </a:r>
-            <a:r>
-              <a:rPr lang="en-US" dirty="0" smtClean="0"/>
-              <a:t>building navigation</a:t>
+              <a:t>Autonomously navigate a building</a:t>
             </a:r>
           </a:p>
           <a:p>
@@ -3506,7 +3720,7 @@
 </file>
 
 <file path=ppt/slides/slide3.xml><?xml version="1.0" encoding="utf-8"?>
-<p:sld xmlns:a="http://schemas.openxmlformats.org/drawingml/2006/main" xmlns:r="http://schemas.openxmlformats.org/officeDocument/2006/relationships" xmlns:p="http://schemas.openxmlformats.org/presentationml/2006/main">
+<p:sld xmlns:a="http://schemas.openxmlformats.org/drawingml/2006/main" xmlns:r="http://schemas.openxmlformats.org/officeDocument/2006/relationships" xmlns:mc="http://schemas.openxmlformats.org/markup-compatibility/2006" xmlns:mv="urn:schemas-microsoft-com:mac:vml" xmlns:p="http://schemas.openxmlformats.org/presentationml/2006/main" mc:Ignorable="mv" mc:PreserveAttributes="mv:*">
   <p:cSld>
     <p:spTree>
       <p:nvGrpSpPr>
@@ -3577,7 +3791,7 @@
 </file>
 
 <file path=ppt/slides/slide4.xml><?xml version="1.0" encoding="utf-8"?>
-<p:sld xmlns:a="http://schemas.openxmlformats.org/drawingml/2006/main" xmlns:r="http://schemas.openxmlformats.org/officeDocument/2006/relationships" xmlns:p="http://schemas.openxmlformats.org/presentationml/2006/main">
+<p:sld xmlns:a="http://schemas.openxmlformats.org/drawingml/2006/main" xmlns:r="http://schemas.openxmlformats.org/officeDocument/2006/relationships" xmlns:mc="http://schemas.openxmlformats.org/markup-compatibility/2006" xmlns:mv="urn:schemas-microsoft-com:mac:vml" xmlns:p="http://schemas.openxmlformats.org/presentationml/2006/main" mc:Ignorable="mv" mc:PreserveAttributes="mv:*">
   <p:cSld>
     <p:spTree>
       <p:nvGrpSpPr>
@@ -3605,29 +3819,6 @@
         </p:nvSpPr>
         <p:spPr/>
         <p:txBody>
-          <a:bodyPr/>
-          <a:lstStyle/>
-          <a:p>
-            <a:r>
-              <a:rPr lang="en-US" dirty="0" smtClean="0"/>
-              <a:t>Motivation For a new Design</a:t>
-            </a:r>
-            <a:endParaRPr lang="en-US" dirty="0"/>
-          </a:p>
-        </p:txBody>
-      </p:sp>
-      <p:sp>
-        <p:nvSpPr>
-          <p:cNvPr id="3" name="Content Placeholder 2"/>
-          <p:cNvSpPr>
-            <a:spLocks noGrp="1"/>
-          </p:cNvSpPr>
-          <p:nvPr>
-            <p:ph idx="1"/>
-          </p:nvPr>
-        </p:nvSpPr>
-        <p:spPr/>
-        <p:txBody>
           <a:bodyPr>
             <a:normAutofit/>
           </a:bodyPr>
@@ -3635,6 +3826,31 @@
           <a:p>
             <a:r>
               <a:rPr lang="en-US" dirty="0" smtClean="0"/>
+              <a:t>Motivation For a new Design</a:t>
+            </a:r>
+            <a:endParaRPr lang="en-US" dirty="0"/>
+          </a:p>
+        </p:txBody>
+      </p:sp>
+      <p:sp>
+        <p:nvSpPr>
+          <p:cNvPr id="3" name="Content Placeholder 2"/>
+          <p:cNvSpPr>
+            <a:spLocks noGrp="1"/>
+          </p:cNvSpPr>
+          <p:nvPr>
+            <p:ph idx="1"/>
+          </p:nvPr>
+        </p:nvSpPr>
+        <p:spPr/>
+        <p:txBody>
+          <a:bodyPr>
+            <a:normAutofit/>
+          </a:bodyPr>
+          <a:lstStyle/>
+          <a:p>
+            <a:r>
+              <a:rPr lang="en-US" dirty="0" smtClean="0"/>
               <a:t>Create an integrated</a:t>
             </a:r>
             <a:r>
@@ -3670,7 +3886,6 @@
               <a:rPr lang="en-US" dirty="0" smtClean="0"/>
               <a:t>Reduce cost</a:t>
             </a:r>
-            <a:endParaRPr lang="en-US" dirty="0" smtClean="0"/>
           </a:p>
         </p:txBody>
       </p:sp>
@@ -3683,7 +3898,7 @@
 </file>
 
 <file path=ppt/slides/slide5.xml><?xml version="1.0" encoding="utf-8"?>
-<p:sld xmlns:a="http://schemas.openxmlformats.org/drawingml/2006/main" xmlns:r="http://schemas.openxmlformats.org/officeDocument/2006/relationships" xmlns:p="http://schemas.openxmlformats.org/presentationml/2006/main">
+<p:sld xmlns:a="http://schemas.openxmlformats.org/drawingml/2006/main" xmlns:r="http://schemas.openxmlformats.org/officeDocument/2006/relationships" xmlns:mc="http://schemas.openxmlformats.org/markup-compatibility/2006" xmlns:mv="urn:schemas-microsoft-com:mac:vml" xmlns:p="http://schemas.openxmlformats.org/presentationml/2006/main" mc:Ignorable="mv" mc:PreserveAttributes="mv:*">
   <p:cSld>
     <p:spTree>
       <p:nvGrpSpPr>
@@ -3733,15 +3948,27 @@
           </p:nvPr>
         </p:nvPicPr>
         <p:blipFill>
-          <a:blip r:embed="rId2" cstate="print"/>
+          <a:blip r:embed="rId2" cstate="print">
+            <a:clrChange>
+              <a:clrFrom>
+                <a:srgbClr val="FFFFFF"/>
+              </a:clrFrom>
+              <a:clrTo>
+                <a:srgbClr val="FFFFFF">
+                  <a:alpha val="0"/>
+                </a:srgbClr>
+              </a:clrTo>
+            </a:clrChange>
+          </a:blip>
+          <a:srcRect l="-1115" r="-4522"/>
           <a:stretch>
             <a:fillRect/>
           </a:stretch>
         </p:blipFill>
         <p:spPr>
           <a:xfrm>
-            <a:off x="2335852" y="1600200"/>
-            <a:ext cx="4472295" cy="4525963"/>
+            <a:off x="2286000" y="1602043"/>
+            <a:ext cx="5486400" cy="5255957"/>
           </a:xfrm>
         </p:spPr>
       </p:pic>
@@ -3754,7 +3981,7 @@
 </file>
 
 <file path=ppt/slides/slide6.xml><?xml version="1.0" encoding="utf-8"?>
-<p:sld xmlns:a="http://schemas.openxmlformats.org/drawingml/2006/main" xmlns:r="http://schemas.openxmlformats.org/officeDocument/2006/relationships" xmlns:p="http://schemas.openxmlformats.org/presentationml/2006/main">
+<p:sld xmlns:a="http://schemas.openxmlformats.org/drawingml/2006/main" xmlns:r="http://schemas.openxmlformats.org/officeDocument/2006/relationships" xmlns:mc="http://schemas.openxmlformats.org/markup-compatibility/2006" xmlns:mv="urn:schemas-microsoft-com:mac:vml" xmlns:p="http://schemas.openxmlformats.org/presentationml/2006/main" mc:Ignorable="mv" mc:PreserveAttributes="mv:*">
   <p:cSld>
     <p:spTree>
       <p:nvGrpSpPr>
@@ -3824,7 +4051,7 @@
 </file>
 
 <file path=ppt/slides/slide7.xml><?xml version="1.0" encoding="utf-8"?>
-<p:sld xmlns:a="http://schemas.openxmlformats.org/drawingml/2006/main" xmlns:r="http://schemas.openxmlformats.org/officeDocument/2006/relationships" xmlns:p="http://schemas.openxmlformats.org/presentationml/2006/main">
+<p:sld xmlns:a="http://schemas.openxmlformats.org/drawingml/2006/main" xmlns:r="http://schemas.openxmlformats.org/officeDocument/2006/relationships" xmlns:mc="http://schemas.openxmlformats.org/markup-compatibility/2006" xmlns:mv="urn:schemas-microsoft-com:mac:vml" xmlns:p="http://schemas.openxmlformats.org/presentationml/2006/main" mc:Ignorable="mv" mc:PreserveAttributes="mv:*">
   <p:cSld>
     <p:spTree>
       <p:nvGrpSpPr>
@@ -3891,7 +4118,7 @@
 </file>
 
 <file path=ppt/slides/slide8.xml><?xml version="1.0" encoding="utf-8"?>
-<p:sld xmlns:a="http://schemas.openxmlformats.org/drawingml/2006/main" xmlns:r="http://schemas.openxmlformats.org/officeDocument/2006/relationships" xmlns:p="http://schemas.openxmlformats.org/presentationml/2006/main">
+<p:sld xmlns:a="http://schemas.openxmlformats.org/drawingml/2006/main" xmlns:r="http://schemas.openxmlformats.org/officeDocument/2006/relationships" xmlns:mc="http://schemas.openxmlformats.org/markup-compatibility/2006" xmlns:mv="urn:schemas-microsoft-com:mac:vml" xmlns:p="http://schemas.openxmlformats.org/presentationml/2006/main" mc:Ignorable="mv" mc:PreserveAttributes="mv:*">
   <p:cSld>
     <p:spTree>
       <p:nvGrpSpPr>
@@ -3958,7 +4185,7 @@
 </file>
 
 <file path=ppt/slides/slide9.xml><?xml version="1.0" encoding="utf-8"?>
-<p:sld xmlns:a="http://schemas.openxmlformats.org/drawingml/2006/main" xmlns:r="http://schemas.openxmlformats.org/officeDocument/2006/relationships" xmlns:p="http://schemas.openxmlformats.org/presentationml/2006/main">
+<p:sld xmlns:a="http://schemas.openxmlformats.org/drawingml/2006/main" xmlns:r="http://schemas.openxmlformats.org/officeDocument/2006/relationships" xmlns:mc="http://schemas.openxmlformats.org/markup-compatibility/2006" xmlns:mv="urn:schemas-microsoft-com:mac:vml" xmlns:p="http://schemas.openxmlformats.org/presentationml/2006/main" mc:Ignorable="mv" mc:PreserveAttributes="mv:*">
   <p:cSld>
     <p:spTree>
       <p:nvGrpSpPr>
@@ -4048,9 +4275,9 @@
 </file>
 
 <file path=ppt/theme/theme1.xml><?xml version="1.0" encoding="utf-8"?>
-<a:theme xmlns:a="http://schemas.openxmlformats.org/drawingml/2006/main" name="Office Theme">
+<a:theme xmlns:a="http://schemas.openxmlformats.org/drawingml/2006/main" name="Trek">
   <a:themeElements>
-    <a:clrScheme name="Office">
+    <a:clrScheme name="Aspect">
       <a:dk1>
         <a:sysClr val="windowText" lastClr="000000"/>
       </a:dk1>
@@ -4058,82 +4285,48 @@
         <a:sysClr val="window" lastClr="FFFFFF"/>
       </a:lt1>
       <a:dk2>
-        <a:srgbClr val="1F497D"/>
+        <a:srgbClr val="323232"/>
       </a:dk2>
       <a:lt2>
-        <a:srgbClr val="EEECE1"/>
+        <a:srgbClr val="E3DED1"/>
       </a:lt2>
       <a:accent1>
-        <a:srgbClr val="4F81BD"/>
+        <a:srgbClr val="F07F09"/>
       </a:accent1>
       <a:accent2>
-        <a:srgbClr val="C0504D"/>
+        <a:srgbClr val="9F2936"/>
       </a:accent2>
       <a:accent3>
-        <a:srgbClr val="9BBB59"/>
+        <a:srgbClr val="1B587C"/>
       </a:accent3>
       <a:accent4>
-        <a:srgbClr val="8064A2"/>
+        <a:srgbClr val="4E8542"/>
       </a:accent4>
       <a:accent5>
-        <a:srgbClr val="4BACC6"/>
+        <a:srgbClr val="604878"/>
       </a:accent5>
       <a:accent6>
-        <a:srgbClr val="F79646"/>
+        <a:srgbClr val="C19859"/>
       </a:accent6>
       <a:hlink>
-        <a:srgbClr val="0000FF"/>
+        <a:srgbClr val="6B9F25"/>
       </a:hlink>
       <a:folHlink>
-        <a:srgbClr val="800080"/>
+        <a:srgbClr val="B26B02"/>
       </a:folHlink>
     </a:clrScheme>
-    <a:fontScheme name="Office">
+    <a:fontScheme name="Trek">
       <a:majorFont>
-        <a:latin typeface="Calibri"/>
+        <a:latin typeface="Franklin Gothic Medium"/>
         <a:ea typeface=""/>
         <a:cs typeface=""/>
-        <a:font script="Jpan" typeface="ＭＳ Ｐゴシック"/>
-        <a:font script="Hang" typeface="맑은 고딕"/>
-        <a:font script="Hans" typeface="宋体"/>
-        <a:font script="Hant" typeface="新細明體"/>
-        <a:font script="Arab" typeface="Times New Roman"/>
-        <a:font script="Hebr" typeface="Times New Roman"/>
-        <a:font script="Thai" typeface="Angsana New"/>
-        <a:font script="Ethi" typeface="Nyala"/>
-        <a:font script="Beng" typeface="Vrinda"/>
-        <a:font script="Gujr" typeface="Shruti"/>
-        <a:font script="Khmr" typeface="MoolBoran"/>
-        <a:font script="Knda" typeface="Tunga"/>
-        <a:font script="Guru" typeface="Raavi"/>
-        <a:font script="Cans" typeface="Euphemia"/>
-        <a:font script="Cher" typeface="Plantagenet Cherokee"/>
-        <a:font script="Yiii" typeface="Microsoft Yi Baiti"/>
-        <a:font script="Tibt" typeface="Microsoft Himalaya"/>
-        <a:font script="Thaa" typeface="MV Boli"/>
-        <a:font script="Deva" typeface="Mangal"/>
-        <a:font script="Telu" typeface="Gautami"/>
-        <a:font script="Taml" typeface="Latha"/>
-        <a:font script="Syrc" typeface="Estrangelo Edessa"/>
-        <a:font script="Orya" typeface="Kalinga"/>
-        <a:font script="Mlym" typeface="Kartika"/>
-        <a:font script="Laoo" typeface="DokChampa"/>
-        <a:font script="Sinh" typeface="Iskoola Pota"/>
-        <a:font script="Mong" typeface="Mongolian Baiti"/>
-        <a:font script="Viet" typeface="Times New Roman"/>
-        <a:font script="Uigh" typeface="Microsoft Uighur"/>
-      </a:majorFont>
-      <a:minorFont>
-        <a:latin typeface="Calibri"/>
-        <a:ea typeface=""/>
-        <a:cs typeface=""/>
-        <a:font script="Jpan" typeface="ＭＳ Ｐゴシック"/>
-        <a:font script="Hang" typeface="맑은 고딕"/>
-        <a:font script="Hans" typeface="宋体"/>
-        <a:font script="Hant" typeface="新細明體"/>
-        <a:font script="Arab" typeface="Arial"/>
-        <a:font script="Hebr" typeface="Arial"/>
-        <a:font script="Thai" typeface="Cordia New"/>
+        <a:font script="Jpan" typeface="ヒラギノ角ゴ Pro W6"/>
+        <a:font script="Hang" typeface="돋움"/>
+        <a:font script="Hans" typeface="隶书"/>
+        <a:font script="Hant" typeface="微軟正黑體"/>
+        <a:font script="Arab" typeface="Tahoma"/>
+        <a:font script="Hebr" typeface="Aharoni"/>
+        <a:font script="Thai" typeface="LilyUPC"/>
         <a:font script="Ethi" typeface="Nyala"/>
         <a:font script="Beng" typeface="Vrinda"/>
         <a:font script="Gujr" typeface="Shruti"/>
@@ -4156,9 +4349,43 @@
         <a:font script="Mong" typeface="Mongolian Baiti"/>
         <a:font script="Viet" typeface="Arial"/>
         <a:font script="Uigh" typeface="Microsoft Uighur"/>
+      </a:majorFont>
+      <a:minorFont>
+        <a:latin typeface="Franklin Gothic Book"/>
+        <a:ea typeface=""/>
+        <a:cs typeface=""/>
+        <a:font script="Jpan" typeface="ＭＳ Ｐゴシック"/>
+        <a:font script="Hang" typeface="돋움"/>
+        <a:font script="Hans" typeface="华文楷体"/>
+        <a:font script="Hant" typeface="微軟正黑體"/>
+        <a:font script="Arab" typeface="Tahoma"/>
+        <a:font script="Hebr" typeface="Aharoni"/>
+        <a:font script="Thai" typeface="LilyUPC"/>
+        <a:font script="Ethi" typeface="Nyala"/>
+        <a:font script="Beng" typeface="Vrinda"/>
+        <a:font script="Gujr" typeface="Shruti"/>
+        <a:font script="Khmr" typeface="DaunPenh"/>
+        <a:font script="Knda" typeface="Tunga"/>
+        <a:font script="Guru" typeface="Raavi"/>
+        <a:font script="Cans" typeface="Euphemia"/>
+        <a:font script="Cher" typeface="Plantagenet Cherokee"/>
+        <a:font script="Yiii" typeface="Microsoft Yi Baiti"/>
+        <a:font script="Tibt" typeface="Microsoft Himalaya"/>
+        <a:font script="Thaa" typeface="MV Boli"/>
+        <a:font script="Deva" typeface="Mangal"/>
+        <a:font script="Telu" typeface="Gautami"/>
+        <a:font script="Taml" typeface="Latha"/>
+        <a:font script="Syrc" typeface="Estrangelo Edessa"/>
+        <a:font script="Orya" typeface="Kalinga"/>
+        <a:font script="Mlym" typeface="Kartika"/>
+        <a:font script="Laoo" typeface="DokChampa"/>
+        <a:font script="Sinh" typeface="Iskoola Pota"/>
+        <a:font script="Mong" typeface="Mongolian Baiti"/>
+        <a:font script="Viet" typeface="Tahoma"/>
+        <a:font script="Uigh" typeface="Microsoft Uighur"/>
       </a:minorFont>
     </a:fontScheme>
-    <a:fmtScheme name="Office">
+    <a:fmtScheme name="Trek">
       <a:fillStyleLst>
         <a:solidFill>
           <a:schemeClr val="phClr"/>
@@ -4167,56 +4394,77 @@
           <a:gsLst>
             <a:gs pos="0">
               <a:schemeClr val="phClr">
-                <a:tint val="50000"/>
-                <a:satMod val="300000"/>
+                <a:tint val="30000"/>
+                <a:satMod val="250000"/>
               </a:schemeClr>
             </a:gs>
-            <a:gs pos="35000">
+            <a:gs pos="72000">
               <a:schemeClr val="phClr">
-                <a:tint val="37000"/>
-                <a:satMod val="300000"/>
+                <a:tint val="75000"/>
+                <a:satMod val="210000"/>
               </a:schemeClr>
             </a:gs>
             <a:gs pos="100000">
               <a:schemeClr val="phClr">
-                <a:tint val="15000"/>
-                <a:satMod val="350000"/>
+                <a:tint val="85000"/>
+                <a:satMod val="210000"/>
               </a:schemeClr>
             </a:gs>
           </a:gsLst>
-          <a:lin ang="16200000" scaled="1"/>
+          <a:lin ang="5400000" scaled="1"/>
         </a:gradFill>
         <a:gradFill rotWithShape="1">
           <a:gsLst>
             <a:gs pos="0">
               <a:schemeClr val="phClr">
-                <a:shade val="51000"/>
-                <a:satMod val="130000"/>
+                <a:tint val="75000"/>
+                <a:shade val="85000"/>
+                <a:satMod val="230000"/>
+              </a:schemeClr>
+            </a:gs>
+            <a:gs pos="25000">
+              <a:schemeClr val="phClr">
+                <a:tint val="90000"/>
+                <a:shade val="70000"/>
+                <a:satMod val="220000"/>
+              </a:schemeClr>
+            </a:gs>
+            <a:gs pos="50000">
+              <a:schemeClr val="phClr">
+                <a:tint val="90000"/>
+                <a:shade val="58000"/>
+                <a:satMod val="225000"/>
+              </a:schemeClr>
+            </a:gs>
+            <a:gs pos="65000">
+              <a:schemeClr val="phClr">
+                <a:tint val="90000"/>
+                <a:shade val="58000"/>
+                <a:satMod val="225000"/>
               </a:schemeClr>
             </a:gs>
             <a:gs pos="80000">
               <a:schemeClr val="phClr">
-                <a:shade val="93000"/>
-                <a:satMod val="130000"/>
+                <a:tint val="90000"/>
+                <a:shade val="69000"/>
+                <a:satMod val="220000"/>
               </a:schemeClr>
             </a:gs>
             <a:gs pos="100000">
               <a:schemeClr val="phClr">
-                <a:shade val="94000"/>
-                <a:satMod val="135000"/>
+                <a:tint val="77000"/>
+                <a:shade val="80000"/>
+                <a:satMod val="230000"/>
               </a:schemeClr>
             </a:gs>
           </a:gsLst>
-          <a:lin ang="16200000" scaled="0"/>
+          <a:lin ang="5400000" scaled="1"/>
         </a:gradFill>
       </a:fillStyleLst>
       <a:lnStyleLst>
-        <a:ln w="9525" cap="flat" cmpd="sng" algn="ctr">
+        <a:ln w="10000" cap="flat" cmpd="sng" algn="ctr">
           <a:solidFill>
-            <a:schemeClr val="phClr">
-              <a:shade val="95000"/>
-              <a:satMod val="105000"/>
-            </a:schemeClr>
+            <a:schemeClr val="phClr"/>
           </a:solidFill>
           <a:prstDash val="solid"/>
         </a:ln>
@@ -4236,27 +4484,18 @@
       <a:effectStyleLst>
         <a:effectStyle>
           <a:effectLst>
-            <a:outerShdw blurRad="40000" dist="20000" dir="5400000" rotWithShape="0">
-              <a:srgbClr val="000000">
-                <a:alpha val="38000"/>
+            <a:outerShdw blurRad="76200" dist="50800" dir="5400000" rotWithShape="0">
+              <a:srgbClr val="4E3B30">
+                <a:alpha val="60000"/>
               </a:srgbClr>
             </a:outerShdw>
           </a:effectLst>
         </a:effectStyle>
         <a:effectStyle>
           <a:effectLst>
-            <a:outerShdw blurRad="40000" dist="23000" dir="5400000" rotWithShape="0">
-              <a:srgbClr val="000000">
-                <a:alpha val="35000"/>
-              </a:srgbClr>
-            </a:outerShdw>
-          </a:effectLst>
-        </a:effectStyle>
-        <a:effectStyle>
-          <a:effectLst>
-            <a:outerShdw blurRad="40000" dist="23000" dir="5400000" rotWithShape="0">
-              <a:srgbClr val="000000">
-                <a:alpha val="35000"/>
+            <a:outerShdw blurRad="76200" dist="50800" dir="5400000" rotWithShape="0">
+              <a:srgbClr val="4E3B30">
+                <a:alpha val="60000"/>
               </a:srgbClr>
             </a:outerShdw>
           </a:effectLst>
@@ -4264,12 +4503,38 @@
             <a:camera prst="orthographicFront">
               <a:rot lat="0" lon="0" rev="0"/>
             </a:camera>
-            <a:lightRig rig="threePt" dir="t">
-              <a:rot lat="0" lon="0" rev="1200000"/>
+            <a:lightRig rig="threePt" dir="tl">
+              <a:rot lat="0" lon="0" rev="0"/>
             </a:lightRig>
           </a:scene3d>
-          <a:sp3d>
-            <a:bevelT w="63500" h="25400"/>
+          <a:sp3d prstMaterial="metal">
+            <a:bevelT w="10000" h="10000"/>
+          </a:sp3d>
+        </a:effectStyle>
+        <a:effectStyle>
+          <a:effectLst>
+            <a:outerShdw blurRad="76200" dist="50800" dir="5400000" rotWithShape="0">
+              <a:srgbClr val="4E3B30">
+                <a:alpha val="60000"/>
+              </a:srgbClr>
+            </a:outerShdw>
+          </a:effectLst>
+          <a:scene3d>
+            <a:camera prst="obliqueTopLeft" fov="600000">
+              <a:rot lat="0" lon="0" rev="0"/>
+            </a:camera>
+            <a:lightRig rig="balanced" dir="t">
+              <a:rot lat="0" lon="0" rev="19200000"/>
+            </a:lightRig>
+          </a:scene3d>
+          <a:sp3d contourW="12700" prstMaterial="matte">
+            <a:bevelT w="60000" h="50800"/>
+            <a:contourClr>
+              <a:schemeClr val="phClr">
+                <a:shade val="60000"/>
+                <a:satMod val="110000"/>
+              </a:schemeClr>
+            </a:contourClr>
           </a:sp3d>
         </a:effectStyle>
       </a:effectStyleLst>
@@ -4277,55 +4542,85 @@
         <a:solidFill>
           <a:schemeClr val="phClr"/>
         </a:solidFill>
-        <a:gradFill rotWithShape="1">
-          <a:gsLst>
-            <a:gs pos="0">
+        <a:blipFill>
+          <a:blip xmlns:r="http://schemas.openxmlformats.org/officeDocument/2006/relationships" r:embed="rId1">
+            <a:duotone>
               <a:schemeClr val="phClr">
-                <a:tint val="40000"/>
-                <a:satMod val="350000"/>
+                <a:shade val="90000"/>
+                <a:satMod val="150000"/>
               </a:schemeClr>
-            </a:gs>
-            <a:gs pos="40000">
               <a:schemeClr val="phClr">
-                <a:tint val="45000"/>
-                <a:shade val="99000"/>
-                <a:satMod val="350000"/>
+                <a:tint val="88000"/>
+                <a:satMod val="105000"/>
               </a:schemeClr>
-            </a:gs>
-            <a:gs pos="100000">
-              <a:schemeClr val="phClr">
-                <a:shade val="20000"/>
-                <a:satMod val="255000"/>
-              </a:schemeClr>
-            </a:gs>
-          </a:gsLst>
-          <a:path path="circle">
-            <a:fillToRect l="50000" t="-80000" r="50000" b="180000"/>
-          </a:path>
-        </a:gradFill>
-        <a:gradFill rotWithShape="1">
-          <a:gsLst>
-            <a:gs pos="0">
-              <a:schemeClr val="phClr">
-                <a:tint val="80000"/>
-                <a:satMod val="300000"/>
-              </a:schemeClr>
-            </a:gs>
-            <a:gs pos="100000">
+            </a:duotone>
+          </a:blip>
+          <a:tile tx="0" ty="0" sx="95000" sy="95000" flip="none" algn="t"/>
+        </a:blipFill>
+        <a:blipFill>
+          <a:blip xmlns:r="http://schemas.openxmlformats.org/officeDocument/2006/relationships" r:embed="rId2">
+            <a:duotone>
               <a:schemeClr val="phClr">
                 <a:shade val="30000"/>
-                <a:satMod val="200000"/>
+                <a:satMod val="455000"/>
               </a:schemeClr>
-            </a:gs>
-          </a:gsLst>
-          <a:path path="circle">
-            <a:fillToRect l="50000" t="50000" r="50000" b="50000"/>
-          </a:path>
-        </a:gradFill>
+              <a:schemeClr val="phClr">
+                <a:tint val="95000"/>
+                <a:satMod val="120000"/>
+              </a:schemeClr>
+            </a:duotone>
+          </a:blip>
+          <a:stretch>
+            <a:fillRect/>
+          </a:stretch>
+        </a:blipFill>
       </a:bgFillStyleLst>
     </a:fmtScheme>
   </a:themeElements>
-  <a:objectDefaults/>
+  <a:objectDefaults>
+    <a:spDef>
+      <a:spPr/>
+      <a:bodyPr rtlCol="0" anchor="ctr"/>
+      <a:lstStyle>
+        <a:defPPr algn="ctr">
+          <a:defRPr/>
+        </a:defPPr>
+      </a:lstStyle>
+      <a:style>
+        <a:lnRef idx="1">
+          <a:schemeClr val="accent1"/>
+        </a:lnRef>
+        <a:fillRef idx="3">
+          <a:schemeClr val="accent1"/>
+        </a:fillRef>
+        <a:effectRef idx="2">
+          <a:schemeClr val="accent1"/>
+        </a:effectRef>
+        <a:fontRef idx="minor">
+          <a:schemeClr val="lt1"/>
+        </a:fontRef>
+      </a:style>
+    </a:spDef>
+    <a:lnDef>
+      <a:spPr/>
+      <a:bodyPr/>
+      <a:lstStyle/>
+      <a:style>
+        <a:lnRef idx="2">
+          <a:schemeClr val="accent1"/>
+        </a:lnRef>
+        <a:fillRef idx="0">
+          <a:schemeClr val="accent1"/>
+        </a:fillRef>
+        <a:effectRef idx="1">
+          <a:schemeClr val="accent1"/>
+        </a:effectRef>
+        <a:fontRef idx="minor">
+          <a:schemeClr val="tx1"/>
+        </a:fontRef>
+      </a:style>
+    </a:lnDef>
+  </a:objectDefaults>
   <a:extraClrSchemeLst/>
 </a:theme>
 </file>
</xml_diff>

<commit_message>
Added pretty IMU block diagram
</commit_message>
<xml_diff>
--- a/documentation/week8_presentation/Falcon - Quadrotor Flight Control System.pptx
+++ b/documentation/week8_presentation/Falcon - Quadrotor Flight Control System.pptx
@@ -3379,11 +3379,7 @@
             </a:r>
             <a:r>
               <a:rPr lang="en-US" baseline="0" dirty="0" smtClean="0"/>
-              <a:t> </a:t>
-            </a:r>
-            <a:r>
-              <a:rPr lang="en-US" baseline="0" dirty="0" smtClean="0"/>
-              <a:t>Rasmussen</a:t>
+              <a:t> Rasmussen</a:t>
             </a:r>
           </a:p>
           <a:p>
@@ -3673,7 +3669,6 @@
               <a:rPr lang="en-US" dirty="0" smtClean="0"/>
               <a:t>IARC Competition</a:t>
             </a:r>
-            <a:endParaRPr lang="en-US" dirty="0" smtClean="0"/>
           </a:p>
           <a:p>
             <a:pPr lvl="1"/>
@@ -4157,25 +4152,41 @@
           </a:p>
         </p:txBody>
       </p:sp>
-      <p:sp>
-        <p:nvSpPr>
-          <p:cNvPr id="3" name="Content Placeholder 2"/>
-          <p:cNvSpPr>
-            <a:spLocks noGrp="1"/>
-          </p:cNvSpPr>
+      <p:pic>
+        <p:nvPicPr>
+          <p:cNvPr id="4" name="Content Placeholder 3" descr="imu_block_diagram_3.png"/>
+          <p:cNvPicPr>
+            <a:picLocks noGrp="1" noChangeAspect="1"/>
+          </p:cNvPicPr>
           <p:nvPr>
             <p:ph idx="1"/>
           </p:nvPr>
-        </p:nvSpPr>
-        <p:spPr/>
-        <p:txBody>
-          <a:bodyPr/>
-          <a:lstStyle/>
-          <a:p>
-            <a:endParaRPr lang="en-US" dirty="0"/>
-          </a:p>
-        </p:txBody>
-      </p:sp>
+        </p:nvPicPr>
+        <p:blipFill>
+          <a:blip r:embed="rId2">
+            <a:clrChange>
+              <a:clrFrom>
+                <a:srgbClr val="FFFFFF"/>
+              </a:clrFrom>
+              <a:clrTo>
+                <a:srgbClr val="FFFFFF">
+                  <a:alpha val="0"/>
+                </a:srgbClr>
+              </a:clrTo>
+            </a:clrChange>
+          </a:blip>
+          <a:srcRect l="2066" r="-113"/>
+          <a:stretch>
+            <a:fillRect/>
+          </a:stretch>
+        </p:blipFill>
+        <p:spPr>
+          <a:xfrm>
+            <a:off x="2667000" y="923960"/>
+            <a:ext cx="4495800" cy="5934040"/>
+          </a:xfrm>
+        </p:spPr>
+      </p:pic>
     </p:spTree>
   </p:cSld>
   <p:clrMapOvr>

</xml_diff>

<commit_message>
Added MCU and FCU block diagra,s
</commit_message>
<xml_diff>
--- a/documentation/week8_presentation/Falcon - Quadrotor Flight Control System.pptx
+++ b/documentation/week8_presentation/Falcon - Quadrotor Flight Control System.pptx
@@ -293,7 +293,7 @@
             <a:fld id="{54AB02A5-4FE5-49D9-9E24-09F23B90C450}" type="datetimeFigureOut">
               <a:rPr lang="en-US" smtClean="0"/>
               <a:pPr/>
-              <a:t>11/15/10</a:t>
+              <a:t>11/16/10</a:t>
             </a:fld>
             <a:endParaRPr lang="en-US"/>
           </a:p>
@@ -465,7 +465,7 @@
             <a:fld id="{E66BD9D4-BAB0-46F2-8832-33E39AEEB973}" type="datetimeFigureOut">
               <a:rPr lang="en-US" smtClean="0"/>
               <a:pPr/>
-              <a:t>11/15/10</a:t>
+              <a:t>11/16/10</a:t>
             </a:fld>
             <a:endParaRPr lang="en-US"/>
           </a:p>
@@ -642,7 +642,7 @@
             <a:fld id="{E66BD9D4-BAB0-46F2-8832-33E39AEEB973}" type="datetimeFigureOut">
               <a:rPr lang="en-US" smtClean="0"/>
               <a:pPr/>
-              <a:t>11/15/10</a:t>
+              <a:t>11/16/10</a:t>
             </a:fld>
             <a:endParaRPr lang="en-US"/>
           </a:p>
@@ -809,7 +809,7 @@
             <a:fld id="{E66BD9D4-BAB0-46F2-8832-33E39AEEB973}" type="datetimeFigureOut">
               <a:rPr lang="en-US" smtClean="0"/>
               <a:pPr/>
-              <a:t>11/15/10</a:t>
+              <a:t>11/16/10</a:t>
             </a:fld>
             <a:endParaRPr lang="en-US"/>
           </a:p>
@@ -1040,7 +1040,7 @@
             <a:fld id="{C3F416CD-67A3-4CF0-A210-F6AF31AC147F}" type="datetimeFigureOut">
               <a:rPr lang="en-US" smtClean="0"/>
               <a:pPr/>
-              <a:t>11/15/10</a:t>
+              <a:t>11/16/10</a:t>
             </a:fld>
             <a:endParaRPr lang="en-US"/>
           </a:p>
@@ -1338,7 +1338,7 @@
             <a:fld id="{E66BD9D4-BAB0-46F2-8832-33E39AEEB973}" type="datetimeFigureOut">
               <a:rPr lang="en-US" smtClean="0"/>
               <a:pPr/>
-              <a:t>11/15/10</a:t>
+              <a:t>11/16/10</a:t>
             </a:fld>
             <a:endParaRPr lang="en-US"/>
           </a:p>
@@ -1724,7 +1724,7 @@
             <a:fld id="{E66BD9D4-BAB0-46F2-8832-33E39AEEB973}" type="datetimeFigureOut">
               <a:rPr lang="en-US" smtClean="0"/>
               <a:pPr/>
-              <a:t>11/15/10</a:t>
+              <a:t>11/16/10</a:t>
             </a:fld>
             <a:endParaRPr lang="en-US"/>
           </a:p>
@@ -1899,7 +1899,7 @@
             <a:fld id="{E66BD9D4-BAB0-46F2-8832-33E39AEEB973}" type="datetimeFigureOut">
               <a:rPr lang="en-US" smtClean="0"/>
               <a:pPr/>
-              <a:t>11/15/10</a:t>
+              <a:t>11/16/10</a:t>
             </a:fld>
             <a:endParaRPr lang="en-US"/>
           </a:p>
@@ -1991,7 +1991,7 @@
             <a:fld id="{E66BD9D4-BAB0-46F2-8832-33E39AEEB973}" type="datetimeFigureOut">
               <a:rPr lang="en-US" smtClean="0"/>
               <a:pPr/>
-              <a:t>11/15/10</a:t>
+              <a:t>11/16/10</a:t>
             </a:fld>
             <a:endParaRPr lang="en-US"/>
           </a:p>
@@ -2288,7 +2288,7 @@
             <a:fld id="{E66BD9D4-BAB0-46F2-8832-33E39AEEB973}" type="datetimeFigureOut">
               <a:rPr lang="en-US" smtClean="0"/>
               <a:pPr/>
-              <a:t>11/15/10</a:t>
+              <a:t>11/16/10</a:t>
             </a:fld>
             <a:endParaRPr lang="en-US"/>
           </a:p>
@@ -2424,7 +2424,7 @@
             <a:fld id="{E66BD9D4-BAB0-46F2-8832-33E39AEEB973}" type="datetimeFigureOut">
               <a:rPr lang="en-US" smtClean="0"/>
               <a:pPr/>
-              <a:t>11/15/10</a:t>
+              <a:t>11/16/10</a:t>
             </a:fld>
             <a:endParaRPr lang="en-US"/>
           </a:p>
@@ -2729,7 +2729,7 @@
             <a:fld id="{E66BD9D4-BAB0-46F2-8832-33E39AEEB973}" type="datetimeFigureOut">
               <a:rPr lang="en-US" smtClean="0"/>
               <a:pPr/>
-              <a:t>11/15/10</a:t>
+              <a:t>11/16/10</a:t>
             </a:fld>
             <a:endParaRPr lang="en-US"/>
           </a:p>
@@ -4064,28 +4064,43 @@
           </a:p>
         </p:txBody>
       </p:sp>
-      <p:sp>
-        <p:nvSpPr>
-          <p:cNvPr id="3" name="Content Placeholder 2"/>
-          <p:cNvSpPr>
-            <a:spLocks noGrp="1"/>
-          </p:cNvSpPr>
+      <p:pic>
+        <p:nvPicPr>
+          <p:cNvPr id="4" name="Content Placeholder 3" descr="flight_controller_block_diagram.pdf"/>
+          <p:cNvPicPr>
+            <a:picLocks noGrp="1" noChangeAspect="1"/>
+          </p:cNvPicPr>
           <p:nvPr>
             <p:ph idx="1"/>
           </p:nvPr>
-        </p:nvSpPr>
-        <p:spPr/>
-        <p:txBody>
-          <a:bodyPr/>
-          <a:lstStyle/>
-          <a:p>
-            <a:pPr>
-              <a:buNone/>
-            </a:pPr>
-            <a:endParaRPr lang="en-US" dirty="0"/>
-          </a:p>
-        </p:txBody>
-      </p:sp>
+        </p:nvPicPr>
+        <mc:AlternateContent>
+          <mc:Choice xmlns:ma="http://schemas.microsoft.com/office/mac/drawingml/2008/main" Requires="ma">
+            <p:blipFill>
+              <a:blip r:embed="rId2"/>
+              <a:srcRect l="6424" r="4245"/>
+              <a:stretch>
+                <a:fillRect/>
+              </a:stretch>
+            </p:blipFill>
+          </mc:Choice>
+          <mc:Fallback>
+            <p:blipFill>
+              <a:blip r:embed="rId3"/>
+              <a:srcRect l="6424" r="4245"/>
+              <a:stretch>
+                <a:fillRect/>
+              </a:stretch>
+            </p:blipFill>
+          </mc:Fallback>
+        </mc:AlternateContent>
+        <p:spPr>
+          <a:xfrm>
+            <a:off x="2590800" y="1117754"/>
+            <a:ext cx="3962400" cy="5740246"/>
+          </a:xfrm>
+        </p:spPr>
+      </p:pic>
     </p:spTree>
   </p:cSld>
   <p:clrMapOvr>
@@ -4141,25 +4156,43 @@
           </a:p>
         </p:txBody>
       </p:sp>
-      <p:sp>
-        <p:nvSpPr>
-          <p:cNvPr id="3" name="Content Placeholder 2"/>
-          <p:cNvSpPr>
-            <a:spLocks noGrp="1"/>
-          </p:cNvSpPr>
+      <p:pic>
+        <p:nvPicPr>
+          <p:cNvPr id="4" name="Content Placeholder 3" descr="motor controller block diagram.pdf"/>
+          <p:cNvPicPr>
+            <a:picLocks noGrp="1" noChangeAspect="1"/>
+          </p:cNvPicPr>
           <p:nvPr>
             <p:ph idx="1"/>
           </p:nvPr>
-        </p:nvSpPr>
-        <p:spPr/>
-        <p:txBody>
-          <a:bodyPr/>
-          <a:lstStyle/>
-          <a:p>
-            <a:endParaRPr lang="en-US"/>
-          </a:p>
-        </p:txBody>
-      </p:sp>
+        </p:nvPicPr>
+        <mc:AlternateContent>
+          <mc:Choice xmlns:ma="http://schemas.microsoft.com/office/mac/drawingml/2008/main" Requires="ma">
+            <p:blipFill>
+              <a:blip r:embed="rId2"/>
+              <a:srcRect l="2066" r="2066"/>
+              <a:stretch>
+                <a:fillRect/>
+              </a:stretch>
+            </p:blipFill>
+          </mc:Choice>
+          <mc:Fallback>
+            <p:blipFill>
+              <a:blip r:embed="rId3"/>
+              <a:srcRect l="2066" r="2066"/>
+              <a:stretch>
+                <a:fillRect/>
+              </a:stretch>
+            </p:blipFill>
+          </mc:Fallback>
+        </mc:AlternateContent>
+        <p:spPr>
+          <a:xfrm>
+            <a:off x="2438400" y="1066800"/>
+            <a:ext cx="4267200" cy="5760317"/>
+          </a:xfrm>
+        </p:spPr>
+      </p:pic>
     </p:spTree>
   </p:cSld>
   <p:clrMapOvr>

</xml_diff>

<commit_message>
Added Pretty Pictures and PDFed
</commit_message>
<xml_diff>
--- a/documentation/week8_presentation/Falcon - Quadrotor Flight Control System.pptx
+++ b/documentation/week8_presentation/Falcon - Quadrotor Flight Control System.pptx
@@ -115,6 +115,3113 @@
     </a:lvl9pPr>
   </p:defaultTextStyle>
 </p:presentation>
+</file>
+
+<file path=ppt/diagrams/colors1.xml><?xml version="1.0" encoding="utf-8"?>
+<dgm:colorsDef xmlns:dgm="http://schemas.openxmlformats.org/drawingml/2006/diagram" xmlns:a="http://schemas.openxmlformats.org/drawingml/2006/main" uniqueId="urn:microsoft.com/office/officeart/2005/8/colors/accent1_2">
+  <dgm:title val=""/>
+  <dgm:desc val=""/>
+  <dgm:catLst>
+    <dgm:cat type="accent1" pri="11200"/>
+  </dgm:catLst>
+  <dgm:styleLbl name="node0">
+    <dgm:fillClrLst meth="repeat">
+      <a:schemeClr val="accent1"/>
+    </dgm:fillClrLst>
+    <dgm:linClrLst meth="repeat">
+      <a:schemeClr val="lt1"/>
+    </dgm:linClrLst>
+    <dgm:effectClrLst/>
+    <dgm:txLinClrLst/>
+    <dgm:txFillClrLst/>
+    <dgm:txEffectClrLst/>
+  </dgm:styleLbl>
+  <dgm:styleLbl name="alignNode1">
+    <dgm:fillClrLst meth="repeat">
+      <a:schemeClr val="accent1"/>
+    </dgm:fillClrLst>
+    <dgm:linClrLst meth="repeat">
+      <a:schemeClr val="accent1"/>
+    </dgm:linClrLst>
+    <dgm:effectClrLst/>
+    <dgm:txLinClrLst/>
+    <dgm:txFillClrLst/>
+    <dgm:txEffectClrLst/>
+  </dgm:styleLbl>
+  <dgm:styleLbl name="node1">
+    <dgm:fillClrLst meth="repeat">
+      <a:schemeClr val="accent1"/>
+    </dgm:fillClrLst>
+    <dgm:linClrLst meth="repeat">
+      <a:schemeClr val="lt1"/>
+    </dgm:linClrLst>
+    <dgm:effectClrLst/>
+    <dgm:txLinClrLst/>
+    <dgm:txFillClrLst/>
+    <dgm:txEffectClrLst/>
+  </dgm:styleLbl>
+  <dgm:styleLbl name="lnNode1">
+    <dgm:fillClrLst meth="repeat">
+      <a:schemeClr val="accent1"/>
+    </dgm:fillClrLst>
+    <dgm:linClrLst meth="repeat">
+      <a:schemeClr val="lt1"/>
+    </dgm:linClrLst>
+    <dgm:effectClrLst/>
+    <dgm:txLinClrLst/>
+    <dgm:txFillClrLst/>
+    <dgm:txEffectClrLst/>
+  </dgm:styleLbl>
+  <dgm:styleLbl name="vennNode1">
+    <dgm:fillClrLst meth="repeat">
+      <a:schemeClr val="accent1">
+        <a:alpha val="50000"/>
+      </a:schemeClr>
+    </dgm:fillClrLst>
+    <dgm:linClrLst meth="repeat">
+      <a:schemeClr val="lt1"/>
+    </dgm:linClrLst>
+    <dgm:effectClrLst/>
+    <dgm:txLinClrLst/>
+    <dgm:txFillClrLst/>
+    <dgm:txEffectClrLst/>
+  </dgm:styleLbl>
+  <dgm:styleLbl name="node2">
+    <dgm:fillClrLst meth="repeat">
+      <a:schemeClr val="accent1"/>
+    </dgm:fillClrLst>
+    <dgm:linClrLst meth="repeat">
+      <a:schemeClr val="lt1"/>
+    </dgm:linClrLst>
+    <dgm:effectClrLst/>
+    <dgm:txLinClrLst/>
+    <dgm:txFillClrLst/>
+    <dgm:txEffectClrLst/>
+  </dgm:styleLbl>
+  <dgm:styleLbl name="node3">
+    <dgm:fillClrLst meth="repeat">
+      <a:schemeClr val="accent1"/>
+    </dgm:fillClrLst>
+    <dgm:linClrLst meth="repeat">
+      <a:schemeClr val="lt1"/>
+    </dgm:linClrLst>
+    <dgm:effectClrLst/>
+    <dgm:txLinClrLst/>
+    <dgm:txFillClrLst/>
+    <dgm:txEffectClrLst/>
+  </dgm:styleLbl>
+  <dgm:styleLbl name="node4">
+    <dgm:fillClrLst meth="repeat">
+      <a:schemeClr val="accent1"/>
+    </dgm:fillClrLst>
+    <dgm:linClrLst meth="repeat">
+      <a:schemeClr val="lt1"/>
+    </dgm:linClrLst>
+    <dgm:effectClrLst/>
+    <dgm:txLinClrLst/>
+    <dgm:txFillClrLst/>
+    <dgm:txEffectClrLst/>
+  </dgm:styleLbl>
+  <dgm:styleLbl name="fgImgPlace1">
+    <dgm:fillClrLst meth="repeat">
+      <a:schemeClr val="accent1">
+        <a:tint val="50000"/>
+      </a:schemeClr>
+    </dgm:fillClrLst>
+    <dgm:linClrLst meth="repeat">
+      <a:schemeClr val="lt1"/>
+    </dgm:linClrLst>
+    <dgm:effectClrLst/>
+    <dgm:txLinClrLst/>
+    <dgm:txFillClrLst meth="repeat">
+      <a:schemeClr val="lt1"/>
+    </dgm:txFillClrLst>
+    <dgm:txEffectClrLst/>
+  </dgm:styleLbl>
+  <dgm:styleLbl name="alignImgPlace1">
+    <dgm:fillClrLst meth="repeat">
+      <a:schemeClr val="accent1">
+        <a:tint val="50000"/>
+      </a:schemeClr>
+    </dgm:fillClrLst>
+    <dgm:linClrLst meth="repeat">
+      <a:schemeClr val="lt1"/>
+    </dgm:linClrLst>
+    <dgm:effectClrLst/>
+    <dgm:txLinClrLst/>
+    <dgm:txFillClrLst meth="repeat">
+      <a:schemeClr val="lt1"/>
+    </dgm:txFillClrLst>
+    <dgm:txEffectClrLst/>
+  </dgm:styleLbl>
+  <dgm:styleLbl name="bgImgPlace1">
+    <dgm:fillClrLst meth="repeat">
+      <a:schemeClr val="accent1">
+        <a:tint val="50000"/>
+      </a:schemeClr>
+    </dgm:fillClrLst>
+    <dgm:linClrLst meth="repeat">
+      <a:schemeClr val="lt1"/>
+    </dgm:linClrLst>
+    <dgm:effectClrLst/>
+    <dgm:txLinClrLst/>
+    <dgm:txFillClrLst meth="repeat">
+      <a:schemeClr val="lt1"/>
+    </dgm:txFillClrLst>
+    <dgm:txEffectClrLst/>
+  </dgm:styleLbl>
+  <dgm:styleLbl name="sibTrans2D1">
+    <dgm:fillClrLst meth="repeat">
+      <a:schemeClr val="accent1">
+        <a:tint val="60000"/>
+      </a:schemeClr>
+    </dgm:fillClrLst>
+    <dgm:linClrLst meth="repeat">
+      <a:schemeClr val="accent1">
+        <a:tint val="60000"/>
+      </a:schemeClr>
+    </dgm:linClrLst>
+    <dgm:effectClrLst/>
+    <dgm:txLinClrLst/>
+    <dgm:txFillClrLst/>
+    <dgm:txEffectClrLst/>
+  </dgm:styleLbl>
+  <dgm:styleLbl name="fgSibTrans2D1">
+    <dgm:fillClrLst meth="repeat">
+      <a:schemeClr val="accent1">
+        <a:tint val="60000"/>
+      </a:schemeClr>
+    </dgm:fillClrLst>
+    <dgm:linClrLst meth="repeat">
+      <a:schemeClr val="accent1">
+        <a:tint val="60000"/>
+      </a:schemeClr>
+    </dgm:linClrLst>
+    <dgm:effectClrLst/>
+    <dgm:txLinClrLst/>
+    <dgm:txFillClrLst/>
+    <dgm:txEffectClrLst/>
+  </dgm:styleLbl>
+  <dgm:styleLbl name="bgSibTrans2D1">
+    <dgm:fillClrLst meth="repeat">
+      <a:schemeClr val="accent1">
+        <a:tint val="60000"/>
+      </a:schemeClr>
+    </dgm:fillClrLst>
+    <dgm:linClrLst meth="repeat">
+      <a:schemeClr val="accent1">
+        <a:tint val="60000"/>
+      </a:schemeClr>
+    </dgm:linClrLst>
+    <dgm:effectClrLst/>
+    <dgm:txLinClrLst/>
+    <dgm:txFillClrLst/>
+    <dgm:txEffectClrLst/>
+  </dgm:styleLbl>
+  <dgm:styleLbl name="sibTrans1D1">
+    <dgm:fillClrLst meth="repeat">
+      <a:schemeClr val="accent1"/>
+    </dgm:fillClrLst>
+    <dgm:linClrLst meth="repeat">
+      <a:schemeClr val="accent1"/>
+    </dgm:linClrLst>
+    <dgm:effectClrLst/>
+    <dgm:txLinClrLst/>
+    <dgm:txFillClrLst meth="repeat">
+      <a:schemeClr val="tx1"/>
+    </dgm:txFillClrLst>
+    <dgm:txEffectClrLst/>
+  </dgm:styleLbl>
+  <dgm:styleLbl name="callout">
+    <dgm:fillClrLst meth="repeat">
+      <a:schemeClr val="accent1"/>
+    </dgm:fillClrLst>
+    <dgm:linClrLst meth="repeat">
+      <a:schemeClr val="accent1">
+        <a:tint val="50000"/>
+      </a:schemeClr>
+    </dgm:linClrLst>
+    <dgm:effectClrLst/>
+    <dgm:txLinClrLst/>
+    <dgm:txFillClrLst meth="repeat">
+      <a:schemeClr val="tx1"/>
+    </dgm:txFillClrLst>
+    <dgm:txEffectClrLst/>
+  </dgm:styleLbl>
+  <dgm:styleLbl name="asst0">
+    <dgm:fillClrLst meth="repeat">
+      <a:schemeClr val="accent1"/>
+    </dgm:fillClrLst>
+    <dgm:linClrLst meth="repeat">
+      <a:schemeClr val="lt1"/>
+    </dgm:linClrLst>
+    <dgm:effectClrLst/>
+    <dgm:txLinClrLst/>
+    <dgm:txFillClrLst/>
+    <dgm:txEffectClrLst/>
+  </dgm:styleLbl>
+  <dgm:styleLbl name="asst1">
+    <dgm:fillClrLst meth="repeat">
+      <a:schemeClr val="accent1"/>
+    </dgm:fillClrLst>
+    <dgm:linClrLst meth="repeat">
+      <a:schemeClr val="lt1"/>
+    </dgm:linClrLst>
+    <dgm:effectClrLst/>
+    <dgm:txLinClrLst/>
+    <dgm:txFillClrLst/>
+    <dgm:txEffectClrLst/>
+  </dgm:styleLbl>
+  <dgm:styleLbl name="asst2">
+    <dgm:fillClrLst meth="repeat">
+      <a:schemeClr val="accent1"/>
+    </dgm:fillClrLst>
+    <dgm:linClrLst meth="repeat">
+      <a:schemeClr val="lt1"/>
+    </dgm:linClrLst>
+    <dgm:effectClrLst/>
+    <dgm:txLinClrLst/>
+    <dgm:txFillClrLst/>
+    <dgm:txEffectClrLst/>
+  </dgm:styleLbl>
+  <dgm:styleLbl name="asst3">
+    <dgm:fillClrLst meth="repeat">
+      <a:schemeClr val="accent1"/>
+    </dgm:fillClrLst>
+    <dgm:linClrLst meth="repeat">
+      <a:schemeClr val="lt1"/>
+    </dgm:linClrLst>
+    <dgm:effectClrLst/>
+    <dgm:txLinClrLst/>
+    <dgm:txFillClrLst/>
+    <dgm:txEffectClrLst/>
+  </dgm:styleLbl>
+  <dgm:styleLbl name="asst4">
+    <dgm:fillClrLst meth="repeat">
+      <a:schemeClr val="accent1"/>
+    </dgm:fillClrLst>
+    <dgm:linClrLst meth="repeat">
+      <a:schemeClr val="lt1"/>
+    </dgm:linClrLst>
+    <dgm:effectClrLst/>
+    <dgm:txLinClrLst/>
+    <dgm:txFillClrLst/>
+    <dgm:txEffectClrLst/>
+  </dgm:styleLbl>
+  <dgm:styleLbl name="parChTrans2D1">
+    <dgm:fillClrLst meth="repeat">
+      <a:schemeClr val="accent1">
+        <a:tint val="60000"/>
+      </a:schemeClr>
+    </dgm:fillClrLst>
+    <dgm:linClrLst meth="repeat">
+      <a:schemeClr val="accent1">
+        <a:tint val="60000"/>
+      </a:schemeClr>
+    </dgm:linClrLst>
+    <dgm:effectClrLst/>
+    <dgm:txLinClrLst/>
+    <dgm:txFillClrLst meth="repeat">
+      <a:schemeClr val="lt1"/>
+    </dgm:txFillClrLst>
+    <dgm:txEffectClrLst/>
+  </dgm:styleLbl>
+  <dgm:styleLbl name="parChTrans2D2">
+    <dgm:fillClrLst meth="repeat">
+      <a:schemeClr val="accent1"/>
+    </dgm:fillClrLst>
+    <dgm:linClrLst meth="repeat">
+      <a:schemeClr val="accent1"/>
+    </dgm:linClrLst>
+    <dgm:effectClrLst/>
+    <dgm:txLinClrLst/>
+    <dgm:txFillClrLst meth="repeat">
+      <a:schemeClr val="lt1"/>
+    </dgm:txFillClrLst>
+    <dgm:txEffectClrLst/>
+  </dgm:styleLbl>
+  <dgm:styleLbl name="parChTrans2D3">
+    <dgm:fillClrLst meth="repeat">
+      <a:schemeClr val="accent1"/>
+    </dgm:fillClrLst>
+    <dgm:linClrLst meth="repeat">
+      <a:schemeClr val="accent1"/>
+    </dgm:linClrLst>
+    <dgm:effectClrLst/>
+    <dgm:txLinClrLst/>
+    <dgm:txFillClrLst meth="repeat">
+      <a:schemeClr val="lt1"/>
+    </dgm:txFillClrLst>
+    <dgm:txEffectClrLst/>
+  </dgm:styleLbl>
+  <dgm:styleLbl name="parChTrans2D4">
+    <dgm:fillClrLst meth="repeat">
+      <a:schemeClr val="accent1"/>
+    </dgm:fillClrLst>
+    <dgm:linClrLst meth="repeat">
+      <a:schemeClr val="accent1"/>
+    </dgm:linClrLst>
+    <dgm:effectClrLst/>
+    <dgm:txLinClrLst/>
+    <dgm:txFillClrLst meth="repeat">
+      <a:schemeClr val="lt1"/>
+    </dgm:txFillClrLst>
+    <dgm:txEffectClrLst/>
+  </dgm:styleLbl>
+  <dgm:styleLbl name="parChTrans1D1">
+    <dgm:fillClrLst meth="repeat">
+      <a:schemeClr val="accent1"/>
+    </dgm:fillClrLst>
+    <dgm:linClrLst meth="repeat">
+      <a:schemeClr val="accent1">
+        <a:shade val="60000"/>
+      </a:schemeClr>
+    </dgm:linClrLst>
+    <dgm:effectClrLst/>
+    <dgm:txLinClrLst/>
+    <dgm:txFillClrLst meth="repeat">
+      <a:schemeClr val="tx1"/>
+    </dgm:txFillClrLst>
+    <dgm:txEffectClrLst/>
+  </dgm:styleLbl>
+  <dgm:styleLbl name="parChTrans1D2">
+    <dgm:fillClrLst meth="repeat">
+      <a:schemeClr val="accent1"/>
+    </dgm:fillClrLst>
+    <dgm:linClrLst meth="repeat">
+      <a:schemeClr val="accent1">
+        <a:shade val="60000"/>
+      </a:schemeClr>
+    </dgm:linClrLst>
+    <dgm:effectClrLst/>
+    <dgm:txLinClrLst/>
+    <dgm:txFillClrLst meth="repeat">
+      <a:schemeClr val="tx1"/>
+    </dgm:txFillClrLst>
+    <dgm:txEffectClrLst/>
+  </dgm:styleLbl>
+  <dgm:styleLbl name="parChTrans1D3">
+    <dgm:fillClrLst meth="repeat">
+      <a:schemeClr val="accent1"/>
+    </dgm:fillClrLst>
+    <dgm:linClrLst meth="repeat">
+      <a:schemeClr val="accent1">
+        <a:shade val="80000"/>
+      </a:schemeClr>
+    </dgm:linClrLst>
+    <dgm:effectClrLst/>
+    <dgm:txLinClrLst/>
+    <dgm:txFillClrLst meth="repeat">
+      <a:schemeClr val="tx1"/>
+    </dgm:txFillClrLst>
+    <dgm:txEffectClrLst/>
+  </dgm:styleLbl>
+  <dgm:styleLbl name="parChTrans1D4">
+    <dgm:fillClrLst meth="repeat">
+      <a:schemeClr val="accent1"/>
+    </dgm:fillClrLst>
+    <dgm:linClrLst meth="repeat">
+      <a:schemeClr val="accent1">
+        <a:shade val="80000"/>
+      </a:schemeClr>
+    </dgm:linClrLst>
+    <dgm:effectClrLst/>
+    <dgm:txLinClrLst/>
+    <dgm:txFillClrLst meth="repeat">
+      <a:schemeClr val="tx1"/>
+    </dgm:txFillClrLst>
+    <dgm:txEffectClrLst/>
+  </dgm:styleLbl>
+  <dgm:styleLbl name="fgAcc1">
+    <dgm:fillClrLst meth="repeat">
+      <a:schemeClr val="lt1">
+        <a:alpha val="90000"/>
+      </a:schemeClr>
+    </dgm:fillClrLst>
+    <dgm:linClrLst meth="repeat">
+      <a:schemeClr val="accent1"/>
+    </dgm:linClrLst>
+    <dgm:effectClrLst/>
+    <dgm:txLinClrLst/>
+    <dgm:txFillClrLst meth="repeat">
+      <a:schemeClr val="dk1"/>
+    </dgm:txFillClrLst>
+    <dgm:txEffectClrLst/>
+  </dgm:styleLbl>
+  <dgm:styleLbl name="conFgAcc1">
+    <dgm:fillClrLst meth="repeat">
+      <a:schemeClr val="lt1">
+        <a:alpha val="90000"/>
+      </a:schemeClr>
+    </dgm:fillClrLst>
+    <dgm:linClrLst meth="repeat">
+      <a:schemeClr val="accent1"/>
+    </dgm:linClrLst>
+    <dgm:effectClrLst/>
+    <dgm:txLinClrLst/>
+    <dgm:txFillClrLst meth="repeat">
+      <a:schemeClr val="dk1"/>
+    </dgm:txFillClrLst>
+    <dgm:txEffectClrLst/>
+  </dgm:styleLbl>
+  <dgm:styleLbl name="alignAcc1">
+    <dgm:fillClrLst meth="repeat">
+      <a:schemeClr val="lt1">
+        <a:alpha val="90000"/>
+      </a:schemeClr>
+    </dgm:fillClrLst>
+    <dgm:linClrLst meth="repeat">
+      <a:schemeClr val="accent1"/>
+    </dgm:linClrLst>
+    <dgm:effectClrLst/>
+    <dgm:txLinClrLst/>
+    <dgm:txFillClrLst meth="repeat">
+      <a:schemeClr val="dk1"/>
+    </dgm:txFillClrLst>
+    <dgm:txEffectClrLst/>
+  </dgm:styleLbl>
+  <dgm:styleLbl name="trAlignAcc1">
+    <dgm:fillClrLst meth="repeat">
+      <a:schemeClr val="lt1">
+        <a:alpha val="40000"/>
+      </a:schemeClr>
+    </dgm:fillClrLst>
+    <dgm:linClrLst meth="repeat">
+      <a:schemeClr val="accent1"/>
+    </dgm:linClrLst>
+    <dgm:effectClrLst/>
+    <dgm:txLinClrLst/>
+    <dgm:txFillClrLst meth="repeat">
+      <a:schemeClr val="dk1"/>
+    </dgm:txFillClrLst>
+    <dgm:txEffectClrLst/>
+  </dgm:styleLbl>
+  <dgm:styleLbl name="bgAcc1">
+    <dgm:fillClrLst meth="repeat">
+      <a:schemeClr val="lt1">
+        <a:alpha val="90000"/>
+      </a:schemeClr>
+    </dgm:fillClrLst>
+    <dgm:linClrLst meth="repeat">
+      <a:schemeClr val="accent1"/>
+    </dgm:linClrLst>
+    <dgm:effectClrLst/>
+    <dgm:txLinClrLst/>
+    <dgm:txFillClrLst meth="repeat">
+      <a:schemeClr val="dk1"/>
+    </dgm:txFillClrLst>
+    <dgm:txEffectClrLst/>
+  </dgm:styleLbl>
+  <dgm:styleLbl name="solidFgAcc1">
+    <dgm:fillClrLst meth="repeat">
+      <a:schemeClr val="lt1"/>
+    </dgm:fillClrLst>
+    <dgm:linClrLst meth="repeat">
+      <a:schemeClr val="accent1"/>
+    </dgm:linClrLst>
+    <dgm:effectClrLst/>
+    <dgm:txLinClrLst/>
+    <dgm:txFillClrLst meth="repeat">
+      <a:schemeClr val="dk1"/>
+    </dgm:txFillClrLst>
+    <dgm:txEffectClrLst/>
+  </dgm:styleLbl>
+  <dgm:styleLbl name="solidAlignAcc1">
+    <dgm:fillClrLst meth="repeat">
+      <a:schemeClr val="lt1"/>
+    </dgm:fillClrLst>
+    <dgm:linClrLst meth="repeat">
+      <a:schemeClr val="accent1"/>
+    </dgm:linClrLst>
+    <dgm:effectClrLst/>
+    <dgm:txLinClrLst/>
+    <dgm:txFillClrLst meth="repeat">
+      <a:schemeClr val="dk1"/>
+    </dgm:txFillClrLst>
+    <dgm:txEffectClrLst/>
+  </dgm:styleLbl>
+  <dgm:styleLbl name="solidBgAcc1">
+    <dgm:fillClrLst meth="repeat">
+      <a:schemeClr val="lt1"/>
+    </dgm:fillClrLst>
+    <dgm:linClrLst meth="repeat">
+      <a:schemeClr val="accent1"/>
+    </dgm:linClrLst>
+    <dgm:effectClrLst/>
+    <dgm:txLinClrLst/>
+    <dgm:txFillClrLst meth="repeat">
+      <a:schemeClr val="dk1"/>
+    </dgm:txFillClrLst>
+    <dgm:txEffectClrLst/>
+  </dgm:styleLbl>
+  <dgm:styleLbl name="fgAccFollowNode1">
+    <dgm:fillClrLst meth="repeat">
+      <a:schemeClr val="accent1">
+        <a:alpha val="90000"/>
+        <a:tint val="40000"/>
+      </a:schemeClr>
+    </dgm:fillClrLst>
+    <dgm:linClrLst meth="repeat">
+      <a:schemeClr val="accent1">
+        <a:alpha val="90000"/>
+        <a:tint val="40000"/>
+      </a:schemeClr>
+    </dgm:linClrLst>
+    <dgm:effectClrLst/>
+    <dgm:txLinClrLst/>
+    <dgm:txFillClrLst meth="repeat">
+      <a:schemeClr val="dk1"/>
+    </dgm:txFillClrLst>
+    <dgm:txEffectClrLst/>
+  </dgm:styleLbl>
+  <dgm:styleLbl name="alignAccFollowNode1">
+    <dgm:fillClrLst meth="repeat">
+      <a:schemeClr val="accent1">
+        <a:alpha val="90000"/>
+        <a:tint val="40000"/>
+      </a:schemeClr>
+    </dgm:fillClrLst>
+    <dgm:linClrLst meth="repeat">
+      <a:schemeClr val="accent1">
+        <a:alpha val="90000"/>
+        <a:tint val="40000"/>
+      </a:schemeClr>
+    </dgm:linClrLst>
+    <dgm:effectClrLst/>
+    <dgm:txLinClrLst/>
+    <dgm:txFillClrLst meth="repeat">
+      <a:schemeClr val="dk1"/>
+    </dgm:txFillClrLst>
+    <dgm:txEffectClrLst/>
+  </dgm:styleLbl>
+  <dgm:styleLbl name="bgAccFollowNode1">
+    <dgm:fillClrLst meth="repeat">
+      <a:schemeClr val="accent1">
+        <a:alpha val="90000"/>
+        <a:tint val="40000"/>
+      </a:schemeClr>
+    </dgm:fillClrLst>
+    <dgm:linClrLst meth="repeat">
+      <a:schemeClr val="accent1">
+        <a:alpha val="90000"/>
+        <a:tint val="40000"/>
+      </a:schemeClr>
+    </dgm:linClrLst>
+    <dgm:effectClrLst/>
+    <dgm:txLinClrLst/>
+    <dgm:txFillClrLst meth="repeat">
+      <a:schemeClr val="dk1"/>
+    </dgm:txFillClrLst>
+    <dgm:txEffectClrLst/>
+  </dgm:styleLbl>
+  <dgm:styleLbl name="fgAcc0">
+    <dgm:fillClrLst meth="repeat">
+      <a:schemeClr val="lt1">
+        <a:alpha val="90000"/>
+      </a:schemeClr>
+    </dgm:fillClrLst>
+    <dgm:linClrLst meth="repeat">
+      <a:schemeClr val="accent1"/>
+    </dgm:linClrLst>
+    <dgm:effectClrLst/>
+    <dgm:txLinClrLst/>
+    <dgm:txFillClrLst meth="repeat">
+      <a:schemeClr val="dk1"/>
+    </dgm:txFillClrLst>
+    <dgm:txEffectClrLst/>
+  </dgm:styleLbl>
+  <dgm:styleLbl name="fgAcc2">
+    <dgm:fillClrLst meth="repeat">
+      <a:schemeClr val="lt1">
+        <a:alpha val="90000"/>
+      </a:schemeClr>
+    </dgm:fillClrLst>
+    <dgm:linClrLst meth="repeat">
+      <a:schemeClr val="accent1"/>
+    </dgm:linClrLst>
+    <dgm:effectClrLst/>
+    <dgm:txLinClrLst/>
+    <dgm:txFillClrLst meth="repeat">
+      <a:schemeClr val="dk1"/>
+    </dgm:txFillClrLst>
+    <dgm:txEffectClrLst/>
+  </dgm:styleLbl>
+  <dgm:styleLbl name="fgAcc3">
+    <dgm:fillClrLst meth="repeat">
+      <a:schemeClr val="lt1">
+        <a:alpha val="90000"/>
+      </a:schemeClr>
+    </dgm:fillClrLst>
+    <dgm:linClrLst meth="repeat">
+      <a:schemeClr val="accent1"/>
+    </dgm:linClrLst>
+    <dgm:effectClrLst/>
+    <dgm:txLinClrLst/>
+    <dgm:txFillClrLst meth="repeat">
+      <a:schemeClr val="dk1"/>
+    </dgm:txFillClrLst>
+    <dgm:txEffectClrLst/>
+  </dgm:styleLbl>
+  <dgm:styleLbl name="fgAcc4">
+    <dgm:fillClrLst meth="repeat">
+      <a:schemeClr val="lt1">
+        <a:alpha val="90000"/>
+      </a:schemeClr>
+    </dgm:fillClrLst>
+    <dgm:linClrLst meth="repeat">
+      <a:schemeClr val="accent1"/>
+    </dgm:linClrLst>
+    <dgm:effectClrLst/>
+    <dgm:txLinClrLst/>
+    <dgm:txFillClrLst meth="repeat">
+      <a:schemeClr val="dk1"/>
+    </dgm:txFillClrLst>
+    <dgm:txEffectClrLst/>
+  </dgm:styleLbl>
+  <dgm:styleLbl name="bgShp">
+    <dgm:fillClrLst meth="repeat">
+      <a:schemeClr val="accent1">
+        <a:tint val="40000"/>
+      </a:schemeClr>
+    </dgm:fillClrLst>
+    <dgm:linClrLst meth="repeat">
+      <a:schemeClr val="accent1"/>
+    </dgm:linClrLst>
+    <dgm:effectClrLst/>
+    <dgm:txLinClrLst/>
+    <dgm:txFillClrLst meth="repeat">
+      <a:schemeClr val="dk1"/>
+    </dgm:txFillClrLst>
+    <dgm:txEffectClrLst/>
+  </dgm:styleLbl>
+  <dgm:styleLbl name="dkBgShp">
+    <dgm:fillClrLst meth="repeat">
+      <a:schemeClr val="accent1">
+        <a:shade val="80000"/>
+      </a:schemeClr>
+    </dgm:fillClrLst>
+    <dgm:linClrLst meth="repeat">
+      <a:schemeClr val="accent1"/>
+    </dgm:linClrLst>
+    <dgm:effectClrLst/>
+    <dgm:txLinClrLst/>
+    <dgm:txFillClrLst meth="repeat">
+      <a:schemeClr val="lt1"/>
+    </dgm:txFillClrLst>
+    <dgm:txEffectClrLst/>
+  </dgm:styleLbl>
+  <dgm:styleLbl name="trBgShp">
+    <dgm:fillClrLst meth="repeat">
+      <a:schemeClr val="accent1">
+        <a:tint val="50000"/>
+        <a:alpha val="40000"/>
+      </a:schemeClr>
+    </dgm:fillClrLst>
+    <dgm:linClrLst meth="repeat">
+      <a:schemeClr val="accent1"/>
+    </dgm:linClrLst>
+    <dgm:effectClrLst/>
+    <dgm:txLinClrLst/>
+    <dgm:txFillClrLst meth="repeat">
+      <a:schemeClr val="lt1"/>
+    </dgm:txFillClrLst>
+    <dgm:txEffectClrLst/>
+  </dgm:styleLbl>
+  <dgm:styleLbl name="fgShp">
+    <dgm:fillClrLst meth="repeat">
+      <a:schemeClr val="accent1">
+        <a:tint val="60000"/>
+      </a:schemeClr>
+    </dgm:fillClrLst>
+    <dgm:linClrLst meth="repeat">
+      <a:schemeClr val="lt1"/>
+    </dgm:linClrLst>
+    <dgm:effectClrLst/>
+    <dgm:txLinClrLst/>
+    <dgm:txFillClrLst meth="repeat">
+      <a:schemeClr val="dk1"/>
+    </dgm:txFillClrLst>
+    <dgm:txEffectClrLst/>
+  </dgm:styleLbl>
+  <dgm:styleLbl name="revTx">
+    <dgm:fillClrLst meth="repeat">
+      <a:schemeClr val="lt1">
+        <a:alpha val="0"/>
+      </a:schemeClr>
+    </dgm:fillClrLst>
+    <dgm:linClrLst meth="repeat">
+      <a:schemeClr val="dk1">
+        <a:alpha val="0"/>
+      </a:schemeClr>
+    </dgm:linClrLst>
+    <dgm:effectClrLst/>
+    <dgm:txLinClrLst/>
+    <dgm:txFillClrLst meth="repeat">
+      <a:schemeClr val="tx1"/>
+    </dgm:txFillClrLst>
+    <dgm:txEffectClrLst/>
+  </dgm:styleLbl>
+</dgm:colorsDef>
+</file>
+
+<file path=ppt/diagrams/data1.xml><?xml version="1.0" encoding="utf-8"?>
+<dgm:dataModel xmlns:dgm="http://schemas.openxmlformats.org/drawingml/2006/diagram" xmlns:a="http://schemas.openxmlformats.org/drawingml/2006/main">
+  <dgm:ptLst>
+    <dgm:pt modelId="{0E883DC7-6F23-0E4B-A1FC-DC1CFAF3404D}" type="doc">
+      <dgm:prSet loTypeId="urn:microsoft.com/office/officeart/2005/8/layout/cycle5" loCatId="cycle" qsTypeId="urn:microsoft.com/office/officeart/2005/8/quickstyle/simple4" qsCatId="simple" csTypeId="urn:microsoft.com/office/officeart/2005/8/colors/accent1_2" csCatId="accent1" phldr="1"/>
+      <dgm:spPr/>
+      <dgm:t>
+        <a:bodyPr/>
+        <a:lstStyle/>
+        <a:p>
+          <a:endParaRPr lang="en-US"/>
+        </a:p>
+      </dgm:t>
+    </dgm:pt>
+    <dgm:pt modelId="{ACAF09C7-E032-7543-BAAB-8D9E3B876A7E}">
+      <dgm:prSet phldrT="[Text]"/>
+      <dgm:spPr/>
+      <dgm:t>
+        <a:bodyPr/>
+        <a:lstStyle/>
+        <a:p>
+          <a:r>
+            <a:rPr lang="en-US" dirty="0" smtClean="0"/>
+            <a:t>Sensors</a:t>
+          </a:r>
+          <a:endParaRPr lang="en-US" dirty="0"/>
+        </a:p>
+      </dgm:t>
+    </dgm:pt>
+    <dgm:pt modelId="{95309B1B-800E-1849-BC03-99FB285530D5}" type="parTrans" cxnId="{7790BF08-4802-5049-A744-F909034F8B30}">
+      <dgm:prSet/>
+      <dgm:spPr/>
+      <dgm:t>
+        <a:bodyPr/>
+        <a:lstStyle/>
+        <a:p>
+          <a:endParaRPr lang="en-US"/>
+        </a:p>
+      </dgm:t>
+    </dgm:pt>
+    <dgm:pt modelId="{33CE3A59-B02F-0647-866E-F8DA5BE6D937}" type="sibTrans" cxnId="{7790BF08-4802-5049-A744-F909034F8B30}">
+      <dgm:prSet/>
+      <dgm:spPr/>
+      <dgm:t>
+        <a:bodyPr/>
+        <a:lstStyle/>
+        <a:p>
+          <a:endParaRPr lang="en-US"/>
+        </a:p>
+      </dgm:t>
+    </dgm:pt>
+    <dgm:pt modelId="{C6F4BC71-BC3F-BB42-9003-9DB962B43960}">
+      <dgm:prSet phldrT="[Text]"/>
+      <dgm:spPr/>
+      <dgm:t>
+        <a:bodyPr/>
+        <a:lstStyle/>
+        <a:p>
+          <a:r>
+            <a:rPr lang="en-US" dirty="0" err="1" smtClean="0"/>
+            <a:t>Kalman</a:t>
+          </a:r>
+          <a:endParaRPr lang="en-US" dirty="0" smtClean="0"/>
+        </a:p>
+        <a:p>
+          <a:r>
+            <a:rPr lang="en-US" dirty="0" smtClean="0"/>
+            <a:t>Filter</a:t>
+          </a:r>
+          <a:endParaRPr lang="en-US" dirty="0"/>
+        </a:p>
+      </dgm:t>
+    </dgm:pt>
+    <dgm:pt modelId="{07C62855-5B0A-5943-AECE-DDA509EBD562}" type="parTrans" cxnId="{2FFA25C4-6C10-1C4E-877F-65BFC6B05CEF}">
+      <dgm:prSet/>
+      <dgm:spPr/>
+      <dgm:t>
+        <a:bodyPr/>
+        <a:lstStyle/>
+        <a:p>
+          <a:endParaRPr lang="en-US"/>
+        </a:p>
+      </dgm:t>
+    </dgm:pt>
+    <dgm:pt modelId="{01DBAE1B-891A-0D49-9B16-38C46492593F}" type="sibTrans" cxnId="{2FFA25C4-6C10-1C4E-877F-65BFC6B05CEF}">
+      <dgm:prSet/>
+      <dgm:spPr/>
+      <dgm:t>
+        <a:bodyPr/>
+        <a:lstStyle/>
+        <a:p>
+          <a:endParaRPr lang="en-US"/>
+        </a:p>
+      </dgm:t>
+    </dgm:pt>
+    <dgm:pt modelId="{4B5D62E8-3CD4-CE48-A01F-D5E61DF5E12B}">
+      <dgm:prSet phldrT="[Text]"/>
+      <dgm:spPr/>
+      <dgm:t>
+        <a:bodyPr/>
+        <a:lstStyle/>
+        <a:p>
+          <a:r>
+            <a:rPr lang="en-US" dirty="0" smtClean="0"/>
+            <a:t>PID</a:t>
+          </a:r>
+          <a:endParaRPr lang="en-US" dirty="0"/>
+        </a:p>
+      </dgm:t>
+    </dgm:pt>
+    <dgm:pt modelId="{B289E805-4703-0846-886F-8C79C13FDE7F}" type="parTrans" cxnId="{27DFCE2D-CB37-3049-A6DE-B4A16ACEE385}">
+      <dgm:prSet/>
+      <dgm:spPr/>
+      <dgm:t>
+        <a:bodyPr/>
+        <a:lstStyle/>
+        <a:p>
+          <a:endParaRPr lang="en-US"/>
+        </a:p>
+      </dgm:t>
+    </dgm:pt>
+    <dgm:pt modelId="{C7524BB0-4417-DD43-B9D2-7AE6D1005AC9}" type="sibTrans" cxnId="{27DFCE2D-CB37-3049-A6DE-B4A16ACEE385}">
+      <dgm:prSet/>
+      <dgm:spPr/>
+      <dgm:t>
+        <a:bodyPr/>
+        <a:lstStyle/>
+        <a:p>
+          <a:endParaRPr lang="en-US"/>
+        </a:p>
+      </dgm:t>
+    </dgm:pt>
+    <dgm:pt modelId="{7986A717-0C83-C845-BCED-76D8C66EA184}">
+      <dgm:prSet phldrT="[Text]"/>
+      <dgm:spPr/>
+      <dgm:t>
+        <a:bodyPr/>
+        <a:lstStyle/>
+        <a:p>
+          <a:r>
+            <a:rPr lang="en-US" dirty="0" smtClean="0"/>
+            <a:t>Motors</a:t>
+          </a:r>
+          <a:endParaRPr lang="en-US" dirty="0"/>
+        </a:p>
+      </dgm:t>
+    </dgm:pt>
+    <dgm:pt modelId="{BE293FED-2827-5244-83E2-66AC59FA4121}" type="parTrans" cxnId="{3604CCB6-B579-9946-9F52-2EE6B0A04475}">
+      <dgm:prSet/>
+      <dgm:spPr/>
+      <dgm:t>
+        <a:bodyPr/>
+        <a:lstStyle/>
+        <a:p>
+          <a:endParaRPr lang="en-US"/>
+        </a:p>
+      </dgm:t>
+    </dgm:pt>
+    <dgm:pt modelId="{4F7CE574-7F16-6946-B2FC-F1F5A901B684}" type="sibTrans" cxnId="{3604CCB6-B579-9946-9F52-2EE6B0A04475}">
+      <dgm:prSet/>
+      <dgm:spPr/>
+      <dgm:t>
+        <a:bodyPr/>
+        <a:lstStyle/>
+        <a:p>
+          <a:endParaRPr lang="en-US"/>
+        </a:p>
+      </dgm:t>
+    </dgm:pt>
+    <dgm:pt modelId="{BC00A7C1-27C8-624A-9183-30627CEDA211}" type="pres">
+      <dgm:prSet presAssocID="{0E883DC7-6F23-0E4B-A1FC-DC1CFAF3404D}" presName="cycle" presStyleCnt="0">
+        <dgm:presLayoutVars>
+          <dgm:dir/>
+          <dgm:resizeHandles val="exact"/>
+        </dgm:presLayoutVars>
+      </dgm:prSet>
+      <dgm:spPr/>
+    </dgm:pt>
+    <dgm:pt modelId="{1B2B37A4-C114-4042-AAC9-EFCCF1C02A77}" type="pres">
+      <dgm:prSet presAssocID="{ACAF09C7-E032-7543-BAAB-8D9E3B876A7E}" presName="node" presStyleLbl="node1" presStyleIdx="0" presStyleCnt="4">
+        <dgm:presLayoutVars>
+          <dgm:bulletEnabled val="1"/>
+        </dgm:presLayoutVars>
+      </dgm:prSet>
+      <dgm:spPr/>
+    </dgm:pt>
+    <dgm:pt modelId="{37B43204-F147-8045-8B8C-013AFDBE4E6C}" type="pres">
+      <dgm:prSet presAssocID="{ACAF09C7-E032-7543-BAAB-8D9E3B876A7E}" presName="spNode" presStyleCnt="0"/>
+      <dgm:spPr/>
+    </dgm:pt>
+    <dgm:pt modelId="{C021B61F-DB15-6840-B806-1944E4D55DA2}" type="pres">
+      <dgm:prSet presAssocID="{33CE3A59-B02F-0647-866E-F8DA5BE6D937}" presName="sibTrans" presStyleLbl="sibTrans1D1" presStyleIdx="0" presStyleCnt="4"/>
+      <dgm:spPr/>
+    </dgm:pt>
+    <dgm:pt modelId="{1A725A1A-60A7-F344-B49B-3B22B207F605}" type="pres">
+      <dgm:prSet presAssocID="{C6F4BC71-BC3F-BB42-9003-9DB962B43960}" presName="node" presStyleLbl="node1" presStyleIdx="1" presStyleCnt="4">
+        <dgm:presLayoutVars>
+          <dgm:bulletEnabled val="1"/>
+        </dgm:presLayoutVars>
+      </dgm:prSet>
+      <dgm:spPr/>
+    </dgm:pt>
+    <dgm:pt modelId="{A775786C-AFB4-A64A-8A75-AB50EEC781A6}" type="pres">
+      <dgm:prSet presAssocID="{C6F4BC71-BC3F-BB42-9003-9DB962B43960}" presName="spNode" presStyleCnt="0"/>
+      <dgm:spPr/>
+    </dgm:pt>
+    <dgm:pt modelId="{34CEC51D-9553-FB4A-972F-F4FB57899578}" type="pres">
+      <dgm:prSet presAssocID="{01DBAE1B-891A-0D49-9B16-38C46492593F}" presName="sibTrans" presStyleLbl="sibTrans1D1" presStyleIdx="1" presStyleCnt="4"/>
+      <dgm:spPr/>
+    </dgm:pt>
+    <dgm:pt modelId="{4CC85611-5B46-DD47-A036-84952640A776}" type="pres">
+      <dgm:prSet presAssocID="{4B5D62E8-3CD4-CE48-A01F-D5E61DF5E12B}" presName="node" presStyleLbl="node1" presStyleIdx="2" presStyleCnt="4">
+        <dgm:presLayoutVars>
+          <dgm:bulletEnabled val="1"/>
+        </dgm:presLayoutVars>
+      </dgm:prSet>
+      <dgm:spPr/>
+    </dgm:pt>
+    <dgm:pt modelId="{DD8C9C75-0E7E-1740-94B2-66703B0E06A6}" type="pres">
+      <dgm:prSet presAssocID="{4B5D62E8-3CD4-CE48-A01F-D5E61DF5E12B}" presName="spNode" presStyleCnt="0"/>
+      <dgm:spPr/>
+    </dgm:pt>
+    <dgm:pt modelId="{2BF87480-2109-6847-AB38-8D93CBD29417}" type="pres">
+      <dgm:prSet presAssocID="{C7524BB0-4417-DD43-B9D2-7AE6D1005AC9}" presName="sibTrans" presStyleLbl="sibTrans1D1" presStyleIdx="2" presStyleCnt="4"/>
+      <dgm:spPr/>
+    </dgm:pt>
+    <dgm:pt modelId="{65EBEFCD-71E2-B049-BA8E-0C30C88B7618}" type="pres">
+      <dgm:prSet presAssocID="{7986A717-0C83-C845-BCED-76D8C66EA184}" presName="node" presStyleLbl="node1" presStyleIdx="3" presStyleCnt="4">
+        <dgm:presLayoutVars>
+          <dgm:bulletEnabled val="1"/>
+        </dgm:presLayoutVars>
+      </dgm:prSet>
+      <dgm:spPr/>
+    </dgm:pt>
+    <dgm:pt modelId="{16F4A649-A907-8C42-A860-EDE6A8F7CBD9}" type="pres">
+      <dgm:prSet presAssocID="{7986A717-0C83-C845-BCED-76D8C66EA184}" presName="spNode" presStyleCnt="0"/>
+      <dgm:spPr/>
+    </dgm:pt>
+    <dgm:pt modelId="{EC9A134C-8897-CD43-A64E-2F93DD9FFFC8}" type="pres">
+      <dgm:prSet presAssocID="{4F7CE574-7F16-6946-B2FC-F1F5A901B684}" presName="sibTrans" presStyleLbl="sibTrans1D1" presStyleIdx="3" presStyleCnt="4"/>
+      <dgm:spPr/>
+    </dgm:pt>
+  </dgm:ptLst>
+  <dgm:cxnLst>
+    <dgm:cxn modelId="{27DFCE2D-CB37-3049-A6DE-B4A16ACEE385}" srcId="{0E883DC7-6F23-0E4B-A1FC-DC1CFAF3404D}" destId="{4B5D62E8-3CD4-CE48-A01F-D5E61DF5E12B}" srcOrd="2" destOrd="0" parTransId="{B289E805-4703-0846-886F-8C79C13FDE7F}" sibTransId="{C7524BB0-4417-DD43-B9D2-7AE6D1005AC9}"/>
+    <dgm:cxn modelId="{16713589-BE41-9C43-8B0C-49B7DB368F6F}" type="presOf" srcId="{C6F4BC71-BC3F-BB42-9003-9DB962B43960}" destId="{1A725A1A-60A7-F344-B49B-3B22B207F605}" srcOrd="0" destOrd="0" presId="urn:microsoft.com/office/officeart/2005/8/layout/cycle5"/>
+    <dgm:cxn modelId="{D7EA3EAB-90E4-6447-BB84-6430DD2B040D}" type="presOf" srcId="{4F7CE574-7F16-6946-B2FC-F1F5A901B684}" destId="{EC9A134C-8897-CD43-A64E-2F93DD9FFFC8}" srcOrd="0" destOrd="0" presId="urn:microsoft.com/office/officeart/2005/8/layout/cycle5"/>
+    <dgm:cxn modelId="{F4C77B86-66E1-4449-A43D-65E84123816B}" type="presOf" srcId="{ACAF09C7-E032-7543-BAAB-8D9E3B876A7E}" destId="{1B2B37A4-C114-4042-AAC9-EFCCF1C02A77}" srcOrd="0" destOrd="0" presId="urn:microsoft.com/office/officeart/2005/8/layout/cycle5"/>
+    <dgm:cxn modelId="{2FFA25C4-6C10-1C4E-877F-65BFC6B05CEF}" srcId="{0E883DC7-6F23-0E4B-A1FC-DC1CFAF3404D}" destId="{C6F4BC71-BC3F-BB42-9003-9DB962B43960}" srcOrd="1" destOrd="0" parTransId="{07C62855-5B0A-5943-AECE-DDA509EBD562}" sibTransId="{01DBAE1B-891A-0D49-9B16-38C46492593F}"/>
+    <dgm:cxn modelId="{05E75E90-9CDB-6F42-B714-8D9736DDE5AB}" type="presOf" srcId="{0E883DC7-6F23-0E4B-A1FC-DC1CFAF3404D}" destId="{BC00A7C1-27C8-624A-9183-30627CEDA211}" srcOrd="0" destOrd="0" presId="urn:microsoft.com/office/officeart/2005/8/layout/cycle5"/>
+    <dgm:cxn modelId="{4924DE7D-DB1E-4A4D-8441-FB557CA0DBA5}" type="presOf" srcId="{C7524BB0-4417-DD43-B9D2-7AE6D1005AC9}" destId="{2BF87480-2109-6847-AB38-8D93CBD29417}" srcOrd="0" destOrd="0" presId="urn:microsoft.com/office/officeart/2005/8/layout/cycle5"/>
+    <dgm:cxn modelId="{7790BF08-4802-5049-A744-F909034F8B30}" srcId="{0E883DC7-6F23-0E4B-A1FC-DC1CFAF3404D}" destId="{ACAF09C7-E032-7543-BAAB-8D9E3B876A7E}" srcOrd="0" destOrd="0" parTransId="{95309B1B-800E-1849-BC03-99FB285530D5}" sibTransId="{33CE3A59-B02F-0647-866E-F8DA5BE6D937}"/>
+    <dgm:cxn modelId="{D0A89AE4-A121-F945-8086-36622637582F}" type="presOf" srcId="{33CE3A59-B02F-0647-866E-F8DA5BE6D937}" destId="{C021B61F-DB15-6840-B806-1944E4D55DA2}" srcOrd="0" destOrd="0" presId="urn:microsoft.com/office/officeart/2005/8/layout/cycle5"/>
+    <dgm:cxn modelId="{277C5A28-0E83-204A-9478-0D8BACFE47B4}" type="presOf" srcId="{7986A717-0C83-C845-BCED-76D8C66EA184}" destId="{65EBEFCD-71E2-B049-BA8E-0C30C88B7618}" srcOrd="0" destOrd="0" presId="urn:microsoft.com/office/officeart/2005/8/layout/cycle5"/>
+    <dgm:cxn modelId="{F47CC59F-8BFF-8142-A7C6-7ABC16B1B652}" type="presOf" srcId="{01DBAE1B-891A-0D49-9B16-38C46492593F}" destId="{34CEC51D-9553-FB4A-972F-F4FB57899578}" srcOrd="0" destOrd="0" presId="urn:microsoft.com/office/officeart/2005/8/layout/cycle5"/>
+    <dgm:cxn modelId="{833AF670-7248-5147-ABCB-F25C8A125974}" type="presOf" srcId="{4B5D62E8-3CD4-CE48-A01F-D5E61DF5E12B}" destId="{4CC85611-5B46-DD47-A036-84952640A776}" srcOrd="0" destOrd="0" presId="urn:microsoft.com/office/officeart/2005/8/layout/cycle5"/>
+    <dgm:cxn modelId="{3604CCB6-B579-9946-9F52-2EE6B0A04475}" srcId="{0E883DC7-6F23-0E4B-A1FC-DC1CFAF3404D}" destId="{7986A717-0C83-C845-BCED-76D8C66EA184}" srcOrd="3" destOrd="0" parTransId="{BE293FED-2827-5244-83E2-66AC59FA4121}" sibTransId="{4F7CE574-7F16-6946-B2FC-F1F5A901B684}"/>
+    <dgm:cxn modelId="{3AED0852-C993-AC41-89B3-003AEE5BC2A6}" type="presParOf" srcId="{BC00A7C1-27C8-624A-9183-30627CEDA211}" destId="{1B2B37A4-C114-4042-AAC9-EFCCF1C02A77}" srcOrd="0" destOrd="0" presId="urn:microsoft.com/office/officeart/2005/8/layout/cycle5"/>
+    <dgm:cxn modelId="{5F3B053C-6758-994D-A202-412C136FE67D}" type="presParOf" srcId="{BC00A7C1-27C8-624A-9183-30627CEDA211}" destId="{37B43204-F147-8045-8B8C-013AFDBE4E6C}" srcOrd="1" destOrd="0" presId="urn:microsoft.com/office/officeart/2005/8/layout/cycle5"/>
+    <dgm:cxn modelId="{4416F39D-54BB-794F-89F7-427CEF8BDFBF}" type="presParOf" srcId="{BC00A7C1-27C8-624A-9183-30627CEDA211}" destId="{C021B61F-DB15-6840-B806-1944E4D55DA2}" srcOrd="2" destOrd="0" presId="urn:microsoft.com/office/officeart/2005/8/layout/cycle5"/>
+    <dgm:cxn modelId="{E63A628B-3505-7C44-96ED-48D467AFFCAA}" type="presParOf" srcId="{BC00A7C1-27C8-624A-9183-30627CEDA211}" destId="{1A725A1A-60A7-F344-B49B-3B22B207F605}" srcOrd="3" destOrd="0" presId="urn:microsoft.com/office/officeart/2005/8/layout/cycle5"/>
+    <dgm:cxn modelId="{03BC481E-72EE-ED48-8707-0CF480BA1C5C}" type="presParOf" srcId="{BC00A7C1-27C8-624A-9183-30627CEDA211}" destId="{A775786C-AFB4-A64A-8A75-AB50EEC781A6}" srcOrd="4" destOrd="0" presId="urn:microsoft.com/office/officeart/2005/8/layout/cycle5"/>
+    <dgm:cxn modelId="{32649BC9-EBCE-9542-A33B-6FCBB0F3CC5B}" type="presParOf" srcId="{BC00A7C1-27C8-624A-9183-30627CEDA211}" destId="{34CEC51D-9553-FB4A-972F-F4FB57899578}" srcOrd="5" destOrd="0" presId="urn:microsoft.com/office/officeart/2005/8/layout/cycle5"/>
+    <dgm:cxn modelId="{BBFD4657-419C-1F41-A188-0B5C7A0CC2A6}" type="presParOf" srcId="{BC00A7C1-27C8-624A-9183-30627CEDA211}" destId="{4CC85611-5B46-DD47-A036-84952640A776}" srcOrd="6" destOrd="0" presId="urn:microsoft.com/office/officeart/2005/8/layout/cycle5"/>
+    <dgm:cxn modelId="{62521BB6-ED3A-3B42-9E20-CB810D7E2843}" type="presParOf" srcId="{BC00A7C1-27C8-624A-9183-30627CEDA211}" destId="{DD8C9C75-0E7E-1740-94B2-66703B0E06A6}" srcOrd="7" destOrd="0" presId="urn:microsoft.com/office/officeart/2005/8/layout/cycle5"/>
+    <dgm:cxn modelId="{68FC5CA4-D232-7444-B60F-40006F11AFEF}" type="presParOf" srcId="{BC00A7C1-27C8-624A-9183-30627CEDA211}" destId="{2BF87480-2109-6847-AB38-8D93CBD29417}" srcOrd="8" destOrd="0" presId="urn:microsoft.com/office/officeart/2005/8/layout/cycle5"/>
+    <dgm:cxn modelId="{AE96CDB7-88BF-674C-82DA-93B24BA3B35A}" type="presParOf" srcId="{BC00A7C1-27C8-624A-9183-30627CEDA211}" destId="{65EBEFCD-71E2-B049-BA8E-0C30C88B7618}" srcOrd="9" destOrd="0" presId="urn:microsoft.com/office/officeart/2005/8/layout/cycle5"/>
+    <dgm:cxn modelId="{616A4D33-B4F8-2B43-94E2-9BF3A31296BB}" type="presParOf" srcId="{BC00A7C1-27C8-624A-9183-30627CEDA211}" destId="{16F4A649-A907-8C42-A860-EDE6A8F7CBD9}" srcOrd="10" destOrd="0" presId="urn:microsoft.com/office/officeart/2005/8/layout/cycle5"/>
+    <dgm:cxn modelId="{62281DEF-2D52-7C45-B4BD-F4159FB9AC55}" type="presParOf" srcId="{BC00A7C1-27C8-624A-9183-30627CEDA211}" destId="{EC9A134C-8897-CD43-A64E-2F93DD9FFFC8}" srcOrd="11" destOrd="0" presId="urn:microsoft.com/office/officeart/2005/8/layout/cycle5"/>
+  </dgm:cxnLst>
+  <dgm:bg/>
+  <dgm:whole/>
+  <dgm:extLst>
+    <a:ext uri="http://schemas.microsoft.com/office/drawing/2008/diagram">
+      <dsp:dataModelExt xmlns:dsp="http://schemas.microsoft.com/office/drawing/2008/diagram" xmlns="" relId="rId6" minVer="http://schemas.openxmlformats.org/drawingml/2006/diagram"/>
+    </a:ext>
+  </dgm:extLst>
+</dgm:dataModel>
+</file>
+
+<file path=ppt/diagrams/drawing1.xml><?xml version="1.0" encoding="utf-8"?>
+<dsp:drawing xmlns:dgm="http://schemas.openxmlformats.org/drawingml/2006/diagram" xmlns:a="http://schemas.openxmlformats.org/drawingml/2006/main" xmlns:dsp="http://schemas.microsoft.com/office/drawing/2008/diagram">
+  <dsp:spTree>
+    <dsp:nvGrpSpPr>
+      <dsp:cNvPr id="0" name=""/>
+      <dsp:cNvGrpSpPr/>
+    </dsp:nvGrpSpPr>
+    <dsp:grpSpPr/>
+    <dsp:sp modelId="{1B2B37A4-C114-4042-AAC9-EFCCF1C02A77}">
+      <dsp:nvSpPr>
+        <dsp:cNvPr id="0" name=""/>
+        <dsp:cNvSpPr/>
+      </dsp:nvSpPr>
+      <dsp:spPr>
+        <a:xfrm>
+          <a:off x="3959200" y="844"/>
+          <a:ext cx="1225599" cy="796639"/>
+        </a:xfrm>
+        <a:prstGeom prst="roundRect">
+          <a:avLst/>
+        </a:prstGeom>
+        <a:gradFill rotWithShape="0">
+          <a:gsLst>
+            <a:gs pos="0">
+              <a:schemeClr val="accent1">
+                <a:hueOff val="0"/>
+                <a:satOff val="0"/>
+                <a:lumOff val="0"/>
+                <a:alphaOff val="0"/>
+                <a:tint val="75000"/>
+                <a:shade val="85000"/>
+                <a:satMod val="230000"/>
+              </a:schemeClr>
+            </a:gs>
+            <a:gs pos="25000">
+              <a:schemeClr val="accent1">
+                <a:hueOff val="0"/>
+                <a:satOff val="0"/>
+                <a:lumOff val="0"/>
+                <a:alphaOff val="0"/>
+                <a:tint val="90000"/>
+                <a:shade val="70000"/>
+                <a:satMod val="220000"/>
+              </a:schemeClr>
+            </a:gs>
+            <a:gs pos="50000">
+              <a:schemeClr val="accent1">
+                <a:hueOff val="0"/>
+                <a:satOff val="0"/>
+                <a:lumOff val="0"/>
+                <a:alphaOff val="0"/>
+                <a:tint val="90000"/>
+                <a:shade val="58000"/>
+                <a:satMod val="225000"/>
+              </a:schemeClr>
+            </a:gs>
+            <a:gs pos="65000">
+              <a:schemeClr val="accent1">
+                <a:hueOff val="0"/>
+                <a:satOff val="0"/>
+                <a:lumOff val="0"/>
+                <a:alphaOff val="0"/>
+                <a:tint val="90000"/>
+                <a:shade val="58000"/>
+                <a:satMod val="225000"/>
+              </a:schemeClr>
+            </a:gs>
+            <a:gs pos="80000">
+              <a:schemeClr val="accent1">
+                <a:hueOff val="0"/>
+                <a:satOff val="0"/>
+                <a:lumOff val="0"/>
+                <a:alphaOff val="0"/>
+                <a:tint val="90000"/>
+                <a:shade val="69000"/>
+                <a:satMod val="220000"/>
+              </a:schemeClr>
+            </a:gs>
+            <a:gs pos="100000">
+              <a:schemeClr val="accent1">
+                <a:hueOff val="0"/>
+                <a:satOff val="0"/>
+                <a:lumOff val="0"/>
+                <a:alphaOff val="0"/>
+                <a:tint val="77000"/>
+                <a:shade val="80000"/>
+                <a:satMod val="230000"/>
+              </a:schemeClr>
+            </a:gs>
+          </a:gsLst>
+          <a:lin ang="5400000" scaled="1"/>
+        </a:gradFill>
+        <a:ln>
+          <a:noFill/>
+        </a:ln>
+        <a:effectLst>
+          <a:outerShdw blurRad="76200" dist="50800" dir="5400000" rotWithShape="0">
+            <a:srgbClr val="4E3B30">
+              <a:alpha val="60000"/>
+            </a:srgbClr>
+          </a:outerShdw>
+        </a:effectLst>
+        <a:scene3d>
+          <a:camera prst="orthographicFront">
+            <a:rot lat="0" lon="0" rev="0"/>
+          </a:camera>
+          <a:lightRig rig="threePt" dir="tl">
+            <a:rot lat="0" lon="0" rev="0"/>
+          </a:lightRig>
+        </a:scene3d>
+        <a:sp3d prstMaterial="metal">
+          <a:bevelT w="10000" h="10000"/>
+        </a:sp3d>
+      </dsp:spPr>
+      <dsp:style>
+        <a:lnRef idx="0">
+          <a:scrgbClr r="0" g="0" b="0"/>
+        </a:lnRef>
+        <a:fillRef idx="3">
+          <a:scrgbClr r="0" g="0" b="0"/>
+        </a:fillRef>
+        <a:effectRef idx="2">
+          <a:scrgbClr r="0" g="0" b="0"/>
+        </a:effectRef>
+        <a:fontRef idx="minor">
+          <a:schemeClr val="lt1"/>
+        </a:fontRef>
+      </dsp:style>
+      <dsp:txBody>
+        <a:bodyPr spcFirstLastPara="0" vert="horz" wrap="square" lIns="64770" tIns="64770" rIns="64770" bIns="64770" numCol="1" spcCol="1270" anchor="ctr" anchorCtr="0">
+          <a:noAutofit/>
+        </a:bodyPr>
+        <a:lstStyle/>
+        <a:p>
+          <a:pPr lvl="0" algn="ctr" defTabSz="755650">
+            <a:lnSpc>
+              <a:spcPct val="90000"/>
+            </a:lnSpc>
+            <a:spcBef>
+              <a:spcPct val="0"/>
+            </a:spcBef>
+            <a:spcAft>
+              <a:spcPct val="35000"/>
+            </a:spcAft>
+          </a:pPr>
+          <a:r>
+            <a:rPr lang="en-US" sz="1700" kern="1200" dirty="0" smtClean="0"/>
+            <a:t>Sensors</a:t>
+          </a:r>
+          <a:endParaRPr lang="en-US" sz="1700" kern="1200" dirty="0"/>
+        </a:p>
+      </dsp:txBody>
+      <dsp:txXfrm>
+        <a:off x="3959200" y="844"/>
+        <a:ext cx="1225599" cy="796639"/>
+      </dsp:txXfrm>
+    </dsp:sp>
+    <dsp:sp modelId="{C021B61F-DB15-6840-B806-1944E4D55DA2}">
+      <dsp:nvSpPr>
+        <dsp:cNvPr id="0" name=""/>
+        <dsp:cNvSpPr/>
+      </dsp:nvSpPr>
+      <dsp:spPr>
+        <a:xfrm>
+          <a:off x="3256664" y="399164"/>
+          <a:ext cx="2630670" cy="2630670"/>
+        </a:xfrm>
+        <a:custGeom>
+          <a:avLst/>
+          <a:gdLst/>
+          <a:ahLst/>
+          <a:cxnLst/>
+          <a:rect l="0" t="0" r="0" b="0"/>
+          <a:pathLst>
+            <a:path>
+              <a:moveTo>
+                <a:pt x="2097083" y="257517"/>
+              </a:moveTo>
+              <a:arcTo wR="1315335" hR="1315335" stAng="18387907" swAng="1632600"/>
+            </a:path>
+          </a:pathLst>
+        </a:custGeom>
+        <a:noFill/>
+        <a:ln w="10000" cap="flat" cmpd="sng" algn="ctr">
+          <a:solidFill>
+            <a:schemeClr val="accent1">
+              <a:hueOff val="0"/>
+              <a:satOff val="0"/>
+              <a:lumOff val="0"/>
+              <a:alphaOff val="0"/>
+            </a:schemeClr>
+          </a:solidFill>
+          <a:prstDash val="solid"/>
+          <a:tailEnd type="arrow"/>
+        </a:ln>
+        <a:effectLst/>
+      </dsp:spPr>
+      <dsp:style>
+        <a:lnRef idx="1">
+          <a:scrgbClr r="0" g="0" b="0"/>
+        </a:lnRef>
+        <a:fillRef idx="0">
+          <a:scrgbClr r="0" g="0" b="0"/>
+        </a:fillRef>
+        <a:effectRef idx="0">
+          <a:scrgbClr r="0" g="0" b="0"/>
+        </a:effectRef>
+        <a:fontRef idx="minor"/>
+      </dsp:style>
+    </dsp:sp>
+    <dsp:sp modelId="{1A725A1A-60A7-F344-B49B-3B22B207F605}">
+      <dsp:nvSpPr>
+        <dsp:cNvPr id="0" name=""/>
+        <dsp:cNvSpPr/>
+      </dsp:nvSpPr>
+      <dsp:spPr>
+        <a:xfrm>
+          <a:off x="5274535" y="1316180"/>
+          <a:ext cx="1225599" cy="796639"/>
+        </a:xfrm>
+        <a:prstGeom prst="roundRect">
+          <a:avLst/>
+        </a:prstGeom>
+        <a:gradFill rotWithShape="0">
+          <a:gsLst>
+            <a:gs pos="0">
+              <a:schemeClr val="accent1">
+                <a:hueOff val="0"/>
+                <a:satOff val="0"/>
+                <a:lumOff val="0"/>
+                <a:alphaOff val="0"/>
+                <a:tint val="75000"/>
+                <a:shade val="85000"/>
+                <a:satMod val="230000"/>
+              </a:schemeClr>
+            </a:gs>
+            <a:gs pos="25000">
+              <a:schemeClr val="accent1">
+                <a:hueOff val="0"/>
+                <a:satOff val="0"/>
+                <a:lumOff val="0"/>
+                <a:alphaOff val="0"/>
+                <a:tint val="90000"/>
+                <a:shade val="70000"/>
+                <a:satMod val="220000"/>
+              </a:schemeClr>
+            </a:gs>
+            <a:gs pos="50000">
+              <a:schemeClr val="accent1">
+                <a:hueOff val="0"/>
+                <a:satOff val="0"/>
+                <a:lumOff val="0"/>
+                <a:alphaOff val="0"/>
+                <a:tint val="90000"/>
+                <a:shade val="58000"/>
+                <a:satMod val="225000"/>
+              </a:schemeClr>
+            </a:gs>
+            <a:gs pos="65000">
+              <a:schemeClr val="accent1">
+                <a:hueOff val="0"/>
+                <a:satOff val="0"/>
+                <a:lumOff val="0"/>
+                <a:alphaOff val="0"/>
+                <a:tint val="90000"/>
+                <a:shade val="58000"/>
+                <a:satMod val="225000"/>
+              </a:schemeClr>
+            </a:gs>
+            <a:gs pos="80000">
+              <a:schemeClr val="accent1">
+                <a:hueOff val="0"/>
+                <a:satOff val="0"/>
+                <a:lumOff val="0"/>
+                <a:alphaOff val="0"/>
+                <a:tint val="90000"/>
+                <a:shade val="69000"/>
+                <a:satMod val="220000"/>
+              </a:schemeClr>
+            </a:gs>
+            <a:gs pos="100000">
+              <a:schemeClr val="accent1">
+                <a:hueOff val="0"/>
+                <a:satOff val="0"/>
+                <a:lumOff val="0"/>
+                <a:alphaOff val="0"/>
+                <a:tint val="77000"/>
+                <a:shade val="80000"/>
+                <a:satMod val="230000"/>
+              </a:schemeClr>
+            </a:gs>
+          </a:gsLst>
+          <a:lin ang="5400000" scaled="1"/>
+        </a:gradFill>
+        <a:ln>
+          <a:noFill/>
+        </a:ln>
+        <a:effectLst>
+          <a:outerShdw blurRad="76200" dist="50800" dir="5400000" rotWithShape="0">
+            <a:srgbClr val="4E3B30">
+              <a:alpha val="60000"/>
+            </a:srgbClr>
+          </a:outerShdw>
+        </a:effectLst>
+        <a:scene3d>
+          <a:camera prst="orthographicFront">
+            <a:rot lat="0" lon="0" rev="0"/>
+          </a:camera>
+          <a:lightRig rig="threePt" dir="tl">
+            <a:rot lat="0" lon="0" rev="0"/>
+          </a:lightRig>
+        </a:scene3d>
+        <a:sp3d prstMaterial="metal">
+          <a:bevelT w="10000" h="10000"/>
+        </a:sp3d>
+      </dsp:spPr>
+      <dsp:style>
+        <a:lnRef idx="0">
+          <a:scrgbClr r="0" g="0" b="0"/>
+        </a:lnRef>
+        <a:fillRef idx="3">
+          <a:scrgbClr r="0" g="0" b="0"/>
+        </a:fillRef>
+        <a:effectRef idx="2">
+          <a:scrgbClr r="0" g="0" b="0"/>
+        </a:effectRef>
+        <a:fontRef idx="minor">
+          <a:schemeClr val="lt1"/>
+        </a:fontRef>
+      </dsp:style>
+      <dsp:txBody>
+        <a:bodyPr spcFirstLastPara="0" vert="horz" wrap="square" lIns="64770" tIns="64770" rIns="64770" bIns="64770" numCol="1" spcCol="1270" anchor="ctr" anchorCtr="0">
+          <a:noAutofit/>
+        </a:bodyPr>
+        <a:lstStyle/>
+        <a:p>
+          <a:pPr lvl="0" algn="ctr" defTabSz="755650">
+            <a:lnSpc>
+              <a:spcPct val="90000"/>
+            </a:lnSpc>
+            <a:spcBef>
+              <a:spcPct val="0"/>
+            </a:spcBef>
+            <a:spcAft>
+              <a:spcPct val="35000"/>
+            </a:spcAft>
+          </a:pPr>
+          <a:r>
+            <a:rPr lang="en-US" sz="1700" kern="1200" dirty="0" err="1" smtClean="0"/>
+            <a:t>Kalman</a:t>
+          </a:r>
+          <a:endParaRPr lang="en-US" sz="1700" kern="1200" dirty="0" smtClean="0"/>
+        </a:p>
+        <a:p>
+          <a:pPr lvl="0" algn="ctr" defTabSz="755650">
+            <a:lnSpc>
+              <a:spcPct val="90000"/>
+            </a:lnSpc>
+            <a:spcBef>
+              <a:spcPct val="0"/>
+            </a:spcBef>
+            <a:spcAft>
+              <a:spcPct val="35000"/>
+            </a:spcAft>
+          </a:pPr>
+          <a:r>
+            <a:rPr lang="en-US" sz="1700" kern="1200" dirty="0" smtClean="0"/>
+            <a:t>Filter</a:t>
+          </a:r>
+          <a:endParaRPr lang="en-US" sz="1700" kern="1200" dirty="0"/>
+        </a:p>
+      </dsp:txBody>
+      <dsp:txXfrm>
+        <a:off x="5274535" y="1316180"/>
+        <a:ext cx="1225599" cy="796639"/>
+      </dsp:txXfrm>
+    </dsp:sp>
+    <dsp:sp modelId="{34CEC51D-9553-FB4A-972F-F4FB57899578}">
+      <dsp:nvSpPr>
+        <dsp:cNvPr id="0" name=""/>
+        <dsp:cNvSpPr/>
+      </dsp:nvSpPr>
+      <dsp:spPr>
+        <a:xfrm>
+          <a:off x="3256664" y="399164"/>
+          <a:ext cx="2630670" cy="2630670"/>
+        </a:xfrm>
+        <a:custGeom>
+          <a:avLst/>
+          <a:gdLst/>
+          <a:ahLst/>
+          <a:cxnLst/>
+          <a:rect l="0" t="0" r="0" b="0"/>
+          <a:pathLst>
+            <a:path>
+              <a:moveTo>
+                <a:pt x="2494262" y="1898634"/>
+              </a:moveTo>
+              <a:arcTo wR="1315335" hR="1315335" stAng="1579493" swAng="1632600"/>
+            </a:path>
+          </a:pathLst>
+        </a:custGeom>
+        <a:noFill/>
+        <a:ln w="10000" cap="flat" cmpd="sng" algn="ctr">
+          <a:solidFill>
+            <a:schemeClr val="accent1">
+              <a:hueOff val="0"/>
+              <a:satOff val="0"/>
+              <a:lumOff val="0"/>
+              <a:alphaOff val="0"/>
+            </a:schemeClr>
+          </a:solidFill>
+          <a:prstDash val="solid"/>
+          <a:tailEnd type="arrow"/>
+        </a:ln>
+        <a:effectLst/>
+      </dsp:spPr>
+      <dsp:style>
+        <a:lnRef idx="1">
+          <a:scrgbClr r="0" g="0" b="0"/>
+        </a:lnRef>
+        <a:fillRef idx="0">
+          <a:scrgbClr r="0" g="0" b="0"/>
+        </a:fillRef>
+        <a:effectRef idx="0">
+          <a:scrgbClr r="0" g="0" b="0"/>
+        </a:effectRef>
+        <a:fontRef idx="minor"/>
+      </dsp:style>
+    </dsp:sp>
+    <dsp:sp modelId="{4CC85611-5B46-DD47-A036-84952640A776}">
+      <dsp:nvSpPr>
+        <dsp:cNvPr id="0" name=""/>
+        <dsp:cNvSpPr/>
+      </dsp:nvSpPr>
+      <dsp:spPr>
+        <a:xfrm>
+          <a:off x="3959200" y="2631515"/>
+          <a:ext cx="1225599" cy="796639"/>
+        </a:xfrm>
+        <a:prstGeom prst="roundRect">
+          <a:avLst/>
+        </a:prstGeom>
+        <a:gradFill rotWithShape="0">
+          <a:gsLst>
+            <a:gs pos="0">
+              <a:schemeClr val="accent1">
+                <a:hueOff val="0"/>
+                <a:satOff val="0"/>
+                <a:lumOff val="0"/>
+                <a:alphaOff val="0"/>
+                <a:tint val="75000"/>
+                <a:shade val="85000"/>
+                <a:satMod val="230000"/>
+              </a:schemeClr>
+            </a:gs>
+            <a:gs pos="25000">
+              <a:schemeClr val="accent1">
+                <a:hueOff val="0"/>
+                <a:satOff val="0"/>
+                <a:lumOff val="0"/>
+                <a:alphaOff val="0"/>
+                <a:tint val="90000"/>
+                <a:shade val="70000"/>
+                <a:satMod val="220000"/>
+              </a:schemeClr>
+            </a:gs>
+            <a:gs pos="50000">
+              <a:schemeClr val="accent1">
+                <a:hueOff val="0"/>
+                <a:satOff val="0"/>
+                <a:lumOff val="0"/>
+                <a:alphaOff val="0"/>
+                <a:tint val="90000"/>
+                <a:shade val="58000"/>
+                <a:satMod val="225000"/>
+              </a:schemeClr>
+            </a:gs>
+            <a:gs pos="65000">
+              <a:schemeClr val="accent1">
+                <a:hueOff val="0"/>
+                <a:satOff val="0"/>
+                <a:lumOff val="0"/>
+                <a:alphaOff val="0"/>
+                <a:tint val="90000"/>
+                <a:shade val="58000"/>
+                <a:satMod val="225000"/>
+              </a:schemeClr>
+            </a:gs>
+            <a:gs pos="80000">
+              <a:schemeClr val="accent1">
+                <a:hueOff val="0"/>
+                <a:satOff val="0"/>
+                <a:lumOff val="0"/>
+                <a:alphaOff val="0"/>
+                <a:tint val="90000"/>
+                <a:shade val="69000"/>
+                <a:satMod val="220000"/>
+              </a:schemeClr>
+            </a:gs>
+            <a:gs pos="100000">
+              <a:schemeClr val="accent1">
+                <a:hueOff val="0"/>
+                <a:satOff val="0"/>
+                <a:lumOff val="0"/>
+                <a:alphaOff val="0"/>
+                <a:tint val="77000"/>
+                <a:shade val="80000"/>
+                <a:satMod val="230000"/>
+              </a:schemeClr>
+            </a:gs>
+          </a:gsLst>
+          <a:lin ang="5400000" scaled="1"/>
+        </a:gradFill>
+        <a:ln>
+          <a:noFill/>
+        </a:ln>
+        <a:effectLst>
+          <a:outerShdw blurRad="76200" dist="50800" dir="5400000" rotWithShape="0">
+            <a:srgbClr val="4E3B30">
+              <a:alpha val="60000"/>
+            </a:srgbClr>
+          </a:outerShdw>
+        </a:effectLst>
+        <a:scene3d>
+          <a:camera prst="orthographicFront">
+            <a:rot lat="0" lon="0" rev="0"/>
+          </a:camera>
+          <a:lightRig rig="threePt" dir="tl">
+            <a:rot lat="0" lon="0" rev="0"/>
+          </a:lightRig>
+        </a:scene3d>
+        <a:sp3d prstMaterial="metal">
+          <a:bevelT w="10000" h="10000"/>
+        </a:sp3d>
+      </dsp:spPr>
+      <dsp:style>
+        <a:lnRef idx="0">
+          <a:scrgbClr r="0" g="0" b="0"/>
+        </a:lnRef>
+        <a:fillRef idx="3">
+          <a:scrgbClr r="0" g="0" b="0"/>
+        </a:fillRef>
+        <a:effectRef idx="2">
+          <a:scrgbClr r="0" g="0" b="0"/>
+        </a:effectRef>
+        <a:fontRef idx="minor">
+          <a:schemeClr val="lt1"/>
+        </a:fontRef>
+      </dsp:style>
+      <dsp:txBody>
+        <a:bodyPr spcFirstLastPara="0" vert="horz" wrap="square" lIns="64770" tIns="64770" rIns="64770" bIns="64770" numCol="1" spcCol="1270" anchor="ctr" anchorCtr="0">
+          <a:noAutofit/>
+        </a:bodyPr>
+        <a:lstStyle/>
+        <a:p>
+          <a:pPr lvl="0" algn="ctr" defTabSz="755650">
+            <a:lnSpc>
+              <a:spcPct val="90000"/>
+            </a:lnSpc>
+            <a:spcBef>
+              <a:spcPct val="0"/>
+            </a:spcBef>
+            <a:spcAft>
+              <a:spcPct val="35000"/>
+            </a:spcAft>
+          </a:pPr>
+          <a:r>
+            <a:rPr lang="en-US" sz="1700" kern="1200" dirty="0" smtClean="0"/>
+            <a:t>PID</a:t>
+          </a:r>
+          <a:endParaRPr lang="en-US" sz="1700" kern="1200" dirty="0"/>
+        </a:p>
+      </dsp:txBody>
+      <dsp:txXfrm>
+        <a:off x="3959200" y="2631515"/>
+        <a:ext cx="1225599" cy="796639"/>
+      </dsp:txXfrm>
+    </dsp:sp>
+    <dsp:sp modelId="{2BF87480-2109-6847-AB38-8D93CBD29417}">
+      <dsp:nvSpPr>
+        <dsp:cNvPr id="0" name=""/>
+        <dsp:cNvSpPr/>
+      </dsp:nvSpPr>
+      <dsp:spPr>
+        <a:xfrm>
+          <a:off x="3256664" y="399164"/>
+          <a:ext cx="2630670" cy="2630670"/>
+        </a:xfrm>
+        <a:custGeom>
+          <a:avLst/>
+          <a:gdLst/>
+          <a:ahLst/>
+          <a:cxnLst/>
+          <a:rect l="0" t="0" r="0" b="0"/>
+          <a:pathLst>
+            <a:path>
+              <a:moveTo>
+                <a:pt x="533587" y="2373153"/>
+              </a:moveTo>
+              <a:arcTo wR="1315335" hR="1315335" stAng="7587907" swAng="1632600"/>
+            </a:path>
+          </a:pathLst>
+        </a:custGeom>
+        <a:noFill/>
+        <a:ln w="10000" cap="flat" cmpd="sng" algn="ctr">
+          <a:solidFill>
+            <a:schemeClr val="accent1">
+              <a:hueOff val="0"/>
+              <a:satOff val="0"/>
+              <a:lumOff val="0"/>
+              <a:alphaOff val="0"/>
+            </a:schemeClr>
+          </a:solidFill>
+          <a:prstDash val="solid"/>
+          <a:tailEnd type="arrow"/>
+        </a:ln>
+        <a:effectLst/>
+      </dsp:spPr>
+      <dsp:style>
+        <a:lnRef idx="1">
+          <a:scrgbClr r="0" g="0" b="0"/>
+        </a:lnRef>
+        <a:fillRef idx="0">
+          <a:scrgbClr r="0" g="0" b="0"/>
+        </a:fillRef>
+        <a:effectRef idx="0">
+          <a:scrgbClr r="0" g="0" b="0"/>
+        </a:effectRef>
+        <a:fontRef idx="minor"/>
+      </dsp:style>
+    </dsp:sp>
+    <dsp:sp modelId="{65EBEFCD-71E2-B049-BA8E-0C30C88B7618}">
+      <dsp:nvSpPr>
+        <dsp:cNvPr id="0" name=""/>
+        <dsp:cNvSpPr/>
+      </dsp:nvSpPr>
+      <dsp:spPr>
+        <a:xfrm>
+          <a:off x="2643864" y="1316180"/>
+          <a:ext cx="1225599" cy="796639"/>
+        </a:xfrm>
+        <a:prstGeom prst="roundRect">
+          <a:avLst/>
+        </a:prstGeom>
+        <a:gradFill rotWithShape="0">
+          <a:gsLst>
+            <a:gs pos="0">
+              <a:schemeClr val="accent1">
+                <a:hueOff val="0"/>
+                <a:satOff val="0"/>
+                <a:lumOff val="0"/>
+                <a:alphaOff val="0"/>
+                <a:tint val="75000"/>
+                <a:shade val="85000"/>
+                <a:satMod val="230000"/>
+              </a:schemeClr>
+            </a:gs>
+            <a:gs pos="25000">
+              <a:schemeClr val="accent1">
+                <a:hueOff val="0"/>
+                <a:satOff val="0"/>
+                <a:lumOff val="0"/>
+                <a:alphaOff val="0"/>
+                <a:tint val="90000"/>
+                <a:shade val="70000"/>
+                <a:satMod val="220000"/>
+              </a:schemeClr>
+            </a:gs>
+            <a:gs pos="50000">
+              <a:schemeClr val="accent1">
+                <a:hueOff val="0"/>
+                <a:satOff val="0"/>
+                <a:lumOff val="0"/>
+                <a:alphaOff val="0"/>
+                <a:tint val="90000"/>
+                <a:shade val="58000"/>
+                <a:satMod val="225000"/>
+              </a:schemeClr>
+            </a:gs>
+            <a:gs pos="65000">
+              <a:schemeClr val="accent1">
+                <a:hueOff val="0"/>
+                <a:satOff val="0"/>
+                <a:lumOff val="0"/>
+                <a:alphaOff val="0"/>
+                <a:tint val="90000"/>
+                <a:shade val="58000"/>
+                <a:satMod val="225000"/>
+              </a:schemeClr>
+            </a:gs>
+            <a:gs pos="80000">
+              <a:schemeClr val="accent1">
+                <a:hueOff val="0"/>
+                <a:satOff val="0"/>
+                <a:lumOff val="0"/>
+                <a:alphaOff val="0"/>
+                <a:tint val="90000"/>
+                <a:shade val="69000"/>
+                <a:satMod val="220000"/>
+              </a:schemeClr>
+            </a:gs>
+            <a:gs pos="100000">
+              <a:schemeClr val="accent1">
+                <a:hueOff val="0"/>
+                <a:satOff val="0"/>
+                <a:lumOff val="0"/>
+                <a:alphaOff val="0"/>
+                <a:tint val="77000"/>
+                <a:shade val="80000"/>
+                <a:satMod val="230000"/>
+              </a:schemeClr>
+            </a:gs>
+          </a:gsLst>
+          <a:lin ang="5400000" scaled="1"/>
+        </a:gradFill>
+        <a:ln>
+          <a:noFill/>
+        </a:ln>
+        <a:effectLst>
+          <a:outerShdw blurRad="76200" dist="50800" dir="5400000" rotWithShape="0">
+            <a:srgbClr val="4E3B30">
+              <a:alpha val="60000"/>
+            </a:srgbClr>
+          </a:outerShdw>
+        </a:effectLst>
+        <a:scene3d>
+          <a:camera prst="orthographicFront">
+            <a:rot lat="0" lon="0" rev="0"/>
+          </a:camera>
+          <a:lightRig rig="threePt" dir="tl">
+            <a:rot lat="0" lon="0" rev="0"/>
+          </a:lightRig>
+        </a:scene3d>
+        <a:sp3d prstMaterial="metal">
+          <a:bevelT w="10000" h="10000"/>
+        </a:sp3d>
+      </dsp:spPr>
+      <dsp:style>
+        <a:lnRef idx="0">
+          <a:scrgbClr r="0" g="0" b="0"/>
+        </a:lnRef>
+        <a:fillRef idx="3">
+          <a:scrgbClr r="0" g="0" b="0"/>
+        </a:fillRef>
+        <a:effectRef idx="2">
+          <a:scrgbClr r="0" g="0" b="0"/>
+        </a:effectRef>
+        <a:fontRef idx="minor">
+          <a:schemeClr val="lt1"/>
+        </a:fontRef>
+      </dsp:style>
+      <dsp:txBody>
+        <a:bodyPr spcFirstLastPara="0" vert="horz" wrap="square" lIns="64770" tIns="64770" rIns="64770" bIns="64770" numCol="1" spcCol="1270" anchor="ctr" anchorCtr="0">
+          <a:noAutofit/>
+        </a:bodyPr>
+        <a:lstStyle/>
+        <a:p>
+          <a:pPr lvl="0" algn="ctr" defTabSz="755650">
+            <a:lnSpc>
+              <a:spcPct val="90000"/>
+            </a:lnSpc>
+            <a:spcBef>
+              <a:spcPct val="0"/>
+            </a:spcBef>
+            <a:spcAft>
+              <a:spcPct val="35000"/>
+            </a:spcAft>
+          </a:pPr>
+          <a:r>
+            <a:rPr lang="en-US" sz="1700" kern="1200" dirty="0" smtClean="0"/>
+            <a:t>Motors</a:t>
+          </a:r>
+          <a:endParaRPr lang="en-US" sz="1700" kern="1200" dirty="0"/>
+        </a:p>
+      </dsp:txBody>
+      <dsp:txXfrm>
+        <a:off x="2643864" y="1316180"/>
+        <a:ext cx="1225599" cy="796639"/>
+      </dsp:txXfrm>
+    </dsp:sp>
+    <dsp:sp modelId="{EC9A134C-8897-CD43-A64E-2F93DD9FFFC8}">
+      <dsp:nvSpPr>
+        <dsp:cNvPr id="0" name=""/>
+        <dsp:cNvSpPr/>
+      </dsp:nvSpPr>
+      <dsp:spPr>
+        <a:xfrm>
+          <a:off x="3256664" y="399164"/>
+          <a:ext cx="2630670" cy="2630670"/>
+        </a:xfrm>
+        <a:custGeom>
+          <a:avLst/>
+          <a:gdLst/>
+          <a:ahLst/>
+          <a:cxnLst/>
+          <a:rect l="0" t="0" r="0" b="0"/>
+          <a:pathLst>
+            <a:path>
+              <a:moveTo>
+                <a:pt x="136408" y="732036"/>
+              </a:moveTo>
+              <a:arcTo wR="1315335" hR="1315335" stAng="12379493" swAng="1632600"/>
+            </a:path>
+          </a:pathLst>
+        </a:custGeom>
+        <a:noFill/>
+        <a:ln w="10000" cap="flat" cmpd="sng" algn="ctr">
+          <a:solidFill>
+            <a:schemeClr val="accent1">
+              <a:hueOff val="0"/>
+              <a:satOff val="0"/>
+              <a:lumOff val="0"/>
+              <a:alphaOff val="0"/>
+            </a:schemeClr>
+          </a:solidFill>
+          <a:prstDash val="solid"/>
+          <a:tailEnd type="arrow"/>
+        </a:ln>
+        <a:effectLst/>
+      </dsp:spPr>
+      <dsp:style>
+        <a:lnRef idx="1">
+          <a:scrgbClr r="0" g="0" b="0"/>
+        </a:lnRef>
+        <a:fillRef idx="0">
+          <a:scrgbClr r="0" g="0" b="0"/>
+        </a:fillRef>
+        <a:effectRef idx="0">
+          <a:scrgbClr r="0" g="0" b="0"/>
+        </a:effectRef>
+        <a:fontRef idx="minor"/>
+      </dsp:style>
+    </dsp:sp>
+  </dsp:spTree>
+</dsp:drawing>
+</file>
+
+<file path=ppt/diagrams/layout1.xml><?xml version="1.0" encoding="utf-8"?>
+<dgm:layoutDef xmlns:dgm="http://schemas.openxmlformats.org/drawingml/2006/diagram" xmlns:a="http://schemas.openxmlformats.org/drawingml/2006/main" uniqueId="urn:microsoft.com/office/officeart/2005/8/layout/cycle5">
+  <dgm:title val=""/>
+  <dgm:desc val=""/>
+  <dgm:catLst>
+    <dgm:cat type="cycle" pri="3000"/>
+  </dgm:catLst>
+  <dgm:sampData>
+    <dgm:dataModel>
+      <dgm:ptLst>
+        <dgm:pt modelId="0" type="doc"/>
+        <dgm:pt modelId="1">
+          <dgm:prSet phldr="1"/>
+        </dgm:pt>
+        <dgm:pt modelId="2">
+          <dgm:prSet phldr="1"/>
+        </dgm:pt>
+        <dgm:pt modelId="3">
+          <dgm:prSet phldr="1"/>
+        </dgm:pt>
+        <dgm:pt modelId="4">
+          <dgm:prSet phldr="1"/>
+        </dgm:pt>
+        <dgm:pt modelId="5">
+          <dgm:prSet phldr="1"/>
+        </dgm:pt>
+      </dgm:ptLst>
+      <dgm:cxnLst>
+        <dgm:cxn modelId="6" srcId="0" destId="1" srcOrd="0" destOrd="0"/>
+        <dgm:cxn modelId="7" srcId="0" destId="2" srcOrd="1" destOrd="0"/>
+        <dgm:cxn modelId="8" srcId="0" destId="3" srcOrd="2" destOrd="0"/>
+        <dgm:cxn modelId="9" srcId="0" destId="4" srcOrd="3" destOrd="0"/>
+        <dgm:cxn modelId="10" srcId="0" destId="5" srcOrd="4" destOrd="0"/>
+      </dgm:cxnLst>
+      <dgm:bg/>
+      <dgm:whole/>
+    </dgm:dataModel>
+  </dgm:sampData>
+  <dgm:styleData>
+    <dgm:dataModel>
+      <dgm:ptLst>
+        <dgm:pt modelId="0" type="doc"/>
+        <dgm:pt modelId="1"/>
+        <dgm:pt modelId="2"/>
+        <dgm:pt modelId="3"/>
+      </dgm:ptLst>
+      <dgm:cxnLst>
+        <dgm:cxn modelId="4" srcId="0" destId="1" srcOrd="0" destOrd="0"/>
+        <dgm:cxn modelId="5" srcId="0" destId="2" srcOrd="1" destOrd="0"/>
+        <dgm:cxn modelId="6" srcId="0" destId="3" srcOrd="2" destOrd="0"/>
+      </dgm:cxnLst>
+      <dgm:bg/>
+      <dgm:whole/>
+    </dgm:dataModel>
+  </dgm:styleData>
+  <dgm:clrData>
+    <dgm:dataModel>
+      <dgm:ptLst>
+        <dgm:pt modelId="0" type="doc"/>
+        <dgm:pt modelId="1"/>
+        <dgm:pt modelId="2"/>
+        <dgm:pt modelId="3"/>
+        <dgm:pt modelId="4"/>
+        <dgm:pt modelId="5"/>
+        <dgm:pt modelId="6"/>
+      </dgm:ptLst>
+      <dgm:cxnLst>
+        <dgm:cxn modelId="7" srcId="0" destId="1" srcOrd="0" destOrd="0"/>
+        <dgm:cxn modelId="8" srcId="0" destId="2" srcOrd="1" destOrd="0"/>
+        <dgm:cxn modelId="9" srcId="0" destId="3" srcOrd="2" destOrd="0"/>
+        <dgm:cxn modelId="10" srcId="0" destId="4" srcOrd="3" destOrd="0"/>
+        <dgm:cxn modelId="11" srcId="0" destId="5" srcOrd="4" destOrd="0"/>
+        <dgm:cxn modelId="12" srcId="0" destId="6" srcOrd="5" destOrd="0"/>
+      </dgm:cxnLst>
+      <dgm:bg/>
+      <dgm:whole/>
+    </dgm:dataModel>
+  </dgm:clrData>
+  <dgm:layoutNode name="cycle">
+    <dgm:varLst>
+      <dgm:dir/>
+      <dgm:resizeHandles val="exact"/>
+    </dgm:varLst>
+    <dgm:choose name="Name0">
+      <dgm:if name="Name1" func="var" arg="dir" op="equ" val="norm">
+        <dgm:choose name="Name2">
+          <dgm:if name="Name3" axis="ch" ptType="node" func="cnt" op="gt" val="2">
+            <dgm:alg type="cycle">
+              <dgm:param type="stAng" val="0"/>
+              <dgm:param type="spanAng" val="360"/>
+            </dgm:alg>
+          </dgm:if>
+          <dgm:else name="Name4">
+            <dgm:alg type="cycle">
+              <dgm:param type="stAng" val="-90"/>
+              <dgm:param type="spanAng" val="360"/>
+            </dgm:alg>
+          </dgm:else>
+        </dgm:choose>
+      </dgm:if>
+      <dgm:else name="Name5">
+        <dgm:choose name="Name6">
+          <dgm:if name="Name7" axis="ch" ptType="node" func="cnt" op="gt" val="2">
+            <dgm:alg type="cycle">
+              <dgm:param type="stAng" val="0"/>
+              <dgm:param type="spanAng" val="-360"/>
+            </dgm:alg>
+          </dgm:if>
+          <dgm:else name="Name8">
+            <dgm:alg type="cycle">
+              <dgm:param type="stAng" val="90"/>
+              <dgm:param type="spanAng" val="-360"/>
+            </dgm:alg>
+          </dgm:else>
+        </dgm:choose>
+      </dgm:else>
+    </dgm:choose>
+    <dgm:shape xmlns:r="http://schemas.openxmlformats.org/officeDocument/2006/relationships" r:blip="">
+      <dgm:adjLst/>
+    </dgm:shape>
+    <dgm:presOf/>
+    <dgm:choose name="Name9">
+      <dgm:if name="Name10" func="var" arg="dir" op="equ" val="norm">
+        <dgm:constrLst>
+          <dgm:constr type="w" for="ch" forName="node" refType="w"/>
+          <dgm:constr type="w" for="ch" ptType="sibTrans" refType="w" refFor="ch" refForName="node" op="equ" fact="0.3"/>
+          <dgm:constr type="diam" for="ch" ptType="sibTrans" refType="diam" op="equ"/>
+          <dgm:constr type="sibSp" refType="w" refFor="ch" refForName="node" op="equ" fact="0.15"/>
+          <dgm:constr type="w" for="ch" forName="spNode" refType="sibSp" fact="1.6"/>
+          <dgm:constr type="primFontSz" for="ch" forName="node" op="equ" val="65"/>
+        </dgm:constrLst>
+      </dgm:if>
+      <dgm:else name="Name11">
+        <dgm:constrLst>
+          <dgm:constr type="w" for="ch" forName="node" refType="w"/>
+          <dgm:constr type="w" for="ch" ptType="sibTrans" refType="w" refFor="ch" refForName="node" op="equ" fact="0.3"/>
+          <dgm:constr type="diam" for="ch" ptType="sibTrans" refType="diam" fact="-1"/>
+          <dgm:constr type="diam" for="ch" refType="diam" op="equ" fact="-1"/>
+          <dgm:constr type="sibSp" refType="w" refFor="ch" refForName="node" op="equ" fact="0.15"/>
+          <dgm:constr type="w" for="ch" forName="spNode" refType="sibSp" fact="1.6"/>
+          <dgm:constr type="primFontSz" for="ch" forName="node" op="equ" val="65"/>
+        </dgm:constrLst>
+      </dgm:else>
+    </dgm:choose>
+    <dgm:ruleLst/>
+    <dgm:forEach name="Name12" axis="ch" ptType="node">
+      <dgm:layoutNode name="node">
+        <dgm:varLst>
+          <dgm:bulletEnabled val="1"/>
+        </dgm:varLst>
+        <dgm:alg type="tx"/>
+        <dgm:shape xmlns:r="http://schemas.openxmlformats.org/officeDocument/2006/relationships" type="roundRect" r:blip="">
+          <dgm:adjLst/>
+        </dgm:shape>
+        <dgm:presOf axis="desOrSelf" ptType="node"/>
+        <dgm:constrLst>
+          <dgm:constr type="h" refType="w" fact="0.65"/>
+          <dgm:constr type="tMarg" refType="primFontSz" fact="0.3"/>
+          <dgm:constr type="bMarg" refType="primFontSz" fact="0.3"/>
+          <dgm:constr type="lMarg" refType="primFontSz" fact="0.3"/>
+          <dgm:constr type="rMarg" refType="primFontSz" fact="0.3"/>
+        </dgm:constrLst>
+        <dgm:ruleLst>
+          <dgm:rule type="primFontSz" val="5" fact="NaN" max="NaN"/>
+        </dgm:ruleLst>
+      </dgm:layoutNode>
+      <dgm:choose name="Name13">
+        <dgm:if name="Name14" axis="par ch" ptType="doc node" func="cnt" op="gt" val="1">
+          <dgm:layoutNode name="spNode">
+            <dgm:alg type="sp"/>
+            <dgm:shape xmlns:r="http://schemas.openxmlformats.org/officeDocument/2006/relationships" r:blip="">
+              <dgm:adjLst/>
+            </dgm:shape>
+            <dgm:presOf/>
+            <dgm:constrLst>
+              <dgm:constr type="h" refType="w"/>
+            </dgm:constrLst>
+            <dgm:ruleLst/>
+          </dgm:layoutNode>
+          <dgm:forEach name="Name15" axis="followSib" ptType="sibTrans" hideLastTrans="0" cnt="1">
+            <dgm:layoutNode name="sibTrans">
+              <dgm:alg type="conn">
+                <dgm:param type="dim" val="1D"/>
+                <dgm:param type="connRout" val="curve"/>
+                <dgm:param type="begPts" val="radial"/>
+                <dgm:param type="endPts" val="radial"/>
+              </dgm:alg>
+              <dgm:shape xmlns:r="http://schemas.openxmlformats.org/officeDocument/2006/relationships" type="conn" r:blip="">
+                <dgm:adjLst/>
+              </dgm:shape>
+              <dgm:presOf axis="self"/>
+              <dgm:constrLst>
+                <dgm:constr type="h" refType="w" fact="0.65"/>
+                <dgm:constr type="connDist"/>
+                <dgm:constr type="begPad" refType="connDist" fact="0.2"/>
+                <dgm:constr type="endPad" refType="connDist" fact="0.2"/>
+              </dgm:constrLst>
+              <dgm:ruleLst/>
+            </dgm:layoutNode>
+          </dgm:forEach>
+        </dgm:if>
+        <dgm:else name="Name16"/>
+      </dgm:choose>
+    </dgm:forEach>
+  </dgm:layoutNode>
+</dgm:layoutDef>
+</file>
+
+<file path=ppt/diagrams/quickStyle1.xml><?xml version="1.0" encoding="utf-8"?>
+<dgm:styleDef xmlns:dgm="http://schemas.openxmlformats.org/drawingml/2006/diagram" xmlns:a="http://schemas.openxmlformats.org/drawingml/2006/main" uniqueId="urn:microsoft.com/office/officeart/2005/8/quickstyle/simple4">
+  <dgm:title val=""/>
+  <dgm:desc val=""/>
+  <dgm:catLst>
+    <dgm:cat type="simple" pri="10400"/>
+  </dgm:catLst>
+  <dgm:scene3d>
+    <a:camera prst="orthographicFront"/>
+    <a:lightRig rig="threePt" dir="t"/>
+  </dgm:scene3d>
+  <dgm:styleLbl name="node0">
+    <dgm:scene3d>
+      <a:camera prst="orthographicFront"/>
+      <a:lightRig rig="threePt" dir="t"/>
+    </dgm:scene3d>
+    <dgm:sp3d/>
+    <dgm:txPr/>
+    <dgm:style>
+      <a:lnRef idx="0">
+        <a:scrgbClr r="0" g="0" b="0"/>
+      </a:lnRef>
+      <a:fillRef idx="3">
+        <a:scrgbClr r="0" g="0" b="0"/>
+      </a:fillRef>
+      <a:effectRef idx="2">
+        <a:scrgbClr r="0" g="0" b="0"/>
+      </a:effectRef>
+      <a:fontRef idx="minor">
+        <a:schemeClr val="lt1"/>
+      </a:fontRef>
+    </dgm:style>
+  </dgm:styleLbl>
+  <dgm:styleLbl name="lnNode1">
+    <dgm:scene3d>
+      <a:camera prst="orthographicFront"/>
+      <a:lightRig rig="threePt" dir="t"/>
+    </dgm:scene3d>
+    <dgm:sp3d/>
+    <dgm:txPr/>
+    <dgm:style>
+      <a:lnRef idx="1">
+        <a:scrgbClr r="0" g="0" b="0"/>
+      </a:lnRef>
+      <a:fillRef idx="3">
+        <a:scrgbClr r="0" g="0" b="0"/>
+      </a:fillRef>
+      <a:effectRef idx="2">
+        <a:scrgbClr r="0" g="0" b="0"/>
+      </a:effectRef>
+      <a:fontRef idx="minor">
+        <a:schemeClr val="lt1"/>
+      </a:fontRef>
+    </dgm:style>
+  </dgm:styleLbl>
+  <dgm:styleLbl name="vennNode1">
+    <dgm:scene3d>
+      <a:camera prst="orthographicFront"/>
+      <a:lightRig rig="threePt" dir="t"/>
+    </dgm:scene3d>
+    <dgm:sp3d/>
+    <dgm:txPr/>
+    <dgm:style>
+      <a:lnRef idx="0">
+        <a:scrgbClr r="0" g="0" b="0"/>
+      </a:lnRef>
+      <a:fillRef idx="3">
+        <a:scrgbClr r="0" g="0" b="0"/>
+      </a:fillRef>
+      <a:effectRef idx="0">
+        <a:scrgbClr r="0" g="0" b="0"/>
+      </a:effectRef>
+      <a:fontRef idx="minor">
+        <a:schemeClr val="tx1"/>
+      </a:fontRef>
+    </dgm:style>
+  </dgm:styleLbl>
+  <dgm:styleLbl name="alignNode1">
+    <dgm:scene3d>
+      <a:camera prst="orthographicFront"/>
+      <a:lightRig rig="threePt" dir="t"/>
+    </dgm:scene3d>
+    <dgm:sp3d/>
+    <dgm:txPr/>
+    <dgm:style>
+      <a:lnRef idx="1">
+        <a:scrgbClr r="0" g="0" b="0"/>
+      </a:lnRef>
+      <a:fillRef idx="3">
+        <a:scrgbClr r="0" g="0" b="0"/>
+      </a:fillRef>
+      <a:effectRef idx="2">
+        <a:scrgbClr r="0" g="0" b="0"/>
+      </a:effectRef>
+      <a:fontRef idx="minor">
+        <a:schemeClr val="lt1"/>
+      </a:fontRef>
+    </dgm:style>
+  </dgm:styleLbl>
+  <dgm:styleLbl name="node1">
+    <dgm:scene3d>
+      <a:camera prst="orthographicFront"/>
+      <a:lightRig rig="threePt" dir="t"/>
+    </dgm:scene3d>
+    <dgm:sp3d/>
+    <dgm:txPr/>
+    <dgm:style>
+      <a:lnRef idx="0">
+        <a:scrgbClr r="0" g="0" b="0"/>
+      </a:lnRef>
+      <a:fillRef idx="3">
+        <a:scrgbClr r="0" g="0" b="0"/>
+      </a:fillRef>
+      <a:effectRef idx="2">
+        <a:scrgbClr r="0" g="0" b="0"/>
+      </a:effectRef>
+      <a:fontRef idx="minor">
+        <a:schemeClr val="lt1"/>
+      </a:fontRef>
+    </dgm:style>
+  </dgm:styleLbl>
+  <dgm:styleLbl name="node2">
+    <dgm:scene3d>
+      <a:camera prst="orthographicFront"/>
+      <a:lightRig rig="threePt" dir="t"/>
+    </dgm:scene3d>
+    <dgm:sp3d/>
+    <dgm:txPr/>
+    <dgm:style>
+      <a:lnRef idx="0">
+        <a:scrgbClr r="0" g="0" b="0"/>
+      </a:lnRef>
+      <a:fillRef idx="3">
+        <a:scrgbClr r="0" g="0" b="0"/>
+      </a:fillRef>
+      <a:effectRef idx="2">
+        <a:scrgbClr r="0" g="0" b="0"/>
+      </a:effectRef>
+      <a:fontRef idx="minor">
+        <a:schemeClr val="lt1"/>
+      </a:fontRef>
+    </dgm:style>
+  </dgm:styleLbl>
+  <dgm:styleLbl name="node3">
+    <dgm:scene3d>
+      <a:camera prst="orthographicFront"/>
+      <a:lightRig rig="threePt" dir="t"/>
+    </dgm:scene3d>
+    <dgm:sp3d/>
+    <dgm:txPr/>
+    <dgm:style>
+      <a:lnRef idx="0">
+        <a:scrgbClr r="0" g="0" b="0"/>
+      </a:lnRef>
+      <a:fillRef idx="3">
+        <a:scrgbClr r="0" g="0" b="0"/>
+      </a:fillRef>
+      <a:effectRef idx="2">
+        <a:scrgbClr r="0" g="0" b="0"/>
+      </a:effectRef>
+      <a:fontRef idx="minor">
+        <a:schemeClr val="lt1"/>
+      </a:fontRef>
+    </dgm:style>
+  </dgm:styleLbl>
+  <dgm:styleLbl name="node4">
+    <dgm:scene3d>
+      <a:camera prst="orthographicFront"/>
+      <a:lightRig rig="threePt" dir="t"/>
+    </dgm:scene3d>
+    <dgm:sp3d/>
+    <dgm:txPr/>
+    <dgm:style>
+      <a:lnRef idx="0">
+        <a:scrgbClr r="0" g="0" b="0"/>
+      </a:lnRef>
+      <a:fillRef idx="3">
+        <a:scrgbClr r="0" g="0" b="0"/>
+      </a:fillRef>
+      <a:effectRef idx="2">
+        <a:scrgbClr r="0" g="0" b="0"/>
+      </a:effectRef>
+      <a:fontRef idx="minor">
+        <a:schemeClr val="lt1"/>
+      </a:fontRef>
+    </dgm:style>
+  </dgm:styleLbl>
+  <dgm:styleLbl name="fgImgPlace1">
+    <dgm:scene3d>
+      <a:camera prst="orthographicFront"/>
+      <a:lightRig rig="threePt" dir="t"/>
+    </dgm:scene3d>
+    <dgm:sp3d/>
+    <dgm:txPr/>
+    <dgm:style>
+      <a:lnRef idx="0">
+        <a:scrgbClr r="0" g="0" b="0"/>
+      </a:lnRef>
+      <a:fillRef idx="1">
+        <a:scrgbClr r="0" g="0" b="0"/>
+      </a:fillRef>
+      <a:effectRef idx="2">
+        <a:scrgbClr r="0" g="0" b="0"/>
+      </a:effectRef>
+      <a:fontRef idx="minor"/>
+    </dgm:style>
+  </dgm:styleLbl>
+  <dgm:styleLbl name="alignImgPlace1">
+    <dgm:scene3d>
+      <a:camera prst="orthographicFront"/>
+      <a:lightRig rig="threePt" dir="t"/>
+    </dgm:scene3d>
+    <dgm:sp3d/>
+    <dgm:txPr/>
+    <dgm:style>
+      <a:lnRef idx="0">
+        <a:scrgbClr r="0" g="0" b="0"/>
+      </a:lnRef>
+      <a:fillRef idx="1">
+        <a:scrgbClr r="0" g="0" b="0"/>
+      </a:fillRef>
+      <a:effectRef idx="2">
+        <a:scrgbClr r="0" g="0" b="0"/>
+      </a:effectRef>
+      <a:fontRef idx="minor"/>
+    </dgm:style>
+  </dgm:styleLbl>
+  <dgm:styleLbl name="bgImgPlace1">
+    <dgm:scene3d>
+      <a:camera prst="orthographicFront"/>
+      <a:lightRig rig="threePt" dir="t"/>
+    </dgm:scene3d>
+    <dgm:sp3d/>
+    <dgm:txPr/>
+    <dgm:style>
+      <a:lnRef idx="0">
+        <a:scrgbClr r="0" g="0" b="0"/>
+      </a:lnRef>
+      <a:fillRef idx="1">
+        <a:scrgbClr r="0" g="0" b="0"/>
+      </a:fillRef>
+      <a:effectRef idx="2">
+        <a:scrgbClr r="0" g="0" b="0"/>
+      </a:effectRef>
+      <a:fontRef idx="minor"/>
+    </dgm:style>
+  </dgm:styleLbl>
+  <dgm:styleLbl name="sibTrans2D1">
+    <dgm:scene3d>
+      <a:camera prst="orthographicFront"/>
+      <a:lightRig rig="threePt" dir="t"/>
+    </dgm:scene3d>
+    <dgm:sp3d/>
+    <dgm:txPr/>
+    <dgm:style>
+      <a:lnRef idx="0">
+        <a:scrgbClr r="0" g="0" b="0"/>
+      </a:lnRef>
+      <a:fillRef idx="3">
+        <a:scrgbClr r="0" g="0" b="0"/>
+      </a:fillRef>
+      <a:effectRef idx="2">
+        <a:scrgbClr r="0" g="0" b="0"/>
+      </a:effectRef>
+      <a:fontRef idx="minor">
+        <a:schemeClr val="lt1"/>
+      </a:fontRef>
+    </dgm:style>
+  </dgm:styleLbl>
+  <dgm:styleLbl name="fgSibTrans2D1">
+    <dgm:scene3d>
+      <a:camera prst="orthographicFront"/>
+      <a:lightRig rig="threePt" dir="t"/>
+    </dgm:scene3d>
+    <dgm:sp3d/>
+    <dgm:txPr/>
+    <dgm:style>
+      <a:lnRef idx="0">
+        <a:scrgbClr r="0" g="0" b="0"/>
+      </a:lnRef>
+      <a:fillRef idx="3">
+        <a:scrgbClr r="0" g="0" b="0"/>
+      </a:fillRef>
+      <a:effectRef idx="2">
+        <a:scrgbClr r="0" g="0" b="0"/>
+      </a:effectRef>
+      <a:fontRef idx="minor">
+        <a:schemeClr val="lt1"/>
+      </a:fontRef>
+    </dgm:style>
+  </dgm:styleLbl>
+  <dgm:styleLbl name="bgSibTrans2D1">
+    <dgm:scene3d>
+      <a:camera prst="orthographicFront"/>
+      <a:lightRig rig="threePt" dir="t"/>
+    </dgm:scene3d>
+    <dgm:sp3d/>
+    <dgm:txPr/>
+    <dgm:style>
+      <a:lnRef idx="0">
+        <a:scrgbClr r="0" g="0" b="0"/>
+      </a:lnRef>
+      <a:fillRef idx="3">
+        <a:scrgbClr r="0" g="0" b="0"/>
+      </a:fillRef>
+      <a:effectRef idx="2">
+        <a:scrgbClr r="0" g="0" b="0"/>
+      </a:effectRef>
+      <a:fontRef idx="minor">
+        <a:schemeClr val="lt1"/>
+      </a:fontRef>
+    </dgm:style>
+  </dgm:styleLbl>
+  <dgm:styleLbl name="sibTrans1D1">
+    <dgm:scene3d>
+      <a:camera prst="orthographicFront"/>
+      <a:lightRig rig="threePt" dir="t"/>
+    </dgm:scene3d>
+    <dgm:sp3d/>
+    <dgm:txPr/>
+    <dgm:style>
+      <a:lnRef idx="1">
+        <a:scrgbClr r="0" g="0" b="0"/>
+      </a:lnRef>
+      <a:fillRef idx="0">
+        <a:scrgbClr r="0" g="0" b="0"/>
+      </a:fillRef>
+      <a:effectRef idx="0">
+        <a:scrgbClr r="0" g="0" b="0"/>
+      </a:effectRef>
+      <a:fontRef idx="minor"/>
+    </dgm:style>
+  </dgm:styleLbl>
+  <dgm:styleLbl name="callout">
+    <dgm:scene3d>
+      <a:camera prst="orthographicFront"/>
+      <a:lightRig rig="threePt" dir="t"/>
+    </dgm:scene3d>
+    <dgm:sp3d/>
+    <dgm:txPr/>
+    <dgm:style>
+      <a:lnRef idx="2">
+        <a:scrgbClr r="0" g="0" b="0"/>
+      </a:lnRef>
+      <a:fillRef idx="1">
+        <a:scrgbClr r="0" g="0" b="0"/>
+      </a:fillRef>
+      <a:effectRef idx="1">
+        <a:scrgbClr r="0" g="0" b="0"/>
+      </a:effectRef>
+      <a:fontRef idx="minor"/>
+    </dgm:style>
+  </dgm:styleLbl>
+  <dgm:styleLbl name="asst0">
+    <dgm:scene3d>
+      <a:camera prst="orthographicFront"/>
+      <a:lightRig rig="threePt" dir="t"/>
+    </dgm:scene3d>
+    <dgm:sp3d/>
+    <dgm:txPr/>
+    <dgm:style>
+      <a:lnRef idx="0">
+        <a:scrgbClr r="0" g="0" b="0"/>
+      </a:lnRef>
+      <a:fillRef idx="3">
+        <a:scrgbClr r="0" g="0" b="0"/>
+      </a:fillRef>
+      <a:effectRef idx="2">
+        <a:scrgbClr r="0" g="0" b="0"/>
+      </a:effectRef>
+      <a:fontRef idx="minor">
+        <a:schemeClr val="lt1"/>
+      </a:fontRef>
+    </dgm:style>
+  </dgm:styleLbl>
+  <dgm:styleLbl name="asst1">
+    <dgm:scene3d>
+      <a:camera prst="orthographicFront"/>
+      <a:lightRig rig="threePt" dir="t"/>
+    </dgm:scene3d>
+    <dgm:sp3d/>
+    <dgm:txPr/>
+    <dgm:style>
+      <a:lnRef idx="0">
+        <a:scrgbClr r="0" g="0" b="0"/>
+      </a:lnRef>
+      <a:fillRef idx="3">
+        <a:scrgbClr r="0" g="0" b="0"/>
+      </a:fillRef>
+      <a:effectRef idx="2">
+        <a:scrgbClr r="0" g="0" b="0"/>
+      </a:effectRef>
+      <a:fontRef idx="minor">
+        <a:schemeClr val="lt1"/>
+      </a:fontRef>
+    </dgm:style>
+  </dgm:styleLbl>
+  <dgm:styleLbl name="asst2">
+    <dgm:scene3d>
+      <a:camera prst="orthographicFront"/>
+      <a:lightRig rig="threePt" dir="t"/>
+    </dgm:scene3d>
+    <dgm:sp3d/>
+    <dgm:txPr/>
+    <dgm:style>
+      <a:lnRef idx="0">
+        <a:scrgbClr r="0" g="0" b="0"/>
+      </a:lnRef>
+      <a:fillRef idx="3">
+        <a:scrgbClr r="0" g="0" b="0"/>
+      </a:fillRef>
+      <a:effectRef idx="2">
+        <a:scrgbClr r="0" g="0" b="0"/>
+      </a:effectRef>
+      <a:fontRef idx="minor">
+        <a:schemeClr val="lt1"/>
+      </a:fontRef>
+    </dgm:style>
+  </dgm:styleLbl>
+  <dgm:styleLbl name="asst3">
+    <dgm:scene3d>
+      <a:camera prst="orthographicFront"/>
+      <a:lightRig rig="threePt" dir="t"/>
+    </dgm:scene3d>
+    <dgm:sp3d/>
+    <dgm:txPr/>
+    <dgm:style>
+      <a:lnRef idx="0">
+        <a:scrgbClr r="0" g="0" b="0"/>
+      </a:lnRef>
+      <a:fillRef idx="3">
+        <a:scrgbClr r="0" g="0" b="0"/>
+      </a:fillRef>
+      <a:effectRef idx="2">
+        <a:scrgbClr r="0" g="0" b="0"/>
+      </a:effectRef>
+      <a:fontRef idx="minor">
+        <a:schemeClr val="lt1"/>
+      </a:fontRef>
+    </dgm:style>
+  </dgm:styleLbl>
+  <dgm:styleLbl name="asst4">
+    <dgm:scene3d>
+      <a:camera prst="orthographicFront"/>
+      <a:lightRig rig="threePt" dir="t"/>
+    </dgm:scene3d>
+    <dgm:sp3d/>
+    <dgm:txPr/>
+    <dgm:style>
+      <a:lnRef idx="0">
+        <a:scrgbClr r="0" g="0" b="0"/>
+      </a:lnRef>
+      <a:fillRef idx="3">
+        <a:scrgbClr r="0" g="0" b="0"/>
+      </a:fillRef>
+      <a:effectRef idx="2">
+        <a:scrgbClr r="0" g="0" b="0"/>
+      </a:effectRef>
+      <a:fontRef idx="minor">
+        <a:schemeClr val="lt1"/>
+      </a:fontRef>
+    </dgm:style>
+  </dgm:styleLbl>
+  <dgm:styleLbl name="parChTrans2D1">
+    <dgm:scene3d>
+      <a:camera prst="orthographicFront"/>
+      <a:lightRig rig="threePt" dir="t"/>
+    </dgm:scene3d>
+    <dgm:sp3d/>
+    <dgm:txPr/>
+    <dgm:style>
+      <a:lnRef idx="0">
+        <a:scrgbClr r="0" g="0" b="0"/>
+      </a:lnRef>
+      <a:fillRef idx="3">
+        <a:scrgbClr r="0" g="0" b="0"/>
+      </a:fillRef>
+      <a:effectRef idx="2">
+        <a:scrgbClr r="0" g="0" b="0"/>
+      </a:effectRef>
+      <a:fontRef idx="minor">
+        <a:schemeClr val="lt1"/>
+      </a:fontRef>
+    </dgm:style>
+  </dgm:styleLbl>
+  <dgm:styleLbl name="parChTrans2D2">
+    <dgm:scene3d>
+      <a:camera prst="orthographicFront"/>
+      <a:lightRig rig="threePt" dir="t"/>
+    </dgm:scene3d>
+    <dgm:sp3d/>
+    <dgm:txPr/>
+    <dgm:style>
+      <a:lnRef idx="0">
+        <a:scrgbClr r="0" g="0" b="0"/>
+      </a:lnRef>
+      <a:fillRef idx="3">
+        <a:scrgbClr r="0" g="0" b="0"/>
+      </a:fillRef>
+      <a:effectRef idx="2">
+        <a:scrgbClr r="0" g="0" b="0"/>
+      </a:effectRef>
+      <a:fontRef idx="minor">
+        <a:schemeClr val="lt1"/>
+      </a:fontRef>
+    </dgm:style>
+  </dgm:styleLbl>
+  <dgm:styleLbl name="parChTrans2D3">
+    <dgm:scene3d>
+      <a:camera prst="orthographicFront"/>
+      <a:lightRig rig="threePt" dir="t"/>
+    </dgm:scene3d>
+    <dgm:sp3d/>
+    <dgm:txPr/>
+    <dgm:style>
+      <a:lnRef idx="1">
+        <a:scrgbClr r="0" g="0" b="0"/>
+      </a:lnRef>
+      <a:fillRef idx="3">
+        <a:scrgbClr r="0" g="0" b="0"/>
+      </a:fillRef>
+      <a:effectRef idx="2">
+        <a:scrgbClr r="0" g="0" b="0"/>
+      </a:effectRef>
+      <a:fontRef idx="minor">
+        <a:schemeClr val="lt1"/>
+      </a:fontRef>
+    </dgm:style>
+  </dgm:styleLbl>
+  <dgm:styleLbl name="parChTrans2D4">
+    <dgm:scene3d>
+      <a:camera prst="orthographicFront"/>
+      <a:lightRig rig="threePt" dir="t"/>
+    </dgm:scene3d>
+    <dgm:sp3d/>
+    <dgm:txPr/>
+    <dgm:style>
+      <a:lnRef idx="1">
+        <a:scrgbClr r="0" g="0" b="0"/>
+      </a:lnRef>
+      <a:fillRef idx="3">
+        <a:scrgbClr r="0" g="0" b="0"/>
+      </a:fillRef>
+      <a:effectRef idx="2">
+        <a:scrgbClr r="0" g="0" b="0"/>
+      </a:effectRef>
+      <a:fontRef idx="minor">
+        <a:schemeClr val="lt1"/>
+      </a:fontRef>
+    </dgm:style>
+  </dgm:styleLbl>
+  <dgm:styleLbl name="parChTrans1D1">
+    <dgm:scene3d>
+      <a:camera prst="orthographicFront"/>
+      <a:lightRig rig="threePt" dir="t"/>
+    </dgm:scene3d>
+    <dgm:sp3d/>
+    <dgm:txPr/>
+    <dgm:style>
+      <a:lnRef idx="1">
+        <a:scrgbClr r="0" g="0" b="0"/>
+      </a:lnRef>
+      <a:fillRef idx="0">
+        <a:scrgbClr r="0" g="0" b="0"/>
+      </a:fillRef>
+      <a:effectRef idx="0">
+        <a:scrgbClr r="0" g="0" b="0"/>
+      </a:effectRef>
+      <a:fontRef idx="minor"/>
+    </dgm:style>
+  </dgm:styleLbl>
+  <dgm:styleLbl name="parChTrans1D2">
+    <dgm:scene3d>
+      <a:camera prst="orthographicFront"/>
+      <a:lightRig rig="threePt" dir="t"/>
+    </dgm:scene3d>
+    <dgm:sp3d/>
+    <dgm:txPr/>
+    <dgm:style>
+      <a:lnRef idx="1">
+        <a:scrgbClr r="0" g="0" b="0"/>
+      </a:lnRef>
+      <a:fillRef idx="0">
+        <a:scrgbClr r="0" g="0" b="0"/>
+      </a:fillRef>
+      <a:effectRef idx="0">
+        <a:scrgbClr r="0" g="0" b="0"/>
+      </a:effectRef>
+      <a:fontRef idx="minor"/>
+    </dgm:style>
+  </dgm:styleLbl>
+  <dgm:styleLbl name="parChTrans1D3">
+    <dgm:scene3d>
+      <a:camera prst="orthographicFront"/>
+      <a:lightRig rig="threePt" dir="t"/>
+    </dgm:scene3d>
+    <dgm:sp3d/>
+    <dgm:txPr/>
+    <dgm:style>
+      <a:lnRef idx="1">
+        <a:scrgbClr r="0" g="0" b="0"/>
+      </a:lnRef>
+      <a:fillRef idx="0">
+        <a:scrgbClr r="0" g="0" b="0"/>
+      </a:fillRef>
+      <a:effectRef idx="0">
+        <a:scrgbClr r="0" g="0" b="0"/>
+      </a:effectRef>
+      <a:fontRef idx="minor"/>
+    </dgm:style>
+  </dgm:styleLbl>
+  <dgm:styleLbl name="parChTrans1D4">
+    <dgm:scene3d>
+      <a:camera prst="orthographicFront"/>
+      <a:lightRig rig="threePt" dir="t"/>
+    </dgm:scene3d>
+    <dgm:sp3d/>
+    <dgm:txPr/>
+    <dgm:style>
+      <a:lnRef idx="1">
+        <a:scrgbClr r="0" g="0" b="0"/>
+      </a:lnRef>
+      <a:fillRef idx="0">
+        <a:scrgbClr r="0" g="0" b="0"/>
+      </a:fillRef>
+      <a:effectRef idx="0">
+        <a:scrgbClr r="0" g="0" b="0"/>
+      </a:effectRef>
+      <a:fontRef idx="minor"/>
+    </dgm:style>
+  </dgm:styleLbl>
+  <dgm:styleLbl name="fgAcc1">
+    <dgm:scene3d>
+      <a:camera prst="orthographicFront"/>
+      <a:lightRig rig="threePt" dir="t"/>
+    </dgm:scene3d>
+    <dgm:sp3d/>
+    <dgm:txPr/>
+    <dgm:style>
+      <a:lnRef idx="1">
+        <a:scrgbClr r="0" g="0" b="0"/>
+      </a:lnRef>
+      <a:fillRef idx="1">
+        <a:scrgbClr r="0" g="0" b="0"/>
+      </a:fillRef>
+      <a:effectRef idx="0">
+        <a:scrgbClr r="0" g="0" b="0"/>
+      </a:effectRef>
+      <a:fontRef idx="minor"/>
+    </dgm:style>
+  </dgm:styleLbl>
+  <dgm:styleLbl name="conFgAcc1">
+    <dgm:scene3d>
+      <a:camera prst="orthographicFront"/>
+      <a:lightRig rig="threePt" dir="t"/>
+    </dgm:scene3d>
+    <dgm:sp3d/>
+    <dgm:txPr/>
+    <dgm:style>
+      <a:lnRef idx="1">
+        <a:scrgbClr r="0" g="0" b="0"/>
+      </a:lnRef>
+      <a:fillRef idx="1">
+        <a:scrgbClr r="0" g="0" b="0"/>
+      </a:fillRef>
+      <a:effectRef idx="0">
+        <a:scrgbClr r="0" g="0" b="0"/>
+      </a:effectRef>
+      <a:fontRef idx="minor"/>
+    </dgm:style>
+  </dgm:styleLbl>
+  <dgm:styleLbl name="alignAcc1">
+    <dgm:scene3d>
+      <a:camera prst="orthographicFront"/>
+      <a:lightRig rig="threePt" dir="t"/>
+    </dgm:scene3d>
+    <dgm:sp3d/>
+    <dgm:txPr/>
+    <dgm:style>
+      <a:lnRef idx="1">
+        <a:scrgbClr r="0" g="0" b="0"/>
+      </a:lnRef>
+      <a:fillRef idx="1">
+        <a:scrgbClr r="0" g="0" b="0"/>
+      </a:fillRef>
+      <a:effectRef idx="0">
+        <a:scrgbClr r="0" g="0" b="0"/>
+      </a:effectRef>
+      <a:fontRef idx="minor"/>
+    </dgm:style>
+  </dgm:styleLbl>
+  <dgm:styleLbl name="trAlignAcc1">
+    <dgm:scene3d>
+      <a:camera prst="orthographicFront"/>
+      <a:lightRig rig="threePt" dir="t"/>
+    </dgm:scene3d>
+    <dgm:sp3d/>
+    <dgm:txPr/>
+    <dgm:style>
+      <a:lnRef idx="1">
+        <a:scrgbClr r="0" g="0" b="0"/>
+      </a:lnRef>
+      <a:fillRef idx="1">
+        <a:scrgbClr r="0" g="0" b="0"/>
+      </a:fillRef>
+      <a:effectRef idx="0">
+        <a:scrgbClr r="0" g="0" b="0"/>
+      </a:effectRef>
+      <a:fontRef idx="minor"/>
+    </dgm:style>
+  </dgm:styleLbl>
+  <dgm:styleLbl name="bgAcc1">
+    <dgm:scene3d>
+      <a:camera prst="orthographicFront"/>
+      <a:lightRig rig="threePt" dir="t"/>
+    </dgm:scene3d>
+    <dgm:sp3d/>
+    <dgm:txPr/>
+    <dgm:style>
+      <a:lnRef idx="1">
+        <a:scrgbClr r="0" g="0" b="0"/>
+      </a:lnRef>
+      <a:fillRef idx="1">
+        <a:scrgbClr r="0" g="0" b="0"/>
+      </a:fillRef>
+      <a:effectRef idx="0">
+        <a:scrgbClr r="0" g="0" b="0"/>
+      </a:effectRef>
+      <a:fontRef idx="minor"/>
+    </dgm:style>
+  </dgm:styleLbl>
+  <dgm:styleLbl name="solidFgAcc1">
+    <dgm:scene3d>
+      <a:camera prst="orthographicFront"/>
+      <a:lightRig rig="threePt" dir="t"/>
+    </dgm:scene3d>
+    <dgm:sp3d/>
+    <dgm:txPr/>
+    <dgm:style>
+      <a:lnRef idx="1">
+        <a:scrgbClr r="0" g="0" b="0"/>
+      </a:lnRef>
+      <a:fillRef idx="1">
+        <a:scrgbClr r="0" g="0" b="0"/>
+      </a:fillRef>
+      <a:effectRef idx="0">
+        <a:scrgbClr r="0" g="0" b="0"/>
+      </a:effectRef>
+      <a:fontRef idx="minor"/>
+    </dgm:style>
+  </dgm:styleLbl>
+  <dgm:styleLbl name="solidAlignAcc1">
+    <dgm:scene3d>
+      <a:camera prst="orthographicFront"/>
+      <a:lightRig rig="threePt" dir="t"/>
+    </dgm:scene3d>
+    <dgm:sp3d/>
+    <dgm:txPr/>
+    <dgm:style>
+      <a:lnRef idx="1">
+        <a:scrgbClr r="0" g="0" b="0"/>
+      </a:lnRef>
+      <a:fillRef idx="1">
+        <a:scrgbClr r="0" g="0" b="0"/>
+      </a:fillRef>
+      <a:effectRef idx="0">
+        <a:scrgbClr r="0" g="0" b="0"/>
+      </a:effectRef>
+      <a:fontRef idx="minor"/>
+    </dgm:style>
+  </dgm:styleLbl>
+  <dgm:styleLbl name="solidBgAcc1">
+    <dgm:scene3d>
+      <a:camera prst="orthographicFront"/>
+      <a:lightRig rig="threePt" dir="t"/>
+    </dgm:scene3d>
+    <dgm:sp3d/>
+    <dgm:txPr/>
+    <dgm:style>
+      <a:lnRef idx="1">
+        <a:scrgbClr r="0" g="0" b="0"/>
+      </a:lnRef>
+      <a:fillRef idx="1">
+        <a:scrgbClr r="0" g="0" b="0"/>
+      </a:fillRef>
+      <a:effectRef idx="0">
+        <a:scrgbClr r="0" g="0" b="0"/>
+      </a:effectRef>
+      <a:fontRef idx="minor"/>
+    </dgm:style>
+  </dgm:styleLbl>
+  <dgm:styleLbl name="fgAccFollowNode1">
+    <dgm:scene3d>
+      <a:camera prst="orthographicFront"/>
+      <a:lightRig rig="threePt" dir="t"/>
+    </dgm:scene3d>
+    <dgm:sp3d/>
+    <dgm:txPr/>
+    <dgm:style>
+      <a:lnRef idx="1">
+        <a:scrgbClr r="0" g="0" b="0"/>
+      </a:lnRef>
+      <a:fillRef idx="1">
+        <a:scrgbClr r="0" g="0" b="0"/>
+      </a:fillRef>
+      <a:effectRef idx="0">
+        <a:scrgbClr r="0" g="0" b="0"/>
+      </a:effectRef>
+      <a:fontRef idx="minor"/>
+    </dgm:style>
+  </dgm:styleLbl>
+  <dgm:styleLbl name="alignAccFollowNode1">
+    <dgm:scene3d>
+      <a:camera prst="orthographicFront"/>
+      <a:lightRig rig="threePt" dir="t"/>
+    </dgm:scene3d>
+    <dgm:sp3d/>
+    <dgm:txPr/>
+    <dgm:style>
+      <a:lnRef idx="1">
+        <a:scrgbClr r="0" g="0" b="0"/>
+      </a:lnRef>
+      <a:fillRef idx="1">
+        <a:scrgbClr r="0" g="0" b="0"/>
+      </a:fillRef>
+      <a:effectRef idx="0">
+        <a:scrgbClr r="0" g="0" b="0"/>
+      </a:effectRef>
+      <a:fontRef idx="minor"/>
+    </dgm:style>
+  </dgm:styleLbl>
+  <dgm:styleLbl name="bgAccFollowNode1">
+    <dgm:scene3d>
+      <a:camera prst="orthographicFront"/>
+      <a:lightRig rig="threePt" dir="t"/>
+    </dgm:scene3d>
+    <dgm:sp3d/>
+    <dgm:txPr/>
+    <dgm:style>
+      <a:lnRef idx="1">
+        <a:scrgbClr r="0" g="0" b="0"/>
+      </a:lnRef>
+      <a:fillRef idx="1">
+        <a:scrgbClr r="0" g="0" b="0"/>
+      </a:fillRef>
+      <a:effectRef idx="0">
+        <a:scrgbClr r="0" g="0" b="0"/>
+      </a:effectRef>
+      <a:fontRef idx="minor"/>
+    </dgm:style>
+  </dgm:styleLbl>
+  <dgm:styleLbl name="fgAcc0">
+    <dgm:scene3d>
+      <a:camera prst="orthographicFront"/>
+      <a:lightRig rig="threePt" dir="t"/>
+    </dgm:scene3d>
+    <dgm:sp3d/>
+    <dgm:txPr/>
+    <dgm:style>
+      <a:lnRef idx="1">
+        <a:scrgbClr r="0" g="0" b="0"/>
+      </a:lnRef>
+      <a:fillRef idx="1">
+        <a:scrgbClr r="0" g="0" b="0"/>
+      </a:fillRef>
+      <a:effectRef idx="0">
+        <a:scrgbClr r="0" g="0" b="0"/>
+      </a:effectRef>
+      <a:fontRef idx="minor"/>
+    </dgm:style>
+  </dgm:styleLbl>
+  <dgm:styleLbl name="fgAcc2">
+    <dgm:scene3d>
+      <a:camera prst="orthographicFront"/>
+      <a:lightRig rig="threePt" dir="t"/>
+    </dgm:scene3d>
+    <dgm:sp3d/>
+    <dgm:txPr/>
+    <dgm:style>
+      <a:lnRef idx="1">
+        <a:scrgbClr r="0" g="0" b="0"/>
+      </a:lnRef>
+      <a:fillRef idx="1">
+        <a:scrgbClr r="0" g="0" b="0"/>
+      </a:fillRef>
+      <a:effectRef idx="0">
+        <a:scrgbClr r="0" g="0" b="0"/>
+      </a:effectRef>
+      <a:fontRef idx="minor"/>
+    </dgm:style>
+  </dgm:styleLbl>
+  <dgm:styleLbl name="fgAcc3">
+    <dgm:scene3d>
+      <a:camera prst="orthographicFront"/>
+      <a:lightRig rig="threePt" dir="t"/>
+    </dgm:scene3d>
+    <dgm:sp3d/>
+    <dgm:txPr/>
+    <dgm:style>
+      <a:lnRef idx="1">
+        <a:scrgbClr r="0" g="0" b="0"/>
+      </a:lnRef>
+      <a:fillRef idx="1">
+        <a:scrgbClr r="0" g="0" b="0"/>
+      </a:fillRef>
+      <a:effectRef idx="0">
+        <a:scrgbClr r="0" g="0" b="0"/>
+      </a:effectRef>
+      <a:fontRef idx="minor"/>
+    </dgm:style>
+  </dgm:styleLbl>
+  <dgm:styleLbl name="fgAcc4">
+    <dgm:scene3d>
+      <a:camera prst="orthographicFront"/>
+      <a:lightRig rig="threePt" dir="t"/>
+    </dgm:scene3d>
+    <dgm:sp3d/>
+    <dgm:txPr/>
+    <dgm:style>
+      <a:lnRef idx="1">
+        <a:scrgbClr r="0" g="0" b="0"/>
+      </a:lnRef>
+      <a:fillRef idx="1">
+        <a:scrgbClr r="0" g="0" b="0"/>
+      </a:fillRef>
+      <a:effectRef idx="0">
+        <a:scrgbClr r="0" g="0" b="0"/>
+      </a:effectRef>
+      <a:fontRef idx="minor"/>
+    </dgm:style>
+  </dgm:styleLbl>
+  <dgm:styleLbl name="bgShp">
+    <dgm:scene3d>
+      <a:camera prst="orthographicFront"/>
+      <a:lightRig rig="threePt" dir="t"/>
+    </dgm:scene3d>
+    <dgm:sp3d/>
+    <dgm:txPr/>
+    <dgm:style>
+      <a:lnRef idx="0">
+        <a:scrgbClr r="0" g="0" b="0"/>
+      </a:lnRef>
+      <a:fillRef idx="1">
+        <a:scrgbClr r="0" g="0" b="0"/>
+      </a:fillRef>
+      <a:effectRef idx="2">
+        <a:scrgbClr r="0" g="0" b="0"/>
+      </a:effectRef>
+      <a:fontRef idx="minor"/>
+    </dgm:style>
+  </dgm:styleLbl>
+  <dgm:styleLbl name="dkBgShp">
+    <dgm:scene3d>
+      <a:camera prst="orthographicFront"/>
+      <a:lightRig rig="threePt" dir="t"/>
+    </dgm:scene3d>
+    <dgm:sp3d/>
+    <dgm:txPr/>
+    <dgm:style>
+      <a:lnRef idx="0">
+        <a:scrgbClr r="0" g="0" b="0"/>
+      </a:lnRef>
+      <a:fillRef idx="1">
+        <a:scrgbClr r="0" g="0" b="0"/>
+      </a:fillRef>
+      <a:effectRef idx="2">
+        <a:scrgbClr r="0" g="0" b="0"/>
+      </a:effectRef>
+      <a:fontRef idx="minor"/>
+    </dgm:style>
+  </dgm:styleLbl>
+  <dgm:styleLbl name="trBgShp">
+    <dgm:scene3d>
+      <a:camera prst="orthographicFront"/>
+      <a:lightRig rig="threePt" dir="t"/>
+    </dgm:scene3d>
+    <dgm:sp3d/>
+    <dgm:txPr/>
+    <dgm:style>
+      <a:lnRef idx="0">
+        <a:scrgbClr r="0" g="0" b="0"/>
+      </a:lnRef>
+      <a:fillRef idx="1">
+        <a:scrgbClr r="0" g="0" b="0"/>
+      </a:fillRef>
+      <a:effectRef idx="0">
+        <a:scrgbClr r="0" g="0" b="0"/>
+      </a:effectRef>
+      <a:fontRef idx="minor"/>
+    </dgm:style>
+  </dgm:styleLbl>
+  <dgm:styleLbl name="fgShp">
+    <dgm:scene3d>
+      <a:camera prst="orthographicFront"/>
+      <a:lightRig rig="threePt" dir="t"/>
+    </dgm:scene3d>
+    <dgm:sp3d/>
+    <dgm:txPr/>
+    <dgm:style>
+      <a:lnRef idx="0">
+        <a:scrgbClr r="0" g="0" b="0"/>
+      </a:lnRef>
+      <a:fillRef idx="3">
+        <a:scrgbClr r="0" g="0" b="0"/>
+      </a:fillRef>
+      <a:effectRef idx="2">
+        <a:scrgbClr r="0" g="0" b="0"/>
+      </a:effectRef>
+      <a:fontRef idx="minor"/>
+    </dgm:style>
+  </dgm:styleLbl>
+  <dgm:styleLbl name="revTx">
+    <dgm:scene3d>
+      <a:camera prst="orthographicFront"/>
+      <a:lightRig rig="threePt" dir="t"/>
+    </dgm:scene3d>
+    <dgm:sp3d/>
+    <dgm:txPr/>
+    <dgm:style>
+      <a:lnRef idx="0">
+        <a:scrgbClr r="0" g="0" b="0"/>
+      </a:lnRef>
+      <a:fillRef idx="0">
+        <a:scrgbClr r="0" g="0" b="0"/>
+      </a:fillRef>
+      <a:effectRef idx="0">
+        <a:scrgbClr r="0" g="0" b="0"/>
+      </a:effectRef>
+      <a:fontRef idx="minor"/>
+    </dgm:style>
+  </dgm:styleLbl>
+</dgm:styleDef>
 </file>
 
 <file path=ppt/slideLayouts/slideLayout1.xml><?xml version="1.0" encoding="utf-8"?>
@@ -3710,12 +6817,13 @@
               <a:rPr lang="en-US" dirty="0" smtClean="0"/>
               <a:t>We are making the flight controller for this vehicle.</a:t>
             </a:r>
+            <a:endParaRPr lang="en-US" dirty="0" smtClean="0"/>
           </a:p>
           <a:p>
             <a:pPr lvl="1"/>
             <a:r>
               <a:rPr lang="en-US" dirty="0" smtClean="0"/>
-              <a:t>Controls stability</a:t>
+              <a:t>Stability control</a:t>
             </a:r>
           </a:p>
           <a:p>
@@ -3798,9 +6906,20 @@
           <a:lstStyle/>
           <a:p>
             <a:r>
-              <a:rPr lang="en-US" smtClean="0"/>
-              <a:t>INCLUDE VIDEO</a:t>
-            </a:r>
+              <a:rPr lang="en-US" dirty="0" smtClean="0">
+                <a:hlinkClick r:id="rId2"/>
+              </a:rPr>
+              <a:t>http://www.youtube.com/watch?v=</a:t>
+            </a:r>
+            <a:r>
+              <a:rPr lang="en-US" dirty="0" smtClean="0">
+                <a:hlinkClick r:id="rId2"/>
+              </a:rPr>
+              <a:t>ulaZ91LmbfA</a:t>
+            </a:r>
+            <a:endParaRPr lang="en-US" dirty="0" smtClean="0"/>
+          </a:p>
+          <a:p>
             <a:endParaRPr lang="en-US" dirty="0" smtClean="0"/>
           </a:p>
         </p:txBody>
@@ -4004,8 +7123,8 @@
         </p:blipFill>
         <p:spPr>
           <a:xfrm>
-            <a:off x="1828800" y="1237046"/>
-            <a:ext cx="5867400" cy="5620954"/>
+            <a:off x="1828800" y="1091047"/>
+            <a:ext cx="6019800" cy="5766953"/>
           </a:xfrm>
         </p:spPr>
       </p:pic>
@@ -4348,7 +7467,12 @@
             <p:ph idx="1"/>
           </p:nvPr>
         </p:nvSpPr>
-        <p:spPr/>
+        <p:spPr>
+          <a:xfrm>
+            <a:off x="228600" y="1447800"/>
+            <a:ext cx="8686800" cy="4525963"/>
+          </a:xfrm>
+        </p:spPr>
         <p:txBody>
           <a:bodyPr/>
           <a:lstStyle/>
@@ -4377,6 +7501,196 @@
               <a:rPr lang="en-US" baseline="0" dirty="0" smtClean="0"/>
               <a:t> BLDC Motor Controllers</a:t>
             </a:r>
+          </a:p>
+        </p:txBody>
+      </p:sp>
+      <p:graphicFrame>
+        <p:nvGraphicFramePr>
+          <p:cNvPr id="5" name="Diagram 4"/>
+          <p:cNvGraphicFramePr/>
+          <p:nvPr/>
+        </p:nvGraphicFramePr>
+        <p:xfrm>
+          <a:off x="0" y="3429000"/>
+          <a:ext cx="9144000" cy="3429000"/>
+        </p:xfrm>
+        <a:graphic>
+          <a:graphicData uri="http://schemas.openxmlformats.org/drawingml/2006/diagram">
+            <a:relIds xmlns:dgm="http://schemas.openxmlformats.org/drawingml/2006/diagram" xmlns:r="http://schemas.openxmlformats.org/officeDocument/2006/relationships" r:dm="rId2" r:lo="rId3" r:qs="rId4" r:cs="rId5"/>
+          </a:graphicData>
+        </a:graphic>
+      </p:graphicFrame>
+      <p:cxnSp>
+        <p:nvCxnSpPr>
+          <p:cNvPr id="7" name="Straight Arrow Connector 6"/>
+          <p:cNvCxnSpPr/>
+          <p:nvPr/>
+        </p:nvCxnSpPr>
+        <p:spPr>
+          <a:xfrm>
+            <a:off x="2057400" y="3733800"/>
+            <a:ext cx="1676400" cy="1588"/>
+          </a:xfrm>
+          <a:prstGeom prst="straightConnector1">
+            <a:avLst/>
+          </a:prstGeom>
+          <a:ln>
+            <a:tailEnd type="arrow"/>
+          </a:ln>
+        </p:spPr>
+        <p:style>
+          <a:lnRef idx="2">
+            <a:schemeClr val="accent1"/>
+          </a:lnRef>
+          <a:fillRef idx="0">
+            <a:schemeClr val="accent1"/>
+          </a:fillRef>
+          <a:effectRef idx="1">
+            <a:schemeClr val="accent1"/>
+          </a:effectRef>
+          <a:fontRef idx="minor">
+            <a:schemeClr val="tx1"/>
+          </a:fontRef>
+        </p:style>
+      </p:cxnSp>
+      <p:cxnSp>
+        <p:nvCxnSpPr>
+          <p:cNvPr id="9" name="Straight Arrow Connector 8"/>
+          <p:cNvCxnSpPr/>
+          <p:nvPr/>
+        </p:nvCxnSpPr>
+        <p:spPr>
+          <a:xfrm rot="10800000">
+            <a:off x="5562600" y="6477000"/>
+            <a:ext cx="1524000" cy="1588"/>
+          </a:xfrm>
+          <a:prstGeom prst="straightConnector1">
+            <a:avLst/>
+          </a:prstGeom>
+          <a:ln>
+            <a:tailEnd type="arrow"/>
+          </a:ln>
+        </p:spPr>
+        <p:style>
+          <a:lnRef idx="2">
+            <a:schemeClr val="accent1"/>
+          </a:lnRef>
+          <a:fillRef idx="0">
+            <a:schemeClr val="accent1"/>
+          </a:fillRef>
+          <a:effectRef idx="1">
+            <a:schemeClr val="accent1"/>
+          </a:effectRef>
+          <a:fontRef idx="minor">
+            <a:schemeClr val="tx1"/>
+          </a:fontRef>
+        </p:style>
+      </p:cxnSp>
+      <p:sp>
+        <p:nvSpPr>
+          <p:cNvPr id="14" name="Rectangle 13"/>
+          <p:cNvSpPr/>
+          <p:nvPr/>
+        </p:nvSpPr>
+        <p:spPr>
+          <a:xfrm>
+            <a:off x="6324600" y="5867400"/>
+            <a:ext cx="1676400" cy="762000"/>
+          </a:xfrm>
+          <a:prstGeom prst="rect">
+            <a:avLst/>
+          </a:prstGeom>
+          <a:noFill/>
+          <a:ln>
+            <a:noFill/>
+          </a:ln>
+        </p:spPr>
+        <p:style>
+          <a:lnRef idx="1">
+            <a:schemeClr val="accent1"/>
+          </a:lnRef>
+          <a:fillRef idx="3">
+            <a:schemeClr val="accent1"/>
+          </a:fillRef>
+          <a:effectRef idx="2">
+            <a:schemeClr val="accent1"/>
+          </a:effectRef>
+          <a:fontRef idx="minor">
+            <a:schemeClr val="lt1"/>
+          </a:fontRef>
+        </p:style>
+        <p:txBody>
+          <a:bodyPr rtlCol="0" anchor="ctr"/>
+          <a:lstStyle/>
+          <a:p>
+            <a:pPr algn="ctr"/>
+            <a:r>
+              <a:rPr lang="en-US" dirty="0" smtClean="0">
+                <a:solidFill>
+                  <a:schemeClr val="tx1"/>
+                </a:solidFill>
+              </a:rPr>
+              <a:t>Control Input</a:t>
+            </a:r>
+            <a:endParaRPr lang="en-US" dirty="0">
+              <a:solidFill>
+                <a:schemeClr val="tx1"/>
+              </a:solidFill>
+            </a:endParaRPr>
+          </a:p>
+        </p:txBody>
+      </p:sp>
+      <p:sp>
+        <p:nvSpPr>
+          <p:cNvPr id="15" name="Rectangle 14"/>
+          <p:cNvSpPr/>
+          <p:nvPr/>
+        </p:nvSpPr>
+        <p:spPr>
+          <a:xfrm>
+            <a:off x="1524000" y="3124200"/>
+            <a:ext cx="1676400" cy="762000"/>
+          </a:xfrm>
+          <a:prstGeom prst="rect">
+            <a:avLst/>
+          </a:prstGeom>
+          <a:noFill/>
+          <a:ln>
+            <a:noFill/>
+          </a:ln>
+        </p:spPr>
+        <p:style>
+          <a:lnRef idx="1">
+            <a:schemeClr val="accent1"/>
+          </a:lnRef>
+          <a:fillRef idx="3">
+            <a:schemeClr val="accent1"/>
+          </a:fillRef>
+          <a:effectRef idx="2">
+            <a:schemeClr val="accent1"/>
+          </a:effectRef>
+          <a:fontRef idx="minor">
+            <a:schemeClr val="lt1"/>
+          </a:fontRef>
+        </p:style>
+        <p:txBody>
+          <a:bodyPr rtlCol="0" anchor="ctr"/>
+          <a:lstStyle/>
+          <a:p>
+            <a:pPr algn="ctr"/>
+            <a:r>
+              <a:rPr lang="en-US" dirty="0" smtClean="0">
+                <a:solidFill>
+                  <a:schemeClr val="tx1"/>
+                </a:solidFill>
+              </a:rPr>
+              <a:t>Environment</a:t>
+            </a:r>
+            <a:endParaRPr lang="en-US" dirty="0">
+              <a:solidFill>
+                <a:schemeClr val="tx1"/>
+              </a:solidFill>
+            </a:endParaRPr>
           </a:p>
         </p:txBody>
       </p:sp>

</xml_diff>